<commit_message>
Progresso da apresentação de slides
</commit_message>
<xml_diff>
--- a/Arquivos/INTRODUÇÃO A FRONT-END.pptx
+++ b/Arquivos/INTRODUÇÃO A FRONT-END.pptx
@@ -12,6 +12,23 @@
     <p:sldId id="260" r:id="rId6"/>
     <p:sldId id="261" r:id="rId7"/>
     <p:sldId id="262" r:id="rId8"/>
+    <p:sldId id="263" r:id="rId9"/>
+    <p:sldId id="275" r:id="rId10"/>
+    <p:sldId id="264" r:id="rId11"/>
+    <p:sldId id="265" r:id="rId12"/>
+    <p:sldId id="266" r:id="rId13"/>
+    <p:sldId id="267" r:id="rId14"/>
+    <p:sldId id="268" r:id="rId15"/>
+    <p:sldId id="269" r:id="rId16"/>
+    <p:sldId id="270" r:id="rId17"/>
+    <p:sldId id="271" r:id="rId18"/>
+    <p:sldId id="272" r:id="rId19"/>
+    <p:sldId id="276" r:id="rId20"/>
+    <p:sldId id="273" r:id="rId21"/>
+    <p:sldId id="274" r:id="rId22"/>
+    <p:sldId id="277" r:id="rId23"/>
+    <p:sldId id="278" r:id="rId24"/>
+    <p:sldId id="279" r:id="rId25"/>
   </p:sldIdLst>
   <p:sldSz cx="12192000" cy="6858000"/>
   <p:notesSz cx="6858000" cy="9144000"/>
@@ -297,7 +314,7 @@
           <a:p>
             <a:fld id="{EF64EDD3-CC31-4653-85DF-1A82825891C3}" type="datetimeFigureOut">
               <a:rPr lang="pt-BR" smtClean="0"/>
-              <a:t>17/10/2022</a:t>
+              <a:t>21/10/2022</a:t>
             </a:fld>
             <a:endParaRPr lang="pt-BR"/>
           </a:p>
@@ -609,7 +626,7 @@
           <a:p>
             <a:fld id="{EF64EDD3-CC31-4653-85DF-1A82825891C3}" type="datetimeFigureOut">
               <a:rPr lang="pt-BR" smtClean="0"/>
-              <a:t>17/10/2022</a:t>
+              <a:t>21/10/2022</a:t>
             </a:fld>
             <a:endParaRPr lang="pt-BR"/>
           </a:p>
@@ -831,7 +848,7 @@
           <a:p>
             <a:fld id="{EF64EDD3-CC31-4653-85DF-1A82825891C3}" type="datetimeFigureOut">
               <a:rPr lang="pt-BR" smtClean="0"/>
-              <a:t>17/10/2022</a:t>
+              <a:t>21/10/2022</a:t>
             </a:fld>
             <a:endParaRPr lang="pt-BR"/>
           </a:p>
@@ -1122,7 +1139,7 @@
           <a:p>
             <a:fld id="{EF64EDD3-CC31-4653-85DF-1A82825891C3}" type="datetimeFigureOut">
               <a:rPr lang="pt-BR" smtClean="0"/>
-              <a:t>17/10/2022</a:t>
+              <a:t>21/10/2022</a:t>
             </a:fld>
             <a:endParaRPr lang="pt-BR"/>
           </a:p>
@@ -1576,7 +1593,7 @@
           <a:p>
             <a:fld id="{EF64EDD3-CC31-4653-85DF-1A82825891C3}" type="datetimeFigureOut">
               <a:rPr lang="pt-BR" smtClean="0"/>
-              <a:t>17/10/2022</a:t>
+              <a:t>21/10/2022</a:t>
             </a:fld>
             <a:endParaRPr lang="pt-BR"/>
           </a:p>
@@ -2152,7 +2169,7 @@
           <a:p>
             <a:fld id="{EF64EDD3-CC31-4653-85DF-1A82825891C3}" type="datetimeFigureOut">
               <a:rPr lang="pt-BR" smtClean="0"/>
-              <a:t>17/10/2022</a:t>
+              <a:t>21/10/2022</a:t>
             </a:fld>
             <a:endParaRPr lang="pt-BR"/>
           </a:p>
@@ -3004,7 +3021,7 @@
           <a:p>
             <a:fld id="{EF64EDD3-CC31-4653-85DF-1A82825891C3}" type="datetimeFigureOut">
               <a:rPr lang="pt-BR" smtClean="0"/>
-              <a:t>17/10/2022</a:t>
+              <a:t>21/10/2022</a:t>
             </a:fld>
             <a:endParaRPr lang="pt-BR"/>
           </a:p>
@@ -3209,7 +3226,7 @@
           <a:p>
             <a:fld id="{EF64EDD3-CC31-4653-85DF-1A82825891C3}" type="datetimeFigureOut">
               <a:rPr lang="pt-BR" smtClean="0"/>
-              <a:t>17/10/2022</a:t>
+              <a:t>21/10/2022</a:t>
             </a:fld>
             <a:endParaRPr lang="pt-BR"/>
           </a:p>
@@ -3423,7 +3440,7 @@
           <a:p>
             <a:fld id="{EF64EDD3-CC31-4653-85DF-1A82825891C3}" type="datetimeFigureOut">
               <a:rPr lang="pt-BR" smtClean="0"/>
-              <a:t>17/10/2022</a:t>
+              <a:t>21/10/2022</a:t>
             </a:fld>
             <a:endParaRPr lang="pt-BR"/>
           </a:p>
@@ -3628,7 +3645,7 @@
           <a:p>
             <a:fld id="{EF64EDD3-CC31-4653-85DF-1A82825891C3}" type="datetimeFigureOut">
               <a:rPr lang="pt-BR" smtClean="0"/>
-              <a:t>17/10/2022</a:t>
+              <a:t>21/10/2022</a:t>
             </a:fld>
             <a:endParaRPr lang="pt-BR"/>
           </a:p>
@@ -3908,7 +3925,7 @@
           <a:p>
             <a:fld id="{EF64EDD3-CC31-4653-85DF-1A82825891C3}" type="datetimeFigureOut">
               <a:rPr lang="pt-BR" smtClean="0"/>
-              <a:t>17/10/2022</a:t>
+              <a:t>21/10/2022</a:t>
             </a:fld>
             <a:endParaRPr lang="pt-BR"/>
           </a:p>
@@ -4175,7 +4192,7 @@
           <a:p>
             <a:fld id="{EF64EDD3-CC31-4653-85DF-1A82825891C3}" type="datetimeFigureOut">
               <a:rPr lang="pt-BR" smtClean="0"/>
-              <a:t>17/10/2022</a:t>
+              <a:t>21/10/2022</a:t>
             </a:fld>
             <a:endParaRPr lang="pt-BR"/>
           </a:p>
@@ -4590,7 +4607,7 @@
           <a:p>
             <a:fld id="{EF64EDD3-CC31-4653-85DF-1A82825891C3}" type="datetimeFigureOut">
               <a:rPr lang="pt-BR" smtClean="0"/>
-              <a:t>17/10/2022</a:t>
+              <a:t>21/10/2022</a:t>
             </a:fld>
             <a:endParaRPr lang="pt-BR"/>
           </a:p>
@@ -4738,7 +4755,7 @@
           <a:p>
             <a:fld id="{EF64EDD3-CC31-4653-85DF-1A82825891C3}" type="datetimeFigureOut">
               <a:rPr lang="pt-BR" smtClean="0"/>
-              <a:t>17/10/2022</a:t>
+              <a:t>21/10/2022</a:t>
             </a:fld>
             <a:endParaRPr lang="pt-BR"/>
           </a:p>
@@ -4863,7 +4880,7 @@
           <a:p>
             <a:fld id="{EF64EDD3-CC31-4653-85DF-1A82825891C3}" type="datetimeFigureOut">
               <a:rPr lang="pt-BR" smtClean="0"/>
-              <a:t>17/10/2022</a:t>
+              <a:t>21/10/2022</a:t>
             </a:fld>
             <a:endParaRPr lang="pt-BR"/>
           </a:p>
@@ -5142,7 +5159,7 @@
           <a:p>
             <a:fld id="{EF64EDD3-CC31-4653-85DF-1A82825891C3}" type="datetimeFigureOut">
               <a:rPr lang="pt-BR" smtClean="0"/>
-              <a:t>17/10/2022</a:t>
+              <a:t>21/10/2022</a:t>
             </a:fld>
             <a:endParaRPr lang="pt-BR"/>
           </a:p>
@@ -5454,7 +5471,7 @@
           <a:p>
             <a:fld id="{EF64EDD3-CC31-4653-85DF-1A82825891C3}" type="datetimeFigureOut">
               <a:rPr lang="pt-BR" smtClean="0"/>
-              <a:t>17/10/2022</a:t>
+              <a:t>21/10/2022</a:t>
             </a:fld>
             <a:endParaRPr lang="pt-BR"/>
           </a:p>
@@ -5707,7 +5724,7 @@
           <a:p>
             <a:fld id="{EF64EDD3-CC31-4653-85DF-1A82825891C3}" type="datetimeFigureOut">
               <a:rPr lang="pt-BR" smtClean="0"/>
-              <a:t>17/10/2022</a:t>
+              <a:t>21/10/2022</a:t>
             </a:fld>
             <a:endParaRPr lang="pt-BR"/>
           </a:p>
@@ -6267,6 +6284,2465 @@
 </p:sld>
 </file>
 
+<file path=ppt/slides/slide10.xml><?xml version="1.0" encoding="utf-8"?>
+<p:sld xmlns:a="http://schemas.openxmlformats.org/drawingml/2006/main" xmlns:r="http://schemas.openxmlformats.org/officeDocument/2006/relationships" xmlns:p="http://schemas.openxmlformats.org/presentationml/2006/main">
+  <p:cSld>
+    <p:spTree>
+      <p:nvGrpSpPr>
+        <p:cNvPr id="1" name=""/>
+        <p:cNvGrpSpPr/>
+        <p:nvPr/>
+      </p:nvGrpSpPr>
+      <p:grpSpPr>
+        <a:xfrm>
+          <a:off x="0" y="0"/>
+          <a:ext cx="0" cy="0"/>
+          <a:chOff x="0" y="0"/>
+          <a:chExt cx="0" cy="0"/>
+        </a:xfrm>
+      </p:grpSpPr>
+      <p:sp>
+        <p:nvSpPr>
+          <p:cNvPr id="2" name="Título 1">
+            <a:extLst>
+              <a:ext uri="{FF2B5EF4-FFF2-40B4-BE49-F238E27FC236}">
+                <a16:creationId xmlns:a16="http://schemas.microsoft.com/office/drawing/2014/main" id="{9CEC5963-F278-AA5A-BD6D-D091F5B5F7EF}"/>
+              </a:ext>
+            </a:extLst>
+          </p:cNvPr>
+          <p:cNvSpPr>
+            <a:spLocks noGrp="1"/>
+          </p:cNvSpPr>
+          <p:nvPr>
+            <p:ph type="title"/>
+          </p:nvPr>
+        </p:nvSpPr>
+        <p:spPr>
+          <a:xfrm>
+            <a:off x="913775" y="618518"/>
+            <a:ext cx="10364451" cy="1067670"/>
+          </a:xfrm>
+        </p:spPr>
+        <p:txBody>
+          <a:bodyPr>
+            <a:normAutofit/>
+          </a:bodyPr>
+          <a:lstStyle/>
+          <a:p>
+            <a:r>
+              <a:rPr lang="pt-BR" sz="4800" dirty="0" err="1"/>
+              <a:t>Css</a:t>
+            </a:r>
+            <a:r>
+              <a:rPr lang="pt-BR" sz="4800" dirty="0"/>
+              <a:t>: selecionando elementos</a:t>
+            </a:r>
+          </a:p>
+        </p:txBody>
+      </p:sp>
+      <p:sp>
+        <p:nvSpPr>
+          <p:cNvPr id="3" name="Espaço Reservado para Conteúdo 2">
+            <a:extLst>
+              <a:ext uri="{FF2B5EF4-FFF2-40B4-BE49-F238E27FC236}">
+                <a16:creationId xmlns:a16="http://schemas.microsoft.com/office/drawing/2014/main" id="{2C18BE2C-D36D-EA9D-031D-5C5C54A848FC}"/>
+              </a:ext>
+            </a:extLst>
+          </p:cNvPr>
+          <p:cNvSpPr>
+            <a:spLocks noGrp="1"/>
+          </p:cNvSpPr>
+          <p:nvPr>
+            <p:ph sz="quarter" idx="13"/>
+          </p:nvPr>
+        </p:nvSpPr>
+        <p:spPr>
+          <a:xfrm>
+            <a:off x="2072080" y="2038524"/>
+            <a:ext cx="9205519" cy="4200957"/>
+          </a:xfrm>
+        </p:spPr>
+        <p:txBody>
+          <a:bodyPr>
+            <a:normAutofit/>
+          </a:bodyPr>
+          <a:lstStyle/>
+          <a:p>
+            <a:pPr marL="0" indent="0">
+              <a:lnSpc>
+                <a:spcPct val="100000"/>
+              </a:lnSpc>
+              <a:spcBef>
+                <a:spcPts val="0"/>
+              </a:spcBef>
+              <a:buNone/>
+            </a:pPr>
+            <a:r>
+              <a:rPr lang="pt-BR" sz="3200" cap="none" dirty="0"/>
+              <a:t>h2 {</a:t>
+            </a:r>
+          </a:p>
+          <a:p>
+            <a:pPr marL="0" indent="0">
+              <a:lnSpc>
+                <a:spcPct val="100000"/>
+              </a:lnSpc>
+              <a:spcBef>
+                <a:spcPts val="0"/>
+              </a:spcBef>
+              <a:buNone/>
+            </a:pPr>
+            <a:r>
+              <a:rPr lang="pt-BR" sz="3200" cap="none" dirty="0"/>
+              <a:t>	</a:t>
+            </a:r>
+            <a:r>
+              <a:rPr lang="pt-BR" sz="3200" cap="none" dirty="0" err="1"/>
+              <a:t>font</a:t>
+            </a:r>
+            <a:r>
+              <a:rPr lang="pt-BR" sz="3200" cap="none" dirty="0"/>
+              <a:t>-Family: “</a:t>
+            </a:r>
+            <a:r>
+              <a:rPr lang="pt-BR" sz="3200" cap="none" dirty="0" err="1"/>
+              <a:t>verdanna</a:t>
+            </a:r>
+            <a:r>
+              <a:rPr lang="pt-BR" sz="3200" cap="none" dirty="0"/>
+              <a:t>”, “</a:t>
+            </a:r>
+            <a:r>
+              <a:rPr lang="pt-BR" sz="3200" cap="none" dirty="0" err="1"/>
+              <a:t>arial</a:t>
+            </a:r>
+            <a:r>
+              <a:rPr lang="pt-BR" sz="3200" cap="none" dirty="0"/>
+              <a:t>”;</a:t>
+            </a:r>
+          </a:p>
+          <a:p>
+            <a:pPr marL="0" indent="0">
+              <a:lnSpc>
+                <a:spcPct val="100000"/>
+              </a:lnSpc>
+              <a:spcBef>
+                <a:spcPts val="0"/>
+              </a:spcBef>
+              <a:buNone/>
+            </a:pPr>
+            <a:r>
+              <a:rPr lang="pt-BR" sz="3200" cap="none" dirty="0"/>
+              <a:t>}</a:t>
+            </a:r>
+          </a:p>
+          <a:p>
+            <a:pPr marL="0" indent="0">
+              <a:lnSpc>
+                <a:spcPct val="100000"/>
+              </a:lnSpc>
+              <a:buNone/>
+            </a:pPr>
+            <a:endParaRPr lang="pt-BR" sz="3200" cap="none" dirty="0"/>
+          </a:p>
+          <a:p>
+            <a:pPr marL="0" indent="0">
+              <a:lnSpc>
+                <a:spcPct val="100000"/>
+              </a:lnSpc>
+              <a:buNone/>
+            </a:pPr>
+            <a:r>
+              <a:rPr lang="pt-BR" sz="3200" cap="none" dirty="0"/>
+              <a:t>p, </a:t>
+            </a:r>
+            <a:r>
+              <a:rPr lang="pt-BR" sz="3200" cap="none" dirty="0" err="1"/>
+              <a:t>pre</a:t>
+            </a:r>
+            <a:r>
+              <a:rPr lang="pt-BR" sz="3200" cap="none" dirty="0"/>
+              <a:t> {</a:t>
+            </a:r>
+          </a:p>
+          <a:p>
+            <a:pPr marL="0" indent="0">
+              <a:lnSpc>
+                <a:spcPct val="100000"/>
+              </a:lnSpc>
+              <a:buNone/>
+            </a:pPr>
+            <a:r>
+              <a:rPr lang="pt-BR" sz="3200" cap="none" dirty="0"/>
+              <a:t>	</a:t>
+            </a:r>
+            <a:r>
+              <a:rPr lang="pt-BR" sz="3200" cap="none" dirty="0" err="1"/>
+              <a:t>font-size</a:t>
+            </a:r>
+            <a:r>
+              <a:rPr lang="pt-BR" sz="3200" cap="none" dirty="0"/>
+              <a:t>: 20px;</a:t>
+            </a:r>
+          </a:p>
+          <a:p>
+            <a:pPr marL="0" indent="0">
+              <a:lnSpc>
+                <a:spcPct val="100000"/>
+              </a:lnSpc>
+              <a:buNone/>
+            </a:pPr>
+            <a:r>
+              <a:rPr lang="pt-BR" sz="3200" cap="none" dirty="0"/>
+              <a:t>}</a:t>
+            </a:r>
+          </a:p>
+          <a:p>
+            <a:pPr marL="0" indent="0">
+              <a:buNone/>
+            </a:pPr>
+            <a:endParaRPr lang="pt-BR" sz="3200" cap="none" dirty="0"/>
+          </a:p>
+          <a:p>
+            <a:endParaRPr lang="pt-BR" sz="3200" dirty="0"/>
+          </a:p>
+        </p:txBody>
+      </p:sp>
+    </p:spTree>
+    <p:extLst>
+      <p:ext uri="{BB962C8B-B14F-4D97-AF65-F5344CB8AC3E}">
+        <p14:creationId xmlns:p14="http://schemas.microsoft.com/office/powerpoint/2010/main" val="3044718632"/>
+      </p:ext>
+    </p:extLst>
+  </p:cSld>
+  <p:clrMapOvr>
+    <a:masterClrMapping/>
+  </p:clrMapOvr>
+</p:sld>
+</file>
+
+<file path=ppt/slides/slide11.xml><?xml version="1.0" encoding="utf-8"?>
+<p:sld xmlns:a="http://schemas.openxmlformats.org/drawingml/2006/main" xmlns:r="http://schemas.openxmlformats.org/officeDocument/2006/relationships" xmlns:p="http://schemas.openxmlformats.org/presentationml/2006/main">
+  <p:cSld>
+    <p:spTree>
+      <p:nvGrpSpPr>
+        <p:cNvPr id="1" name=""/>
+        <p:cNvGrpSpPr/>
+        <p:nvPr/>
+      </p:nvGrpSpPr>
+      <p:grpSpPr>
+        <a:xfrm>
+          <a:off x="0" y="0"/>
+          <a:ext cx="0" cy="0"/>
+          <a:chOff x="0" y="0"/>
+          <a:chExt cx="0" cy="0"/>
+        </a:xfrm>
+      </p:grpSpPr>
+      <p:sp>
+        <p:nvSpPr>
+          <p:cNvPr id="2" name="Título 1">
+            <a:extLst>
+              <a:ext uri="{FF2B5EF4-FFF2-40B4-BE49-F238E27FC236}">
+                <a16:creationId xmlns:a16="http://schemas.microsoft.com/office/drawing/2014/main" id="{9CEC5963-F278-AA5A-BD6D-D091F5B5F7EF}"/>
+              </a:ext>
+            </a:extLst>
+          </p:cNvPr>
+          <p:cNvSpPr>
+            <a:spLocks noGrp="1"/>
+          </p:cNvSpPr>
+          <p:nvPr>
+            <p:ph type="title"/>
+          </p:nvPr>
+        </p:nvSpPr>
+        <p:spPr>
+          <a:xfrm>
+            <a:off x="913775" y="618518"/>
+            <a:ext cx="10364451" cy="1067670"/>
+          </a:xfrm>
+        </p:spPr>
+        <p:txBody>
+          <a:bodyPr>
+            <a:normAutofit/>
+          </a:bodyPr>
+          <a:lstStyle/>
+          <a:p>
+            <a:r>
+              <a:rPr lang="pt-BR" sz="4800" dirty="0" err="1"/>
+              <a:t>Css</a:t>
+            </a:r>
+            <a:r>
+              <a:rPr lang="pt-BR" sz="4800" dirty="0"/>
+              <a:t>: selecionando classes</a:t>
+            </a:r>
+          </a:p>
+        </p:txBody>
+      </p:sp>
+      <p:sp>
+        <p:nvSpPr>
+          <p:cNvPr id="3" name="Espaço Reservado para Conteúdo 2">
+            <a:extLst>
+              <a:ext uri="{FF2B5EF4-FFF2-40B4-BE49-F238E27FC236}">
+                <a16:creationId xmlns:a16="http://schemas.microsoft.com/office/drawing/2014/main" id="{2C18BE2C-D36D-EA9D-031D-5C5C54A848FC}"/>
+              </a:ext>
+            </a:extLst>
+          </p:cNvPr>
+          <p:cNvSpPr>
+            <a:spLocks noGrp="1"/>
+          </p:cNvSpPr>
+          <p:nvPr>
+            <p:ph sz="quarter" idx="13"/>
+          </p:nvPr>
+        </p:nvSpPr>
+        <p:spPr>
+          <a:xfrm>
+            <a:off x="2072080" y="2038524"/>
+            <a:ext cx="9205519" cy="4200957"/>
+          </a:xfrm>
+        </p:spPr>
+        <p:txBody>
+          <a:bodyPr>
+            <a:normAutofit/>
+          </a:bodyPr>
+          <a:lstStyle/>
+          <a:p>
+            <a:pPr marL="0" indent="0">
+              <a:lnSpc>
+                <a:spcPct val="100000"/>
+              </a:lnSpc>
+              <a:spcBef>
+                <a:spcPts val="0"/>
+              </a:spcBef>
+              <a:buNone/>
+            </a:pPr>
+            <a:r>
+              <a:rPr lang="pt-BR" sz="3200" cap="none" dirty="0"/>
+              <a:t>.</a:t>
+            </a:r>
+            <a:r>
+              <a:rPr lang="pt-BR" sz="3200" cap="none" dirty="0" err="1"/>
+              <a:t>yellow</a:t>
+            </a:r>
+            <a:r>
+              <a:rPr lang="pt-BR" sz="3200" cap="none" dirty="0"/>
+              <a:t>-box {</a:t>
+            </a:r>
+          </a:p>
+          <a:p>
+            <a:pPr marL="0" indent="0">
+              <a:lnSpc>
+                <a:spcPct val="100000"/>
+              </a:lnSpc>
+              <a:spcBef>
+                <a:spcPts val="0"/>
+              </a:spcBef>
+              <a:buNone/>
+            </a:pPr>
+            <a:r>
+              <a:rPr lang="pt-BR" sz="3200" cap="none" dirty="0"/>
+              <a:t>	</a:t>
+            </a:r>
+            <a:r>
+              <a:rPr lang="pt-BR" sz="3200" cap="none" dirty="0" err="1"/>
+              <a:t>padding</a:t>
+            </a:r>
+            <a:r>
+              <a:rPr lang="pt-BR" sz="3200" cap="none" dirty="0"/>
+              <a:t>: 10px;</a:t>
+            </a:r>
+          </a:p>
+          <a:p>
+            <a:pPr marL="0" indent="0">
+              <a:lnSpc>
+                <a:spcPct val="100000"/>
+              </a:lnSpc>
+              <a:spcBef>
+                <a:spcPts val="0"/>
+              </a:spcBef>
+              <a:buNone/>
+            </a:pPr>
+            <a:r>
+              <a:rPr lang="pt-BR" sz="3200" cap="none" dirty="0"/>
+              <a:t>	background: </a:t>
+            </a:r>
+            <a:r>
+              <a:rPr lang="pt-BR" sz="3200" cap="none" dirty="0" err="1"/>
+              <a:t>yellow</a:t>
+            </a:r>
+            <a:r>
+              <a:rPr lang="pt-BR" sz="3200" cap="none" dirty="0"/>
+              <a:t>;</a:t>
+            </a:r>
+          </a:p>
+          <a:p>
+            <a:pPr marL="0" indent="0">
+              <a:lnSpc>
+                <a:spcPct val="100000"/>
+              </a:lnSpc>
+              <a:spcBef>
+                <a:spcPts val="0"/>
+              </a:spcBef>
+              <a:buNone/>
+            </a:pPr>
+            <a:r>
+              <a:rPr lang="pt-BR" sz="3200" cap="none" dirty="0"/>
+              <a:t>	</a:t>
+            </a:r>
+            <a:r>
+              <a:rPr lang="pt-BR" sz="3200" cap="none" dirty="0" err="1"/>
+              <a:t>border</a:t>
+            </a:r>
+            <a:r>
+              <a:rPr lang="pt-BR" sz="3200" cap="none" dirty="0"/>
+              <a:t>: 1px </a:t>
+            </a:r>
+            <a:r>
+              <a:rPr lang="pt-BR" sz="3200" cap="none" dirty="0" err="1"/>
+              <a:t>solid</a:t>
+            </a:r>
+            <a:r>
+              <a:rPr lang="pt-BR" sz="3200" cap="none" dirty="0"/>
+              <a:t> #bbb;</a:t>
+            </a:r>
+          </a:p>
+          <a:p>
+            <a:pPr marL="0" indent="0">
+              <a:lnSpc>
+                <a:spcPct val="100000"/>
+              </a:lnSpc>
+              <a:spcBef>
+                <a:spcPts val="0"/>
+              </a:spcBef>
+              <a:buNone/>
+            </a:pPr>
+            <a:r>
+              <a:rPr lang="pt-BR" sz="3200" cap="none" dirty="0"/>
+              <a:t>	box-</a:t>
+            </a:r>
+            <a:r>
+              <a:rPr lang="pt-BR" sz="3200" cap="none" dirty="0" err="1"/>
+              <a:t>shadow</a:t>
+            </a:r>
+            <a:r>
+              <a:rPr lang="pt-BR" sz="3200" cap="none" dirty="0"/>
+              <a:t>: 1px </a:t>
+            </a:r>
+            <a:r>
+              <a:rPr lang="pt-BR" sz="3200" cap="none" dirty="0" err="1"/>
+              <a:t>1px</a:t>
+            </a:r>
+            <a:r>
+              <a:rPr lang="pt-BR" sz="3200" cap="none" dirty="0"/>
+              <a:t> </a:t>
+            </a:r>
+            <a:r>
+              <a:rPr lang="pt-BR" sz="3200" cap="none" dirty="0" err="1"/>
+              <a:t>black</a:t>
+            </a:r>
+            <a:r>
+              <a:rPr lang="pt-BR" sz="3200" cap="none" dirty="0"/>
+              <a:t>;</a:t>
+            </a:r>
+          </a:p>
+          <a:p>
+            <a:pPr marL="0" indent="0">
+              <a:lnSpc>
+                <a:spcPct val="100000"/>
+              </a:lnSpc>
+              <a:spcBef>
+                <a:spcPts val="0"/>
+              </a:spcBef>
+              <a:buNone/>
+            </a:pPr>
+            <a:r>
+              <a:rPr lang="pt-BR" sz="3200" cap="none" dirty="0"/>
+              <a:t>	</a:t>
+            </a:r>
+            <a:r>
+              <a:rPr lang="pt-BR" sz="3200" cap="none" dirty="0" err="1"/>
+              <a:t>border-radius</a:t>
+            </a:r>
+            <a:r>
+              <a:rPr lang="pt-BR" sz="3200" cap="none" dirty="0"/>
+              <a:t>: 8px;</a:t>
+            </a:r>
+          </a:p>
+          <a:p>
+            <a:pPr marL="0" indent="0">
+              <a:lnSpc>
+                <a:spcPct val="100000"/>
+              </a:lnSpc>
+              <a:spcBef>
+                <a:spcPts val="0"/>
+              </a:spcBef>
+              <a:buNone/>
+            </a:pPr>
+            <a:r>
+              <a:rPr lang="pt-BR" sz="3200" cap="none" dirty="0"/>
+              <a:t>}</a:t>
+            </a:r>
+          </a:p>
+          <a:p>
+            <a:endParaRPr lang="pt-BR" sz="3200" dirty="0"/>
+          </a:p>
+        </p:txBody>
+      </p:sp>
+    </p:spTree>
+    <p:extLst>
+      <p:ext uri="{BB962C8B-B14F-4D97-AF65-F5344CB8AC3E}">
+        <p14:creationId xmlns:p14="http://schemas.microsoft.com/office/powerpoint/2010/main" val="3429835554"/>
+      </p:ext>
+    </p:extLst>
+  </p:cSld>
+  <p:clrMapOvr>
+    <a:masterClrMapping/>
+  </p:clrMapOvr>
+</p:sld>
+</file>
+
+<file path=ppt/slides/slide12.xml><?xml version="1.0" encoding="utf-8"?>
+<p:sld xmlns:a="http://schemas.openxmlformats.org/drawingml/2006/main" xmlns:r="http://schemas.openxmlformats.org/officeDocument/2006/relationships" xmlns:p="http://schemas.openxmlformats.org/presentationml/2006/main">
+  <p:cSld>
+    <p:spTree>
+      <p:nvGrpSpPr>
+        <p:cNvPr id="1" name=""/>
+        <p:cNvGrpSpPr/>
+        <p:nvPr/>
+      </p:nvGrpSpPr>
+      <p:grpSpPr>
+        <a:xfrm>
+          <a:off x="0" y="0"/>
+          <a:ext cx="0" cy="0"/>
+          <a:chOff x="0" y="0"/>
+          <a:chExt cx="0" cy="0"/>
+        </a:xfrm>
+      </p:grpSpPr>
+      <p:sp>
+        <p:nvSpPr>
+          <p:cNvPr id="2" name="Título 1">
+            <a:extLst>
+              <a:ext uri="{FF2B5EF4-FFF2-40B4-BE49-F238E27FC236}">
+                <a16:creationId xmlns:a16="http://schemas.microsoft.com/office/drawing/2014/main" id="{9CEC5963-F278-AA5A-BD6D-D091F5B5F7EF}"/>
+              </a:ext>
+            </a:extLst>
+          </p:cNvPr>
+          <p:cNvSpPr>
+            <a:spLocks noGrp="1"/>
+          </p:cNvSpPr>
+          <p:nvPr>
+            <p:ph type="title"/>
+          </p:nvPr>
+        </p:nvSpPr>
+        <p:spPr>
+          <a:xfrm>
+            <a:off x="913775" y="618518"/>
+            <a:ext cx="10364451" cy="1067670"/>
+          </a:xfrm>
+        </p:spPr>
+        <p:txBody>
+          <a:bodyPr>
+            <a:normAutofit/>
+          </a:bodyPr>
+          <a:lstStyle/>
+          <a:p>
+            <a:r>
+              <a:rPr lang="pt-BR" sz="4800" dirty="0" err="1"/>
+              <a:t>Css</a:t>
+            </a:r>
+            <a:r>
+              <a:rPr lang="pt-BR" sz="4800" dirty="0"/>
+              <a:t>: selecionando id</a:t>
+            </a:r>
+            <a:r>
+              <a:rPr lang="pt-BR" sz="4800" cap="none" dirty="0"/>
+              <a:t>s</a:t>
+            </a:r>
+          </a:p>
+        </p:txBody>
+      </p:sp>
+      <p:sp>
+        <p:nvSpPr>
+          <p:cNvPr id="3" name="Espaço Reservado para Conteúdo 2">
+            <a:extLst>
+              <a:ext uri="{FF2B5EF4-FFF2-40B4-BE49-F238E27FC236}">
+                <a16:creationId xmlns:a16="http://schemas.microsoft.com/office/drawing/2014/main" id="{2C18BE2C-D36D-EA9D-031D-5C5C54A848FC}"/>
+              </a:ext>
+            </a:extLst>
+          </p:cNvPr>
+          <p:cNvSpPr>
+            <a:spLocks noGrp="1"/>
+          </p:cNvSpPr>
+          <p:nvPr>
+            <p:ph sz="quarter" idx="13"/>
+          </p:nvPr>
+        </p:nvSpPr>
+        <p:spPr>
+          <a:xfrm>
+            <a:off x="2072080" y="2038524"/>
+            <a:ext cx="9205519" cy="4555223"/>
+          </a:xfrm>
+        </p:spPr>
+        <p:txBody>
+          <a:bodyPr>
+            <a:normAutofit/>
+          </a:bodyPr>
+          <a:lstStyle/>
+          <a:p>
+            <a:pPr marL="0" indent="0">
+              <a:lnSpc>
+                <a:spcPct val="100000"/>
+              </a:lnSpc>
+              <a:spcBef>
+                <a:spcPts val="0"/>
+              </a:spcBef>
+              <a:buNone/>
+            </a:pPr>
+            <a:r>
+              <a:rPr lang="pt-BR" sz="3200" cap="none" dirty="0"/>
+              <a:t>#nav-bar {</a:t>
+            </a:r>
+          </a:p>
+          <a:p>
+            <a:pPr marL="0" indent="0">
+              <a:lnSpc>
+                <a:spcPct val="100000"/>
+              </a:lnSpc>
+              <a:spcBef>
+                <a:spcPts val="0"/>
+              </a:spcBef>
+              <a:buNone/>
+            </a:pPr>
+            <a:r>
+              <a:rPr lang="pt-BR" sz="3200" cap="none" dirty="0"/>
+              <a:t>	</a:t>
+            </a:r>
+            <a:r>
+              <a:rPr lang="en-US" sz="3200" cap="none" dirty="0"/>
+              <a:t>background: #5783eb;</a:t>
+            </a:r>
+          </a:p>
+          <a:p>
+            <a:pPr marL="0" indent="0">
+              <a:lnSpc>
+                <a:spcPct val="100000"/>
+              </a:lnSpc>
+              <a:spcBef>
+                <a:spcPts val="0"/>
+              </a:spcBef>
+              <a:buNone/>
+            </a:pPr>
+            <a:r>
+              <a:rPr lang="en-US" sz="3200" cap="none" dirty="0"/>
+              <a:t>	margin: 0px 20px;</a:t>
+            </a:r>
+            <a:endParaRPr lang="pt-BR" sz="3200" cap="none" dirty="0"/>
+          </a:p>
+          <a:p>
+            <a:pPr marL="0" indent="0">
+              <a:lnSpc>
+                <a:spcPct val="100000"/>
+              </a:lnSpc>
+              <a:spcBef>
+                <a:spcPts val="0"/>
+              </a:spcBef>
+              <a:buNone/>
+            </a:pPr>
+            <a:r>
+              <a:rPr lang="pt-BR" sz="3200" cap="none" dirty="0"/>
+              <a:t>	</a:t>
+            </a:r>
+            <a:r>
+              <a:rPr lang="pt-BR" sz="3200" cap="none" dirty="0" err="1"/>
+              <a:t>border-radius</a:t>
+            </a:r>
+            <a:r>
+              <a:rPr lang="pt-BR" sz="3200" cap="none" dirty="0"/>
+              <a:t>: 2px;</a:t>
+            </a:r>
+          </a:p>
+          <a:p>
+            <a:pPr marL="0" indent="0">
+              <a:lnSpc>
+                <a:spcPct val="100000"/>
+              </a:lnSpc>
+              <a:spcBef>
+                <a:spcPts val="0"/>
+              </a:spcBef>
+              <a:buNone/>
+            </a:pPr>
+            <a:r>
+              <a:rPr lang="pt-BR" sz="3200" cap="none" dirty="0"/>
+              <a:t>}</a:t>
+            </a:r>
+          </a:p>
+          <a:p>
+            <a:pPr marL="0" indent="0">
+              <a:lnSpc>
+                <a:spcPct val="100000"/>
+              </a:lnSpc>
+              <a:spcBef>
+                <a:spcPts val="0"/>
+              </a:spcBef>
+              <a:buNone/>
+            </a:pPr>
+            <a:endParaRPr lang="pt-BR" sz="3200" cap="none" dirty="0"/>
+          </a:p>
+          <a:p>
+            <a:pPr marL="0" indent="0">
+              <a:lnSpc>
+                <a:spcPct val="100000"/>
+              </a:lnSpc>
+              <a:spcBef>
+                <a:spcPts val="0"/>
+              </a:spcBef>
+              <a:buNone/>
+            </a:pPr>
+            <a:r>
+              <a:rPr lang="pt-BR" sz="3200" cap="none" dirty="0"/>
+              <a:t>#nav-bar </a:t>
+            </a:r>
+            <a:r>
+              <a:rPr lang="pt-BR" sz="3200" cap="none" dirty="0" err="1"/>
+              <a:t>ul</a:t>
+            </a:r>
+            <a:r>
+              <a:rPr lang="pt-BR" sz="3200" cap="none" dirty="0"/>
+              <a:t> {</a:t>
+            </a:r>
+          </a:p>
+          <a:p>
+            <a:pPr marL="0" indent="0">
+              <a:lnSpc>
+                <a:spcPct val="100000"/>
+              </a:lnSpc>
+              <a:spcBef>
+                <a:spcPts val="0"/>
+              </a:spcBef>
+              <a:buNone/>
+            </a:pPr>
+            <a:r>
+              <a:rPr lang="pt-BR" sz="3200" cap="none" dirty="0"/>
+              <a:t>	</a:t>
+            </a:r>
+            <a:r>
+              <a:rPr lang="pt-BR" sz="3200" cap="none" dirty="0" err="1"/>
+              <a:t>padding</a:t>
+            </a:r>
+            <a:r>
+              <a:rPr lang="pt-BR" sz="3200" cap="none" dirty="0"/>
+              <a:t>: 0px 25px;</a:t>
+            </a:r>
+          </a:p>
+          <a:p>
+            <a:pPr marL="0" indent="0">
+              <a:lnSpc>
+                <a:spcPct val="100000"/>
+              </a:lnSpc>
+              <a:spcBef>
+                <a:spcPts val="0"/>
+              </a:spcBef>
+              <a:buNone/>
+            </a:pPr>
+            <a:r>
+              <a:rPr lang="pt-BR" sz="3200" cap="none" dirty="0"/>
+              <a:t>}</a:t>
+            </a:r>
+            <a:endParaRPr lang="pt-BR" sz="3200" dirty="0"/>
+          </a:p>
+        </p:txBody>
+      </p:sp>
+    </p:spTree>
+    <p:extLst>
+      <p:ext uri="{BB962C8B-B14F-4D97-AF65-F5344CB8AC3E}">
+        <p14:creationId xmlns:p14="http://schemas.microsoft.com/office/powerpoint/2010/main" val="4028073862"/>
+      </p:ext>
+    </p:extLst>
+  </p:cSld>
+  <p:clrMapOvr>
+    <a:masterClrMapping/>
+  </p:clrMapOvr>
+</p:sld>
+</file>
+
+<file path=ppt/slides/slide13.xml><?xml version="1.0" encoding="utf-8"?>
+<p:sld xmlns:a="http://schemas.openxmlformats.org/drawingml/2006/main" xmlns:r="http://schemas.openxmlformats.org/officeDocument/2006/relationships" xmlns:p="http://schemas.openxmlformats.org/presentationml/2006/main">
+  <p:cSld>
+    <p:spTree>
+      <p:nvGrpSpPr>
+        <p:cNvPr id="1" name=""/>
+        <p:cNvGrpSpPr/>
+        <p:nvPr/>
+      </p:nvGrpSpPr>
+      <p:grpSpPr>
+        <a:xfrm>
+          <a:off x="0" y="0"/>
+          <a:ext cx="0" cy="0"/>
+          <a:chOff x="0" y="0"/>
+          <a:chExt cx="0" cy="0"/>
+        </a:xfrm>
+      </p:grpSpPr>
+      <p:sp>
+        <p:nvSpPr>
+          <p:cNvPr id="2" name="Título 1">
+            <a:extLst>
+              <a:ext uri="{FF2B5EF4-FFF2-40B4-BE49-F238E27FC236}">
+                <a16:creationId xmlns:a16="http://schemas.microsoft.com/office/drawing/2014/main" id="{9CEC5963-F278-AA5A-BD6D-D091F5B5F7EF}"/>
+              </a:ext>
+            </a:extLst>
+          </p:cNvPr>
+          <p:cNvSpPr>
+            <a:spLocks noGrp="1"/>
+          </p:cNvSpPr>
+          <p:nvPr>
+            <p:ph type="title"/>
+          </p:nvPr>
+        </p:nvSpPr>
+        <p:spPr>
+          <a:xfrm>
+            <a:off x="913775" y="618518"/>
+            <a:ext cx="10364451" cy="1067670"/>
+          </a:xfrm>
+        </p:spPr>
+        <p:txBody>
+          <a:bodyPr>
+            <a:normAutofit/>
+          </a:bodyPr>
+          <a:lstStyle/>
+          <a:p>
+            <a:r>
+              <a:rPr lang="pt-BR" sz="4800" dirty="0" err="1"/>
+              <a:t>Css</a:t>
+            </a:r>
+            <a:r>
+              <a:rPr lang="pt-BR" sz="4800" dirty="0"/>
+              <a:t>: selecionando estados</a:t>
+            </a:r>
+          </a:p>
+        </p:txBody>
+      </p:sp>
+      <p:sp>
+        <p:nvSpPr>
+          <p:cNvPr id="3" name="Espaço Reservado para Conteúdo 2">
+            <a:extLst>
+              <a:ext uri="{FF2B5EF4-FFF2-40B4-BE49-F238E27FC236}">
+                <a16:creationId xmlns:a16="http://schemas.microsoft.com/office/drawing/2014/main" id="{2C18BE2C-D36D-EA9D-031D-5C5C54A848FC}"/>
+              </a:ext>
+            </a:extLst>
+          </p:cNvPr>
+          <p:cNvSpPr>
+            <a:spLocks noGrp="1"/>
+          </p:cNvSpPr>
+          <p:nvPr>
+            <p:ph sz="quarter" idx="13"/>
+          </p:nvPr>
+        </p:nvSpPr>
+        <p:spPr>
+          <a:xfrm>
+            <a:off x="2072080" y="2038524"/>
+            <a:ext cx="9205519" cy="4200957"/>
+          </a:xfrm>
+        </p:spPr>
+        <p:txBody>
+          <a:bodyPr>
+            <a:normAutofit/>
+          </a:bodyPr>
+          <a:lstStyle/>
+          <a:p>
+            <a:pPr marL="0" indent="0">
+              <a:lnSpc>
+                <a:spcPct val="100000"/>
+              </a:lnSpc>
+              <a:spcBef>
+                <a:spcPts val="0"/>
+              </a:spcBef>
+              <a:buNone/>
+            </a:pPr>
+            <a:r>
+              <a:rPr lang="pt-BR" sz="3200" cap="none" dirty="0"/>
+              <a:t>.</a:t>
+            </a:r>
+            <a:r>
+              <a:rPr lang="pt-BR" sz="3200" cap="none" dirty="0" err="1"/>
+              <a:t>yellow-box:hover</a:t>
+            </a:r>
+            <a:r>
+              <a:rPr lang="pt-BR" sz="3200" cap="none" dirty="0"/>
+              <a:t> {</a:t>
+            </a:r>
+          </a:p>
+          <a:p>
+            <a:pPr marL="0" indent="0">
+              <a:lnSpc>
+                <a:spcPct val="100000"/>
+              </a:lnSpc>
+              <a:spcBef>
+                <a:spcPts val="0"/>
+              </a:spcBef>
+              <a:buNone/>
+            </a:pPr>
+            <a:r>
+              <a:rPr lang="pt-BR" sz="3200" cap="none" dirty="0"/>
+              <a:t>	background: </a:t>
+            </a:r>
+            <a:r>
+              <a:rPr lang="pt-BR" sz="3200" cap="none" dirty="0" err="1"/>
+              <a:t>orange</a:t>
+            </a:r>
+            <a:r>
+              <a:rPr lang="pt-BR" sz="3200" cap="none" dirty="0"/>
+              <a:t>;</a:t>
+            </a:r>
+          </a:p>
+          <a:p>
+            <a:pPr marL="0" indent="0">
+              <a:lnSpc>
+                <a:spcPct val="100000"/>
+              </a:lnSpc>
+              <a:spcBef>
+                <a:spcPts val="0"/>
+              </a:spcBef>
+              <a:buNone/>
+            </a:pPr>
+            <a:r>
+              <a:rPr lang="pt-BR" sz="3200" cap="none" dirty="0"/>
+              <a:t>}</a:t>
+            </a:r>
+          </a:p>
+          <a:p>
+            <a:pPr marL="0" indent="0">
+              <a:buNone/>
+            </a:pPr>
+            <a:endParaRPr lang="pt-BR" sz="3200" dirty="0"/>
+          </a:p>
+          <a:p>
+            <a:pPr marL="0" indent="0">
+              <a:lnSpc>
+                <a:spcPct val="100000"/>
+              </a:lnSpc>
+              <a:spcBef>
+                <a:spcPts val="0"/>
+              </a:spcBef>
+              <a:buNone/>
+            </a:pPr>
+            <a:r>
+              <a:rPr lang="pt-BR" sz="3200" cap="none" dirty="0"/>
+              <a:t>a:visited {</a:t>
+            </a:r>
+          </a:p>
+          <a:p>
+            <a:pPr marL="0" indent="0">
+              <a:lnSpc>
+                <a:spcPct val="100000"/>
+              </a:lnSpc>
+              <a:spcBef>
+                <a:spcPts val="0"/>
+              </a:spcBef>
+              <a:buNone/>
+            </a:pPr>
+            <a:r>
+              <a:rPr lang="pt-BR" sz="3200" cap="none" dirty="0"/>
+              <a:t> 	color: </a:t>
+            </a:r>
+            <a:r>
+              <a:rPr lang="pt-BR" sz="3200" cap="none" dirty="0" err="1"/>
+              <a:t>green</a:t>
+            </a:r>
+            <a:r>
+              <a:rPr lang="pt-BR" sz="3200" cap="none" dirty="0"/>
+              <a:t>;</a:t>
+            </a:r>
+          </a:p>
+          <a:p>
+            <a:pPr marL="0" indent="0">
+              <a:lnSpc>
+                <a:spcPct val="100000"/>
+              </a:lnSpc>
+              <a:spcBef>
+                <a:spcPts val="0"/>
+              </a:spcBef>
+              <a:buNone/>
+            </a:pPr>
+            <a:r>
+              <a:rPr lang="pt-BR" sz="3200" cap="none" dirty="0"/>
+              <a:t>}</a:t>
+            </a:r>
+          </a:p>
+        </p:txBody>
+      </p:sp>
+      <p:sp>
+        <p:nvSpPr>
+          <p:cNvPr id="4" name="Rectangle 1">
+            <a:extLst>
+              <a:ext uri="{FF2B5EF4-FFF2-40B4-BE49-F238E27FC236}">
+                <a16:creationId xmlns:a16="http://schemas.microsoft.com/office/drawing/2014/main" id="{C0093733-619E-4282-A743-4AB359C7C37D}"/>
+              </a:ext>
+            </a:extLst>
+          </p:cNvPr>
+          <p:cNvSpPr>
+            <a:spLocks noChangeArrowheads="1"/>
+          </p:cNvSpPr>
+          <p:nvPr/>
+        </p:nvSpPr>
+        <p:spPr bwMode="auto">
+          <a:xfrm>
+            <a:off x="0" y="0"/>
+            <a:ext cx="12192000" cy="457200"/>
+          </a:xfrm>
+          <a:prstGeom prst="rect">
+            <a:avLst/>
+          </a:prstGeom>
+          <a:noFill/>
+          <a:ln>
+            <a:noFill/>
+          </a:ln>
+          <a:effectLst/>
+          <a:extLst>
+            <a:ext uri="{909E8E84-426E-40DD-AFC4-6F175D3DCCD1}">
+              <a14:hiddenFill xmlns:a14="http://schemas.microsoft.com/office/drawing/2010/main">
+                <a:solidFill>
+                  <a:schemeClr val="accent1"/>
+                </a:solidFill>
+              </a14:hiddenFill>
+            </a:ext>
+            <a:ext uri="{91240B29-F687-4F45-9708-019B960494DF}">
+              <a14:hiddenLine xmlns:a14="http://schemas.microsoft.com/office/drawing/2010/main" w="9525">
+                <a:solidFill>
+                  <a:schemeClr val="tx1"/>
+                </a:solidFill>
+                <a:miter lim="800000"/>
+                <a:headEnd/>
+                <a:tailEnd/>
+              </a14:hiddenLine>
+            </a:ext>
+            <a:ext uri="{AF507438-7753-43E0-B8FC-AC1667EBCBE1}">
+              <a14:hiddenEffects xmlns:a14="http://schemas.microsoft.com/office/drawing/2010/main">
+                <a:effectLst>
+                  <a:outerShdw dist="35921" dir="2700000" algn="ctr" rotWithShape="0">
+                    <a:schemeClr val="bg2"/>
+                  </a:outerShdw>
+                </a:effectLst>
+              </a14:hiddenEffects>
+            </a:ext>
+          </a:extLst>
+        </p:spPr>
+        <p:txBody>
+          <a:bodyPr vert="horz" wrap="none" lIns="91440" tIns="45720" rIns="91440" bIns="45720" numCol="1" anchor="ctr" anchorCtr="0" compatLnSpc="1">
+            <a:prstTxWarp prst="textNoShape">
+              <a:avLst/>
+            </a:prstTxWarp>
+            <a:spAutoFit/>
+          </a:bodyPr>
+          <a:lstStyle/>
+          <a:p>
+            <a:pPr marL="0" marR="0" lvl="0" indent="0" algn="l" defTabSz="914400" rtl="0" eaLnBrk="0" fontAlgn="base" latinLnBrk="0" hangingPunct="0">
+              <a:lnSpc>
+                <a:spcPct val="100000"/>
+              </a:lnSpc>
+              <a:spcBef>
+                <a:spcPct val="0"/>
+              </a:spcBef>
+              <a:spcAft>
+                <a:spcPct val="0"/>
+              </a:spcAft>
+              <a:buClrTx/>
+              <a:buSzTx/>
+              <a:buFontTx/>
+              <a:buNone/>
+              <a:tabLst/>
+            </a:pPr>
+            <a:r>
+              <a:rPr kumimoji="0" lang="pt-BR" altLang="pt-BR" sz="1000" b="0" i="0" u="none" strike="noStrike" cap="none" normalizeH="0" baseline="0">
+                <a:ln>
+                  <a:noFill/>
+                </a:ln>
+                <a:solidFill>
+                  <a:schemeClr val="tx1"/>
+                </a:solidFill>
+                <a:effectLst/>
+                <a:latin typeface="Arial Unicode MS"/>
+              </a:rPr>
+              <a:t>a:visited { color: green; }</a:t>
+            </a:r>
+            <a:r>
+              <a:rPr kumimoji="0" lang="pt-BR" altLang="pt-BR" sz="800" b="0" i="0" u="none" strike="noStrike" cap="none" normalizeH="0" baseline="0">
+                <a:ln>
+                  <a:noFill/>
+                </a:ln>
+                <a:solidFill>
+                  <a:schemeClr val="tx1"/>
+                </a:solidFill>
+                <a:effectLst/>
+              </a:rPr>
+              <a:t> </a:t>
+            </a:r>
+            <a:endParaRPr kumimoji="0" lang="pt-BR" altLang="pt-BR" sz="1800" b="0" i="0" u="none" strike="noStrike" cap="none" normalizeH="0" baseline="0">
+              <a:ln>
+                <a:noFill/>
+              </a:ln>
+              <a:solidFill>
+                <a:schemeClr val="tx1"/>
+              </a:solidFill>
+              <a:effectLst/>
+              <a:latin typeface="Arial" panose="020B0604020202020204" pitchFamily="34" charset="0"/>
+            </a:endParaRPr>
+          </a:p>
+        </p:txBody>
+      </p:sp>
+      <p:sp>
+        <p:nvSpPr>
+          <p:cNvPr id="5" name="Rectangle 2">
+            <a:extLst>
+              <a:ext uri="{FF2B5EF4-FFF2-40B4-BE49-F238E27FC236}">
+                <a16:creationId xmlns:a16="http://schemas.microsoft.com/office/drawing/2014/main" id="{52392883-A808-D062-32A4-9F95E5AC893F}"/>
+              </a:ext>
+            </a:extLst>
+          </p:cNvPr>
+          <p:cNvSpPr>
+            <a:spLocks noChangeArrowheads="1"/>
+          </p:cNvSpPr>
+          <p:nvPr/>
+        </p:nvSpPr>
+        <p:spPr bwMode="auto">
+          <a:xfrm>
+            <a:off x="152400" y="152400"/>
+            <a:ext cx="12192000" cy="457200"/>
+          </a:xfrm>
+          <a:prstGeom prst="rect">
+            <a:avLst/>
+          </a:prstGeom>
+          <a:noFill/>
+          <a:ln>
+            <a:noFill/>
+          </a:ln>
+          <a:effectLst/>
+          <a:extLst>
+            <a:ext uri="{909E8E84-426E-40DD-AFC4-6F175D3DCCD1}">
+              <a14:hiddenFill xmlns:a14="http://schemas.microsoft.com/office/drawing/2010/main">
+                <a:solidFill>
+                  <a:schemeClr val="accent1"/>
+                </a:solidFill>
+              </a14:hiddenFill>
+            </a:ext>
+            <a:ext uri="{91240B29-F687-4F45-9708-019B960494DF}">
+              <a14:hiddenLine xmlns:a14="http://schemas.microsoft.com/office/drawing/2010/main" w="9525">
+                <a:solidFill>
+                  <a:schemeClr val="tx1"/>
+                </a:solidFill>
+                <a:miter lim="800000"/>
+                <a:headEnd/>
+                <a:tailEnd/>
+              </a14:hiddenLine>
+            </a:ext>
+            <a:ext uri="{AF507438-7753-43E0-B8FC-AC1667EBCBE1}">
+              <a14:hiddenEffects xmlns:a14="http://schemas.microsoft.com/office/drawing/2010/main">
+                <a:effectLst>
+                  <a:outerShdw dist="35921" dir="2700000" algn="ctr" rotWithShape="0">
+                    <a:schemeClr val="bg2"/>
+                  </a:outerShdw>
+                </a:effectLst>
+              </a14:hiddenEffects>
+            </a:ext>
+          </a:extLst>
+        </p:spPr>
+        <p:txBody>
+          <a:bodyPr vert="horz" wrap="none" lIns="91440" tIns="45720" rIns="91440" bIns="45720" numCol="1" anchor="ctr" anchorCtr="0" compatLnSpc="1">
+            <a:prstTxWarp prst="textNoShape">
+              <a:avLst/>
+            </a:prstTxWarp>
+            <a:spAutoFit/>
+          </a:bodyPr>
+          <a:lstStyle/>
+          <a:p>
+            <a:pPr marL="0" marR="0" lvl="0" indent="0" algn="l" defTabSz="914400" rtl="0" eaLnBrk="0" fontAlgn="base" latinLnBrk="0" hangingPunct="0">
+              <a:lnSpc>
+                <a:spcPct val="100000"/>
+              </a:lnSpc>
+              <a:spcBef>
+                <a:spcPct val="0"/>
+              </a:spcBef>
+              <a:spcAft>
+                <a:spcPct val="0"/>
+              </a:spcAft>
+              <a:buClrTx/>
+              <a:buSzTx/>
+              <a:buFontTx/>
+              <a:buNone/>
+              <a:tabLst/>
+            </a:pPr>
+            <a:r>
+              <a:rPr kumimoji="0" lang="pt-BR" altLang="pt-BR" sz="1000" b="0" i="0" u="none" strike="noStrike" cap="none" normalizeH="0" baseline="0">
+                <a:ln>
+                  <a:noFill/>
+                </a:ln>
+                <a:solidFill>
+                  <a:schemeClr val="tx1"/>
+                </a:solidFill>
+                <a:effectLst/>
+                <a:latin typeface="Arial Unicode MS"/>
+              </a:rPr>
+              <a:t>a:visited { color: green; }</a:t>
+            </a:r>
+            <a:r>
+              <a:rPr kumimoji="0" lang="pt-BR" altLang="pt-BR" sz="800" b="0" i="0" u="none" strike="noStrike" cap="none" normalizeH="0" baseline="0">
+                <a:ln>
+                  <a:noFill/>
+                </a:ln>
+                <a:solidFill>
+                  <a:schemeClr val="tx1"/>
+                </a:solidFill>
+                <a:effectLst/>
+              </a:rPr>
+              <a:t> </a:t>
+            </a:r>
+            <a:endParaRPr kumimoji="0" lang="pt-BR" altLang="pt-BR" sz="1800" b="0" i="0" u="none" strike="noStrike" cap="none" normalizeH="0" baseline="0">
+              <a:ln>
+                <a:noFill/>
+              </a:ln>
+              <a:solidFill>
+                <a:schemeClr val="tx1"/>
+              </a:solidFill>
+              <a:effectLst/>
+              <a:latin typeface="Arial" panose="020B0604020202020204" pitchFamily="34" charset="0"/>
+            </a:endParaRPr>
+          </a:p>
+        </p:txBody>
+      </p:sp>
+    </p:spTree>
+    <p:extLst>
+      <p:ext uri="{BB962C8B-B14F-4D97-AF65-F5344CB8AC3E}">
+        <p14:creationId xmlns:p14="http://schemas.microsoft.com/office/powerpoint/2010/main" val="1940746365"/>
+      </p:ext>
+    </p:extLst>
+  </p:cSld>
+  <p:clrMapOvr>
+    <a:masterClrMapping/>
+  </p:clrMapOvr>
+</p:sld>
+</file>
+
+<file path=ppt/slides/slide14.xml><?xml version="1.0" encoding="utf-8"?>
+<p:sld xmlns:a="http://schemas.openxmlformats.org/drawingml/2006/main" xmlns:r="http://schemas.openxmlformats.org/officeDocument/2006/relationships" xmlns:p="http://schemas.openxmlformats.org/presentationml/2006/main">
+  <p:cSld>
+    <p:spTree>
+      <p:nvGrpSpPr>
+        <p:cNvPr id="1" name=""/>
+        <p:cNvGrpSpPr/>
+        <p:nvPr/>
+      </p:nvGrpSpPr>
+      <p:grpSpPr>
+        <a:xfrm>
+          <a:off x="0" y="0"/>
+          <a:ext cx="0" cy="0"/>
+          <a:chOff x="0" y="0"/>
+          <a:chExt cx="0" cy="0"/>
+        </a:xfrm>
+      </p:grpSpPr>
+      <p:sp>
+        <p:nvSpPr>
+          <p:cNvPr id="2" name="Título 1">
+            <a:extLst>
+              <a:ext uri="{FF2B5EF4-FFF2-40B4-BE49-F238E27FC236}">
+                <a16:creationId xmlns:a16="http://schemas.microsoft.com/office/drawing/2014/main" id="{9CEC5963-F278-AA5A-BD6D-D091F5B5F7EF}"/>
+              </a:ext>
+            </a:extLst>
+          </p:cNvPr>
+          <p:cNvSpPr>
+            <a:spLocks noGrp="1"/>
+          </p:cNvSpPr>
+          <p:nvPr>
+            <p:ph type="title"/>
+          </p:nvPr>
+        </p:nvSpPr>
+        <p:spPr>
+          <a:xfrm>
+            <a:off x="913775" y="618518"/>
+            <a:ext cx="10364451" cy="1067670"/>
+          </a:xfrm>
+        </p:spPr>
+        <p:txBody>
+          <a:bodyPr>
+            <a:normAutofit/>
+          </a:bodyPr>
+          <a:lstStyle/>
+          <a:p>
+            <a:r>
+              <a:rPr lang="pt-BR" sz="4800" dirty="0" err="1"/>
+              <a:t>javascript</a:t>
+            </a:r>
+            <a:endParaRPr lang="pt-BR" sz="4800" dirty="0"/>
+          </a:p>
+        </p:txBody>
+      </p:sp>
+      <p:sp>
+        <p:nvSpPr>
+          <p:cNvPr id="3" name="Espaço Reservado para Conteúdo 2">
+            <a:extLst>
+              <a:ext uri="{FF2B5EF4-FFF2-40B4-BE49-F238E27FC236}">
+                <a16:creationId xmlns:a16="http://schemas.microsoft.com/office/drawing/2014/main" id="{2C18BE2C-D36D-EA9D-031D-5C5C54A848FC}"/>
+              </a:ext>
+            </a:extLst>
+          </p:cNvPr>
+          <p:cNvSpPr>
+            <a:spLocks noGrp="1"/>
+          </p:cNvSpPr>
+          <p:nvPr>
+            <p:ph sz="quarter" idx="13"/>
+          </p:nvPr>
+        </p:nvSpPr>
+        <p:spPr>
+          <a:xfrm>
+            <a:off x="2072080" y="2038524"/>
+            <a:ext cx="9205519" cy="4200957"/>
+          </a:xfrm>
+        </p:spPr>
+        <p:txBody>
+          <a:bodyPr>
+            <a:normAutofit/>
+          </a:bodyPr>
+          <a:lstStyle/>
+          <a:p>
+            <a:pPr>
+              <a:lnSpc>
+                <a:spcPct val="100000"/>
+              </a:lnSpc>
+              <a:spcBef>
+                <a:spcPts val="0"/>
+              </a:spcBef>
+            </a:pPr>
+            <a:r>
+              <a:rPr lang="pt-BR" sz="3200" dirty="0"/>
+              <a:t>Criado em 1995, POR Brendan Eich A </a:t>
+            </a:r>
+          </a:p>
+          <a:p>
+            <a:pPr marL="0" indent="0">
+              <a:lnSpc>
+                <a:spcPct val="100000"/>
+              </a:lnSpc>
+              <a:spcBef>
+                <a:spcPts val="0"/>
+              </a:spcBef>
+              <a:buNone/>
+            </a:pPr>
+            <a:r>
+              <a:rPr lang="pt-BR" sz="3200" dirty="0"/>
+              <a:t>serviço da </a:t>
+            </a:r>
+            <a:r>
+              <a:rPr lang="pt-BR" sz="3200" dirty="0" err="1"/>
+              <a:t>netscape</a:t>
+            </a:r>
+            <a:endParaRPr lang="pt-BR" sz="3200" dirty="0"/>
+          </a:p>
+          <a:p>
+            <a:r>
+              <a:rPr lang="pt-BR" sz="3200" dirty="0"/>
+              <a:t>Linguagem de programação</a:t>
+            </a:r>
+          </a:p>
+          <a:p>
+            <a:r>
+              <a:rPr lang="pt-BR" sz="3200" dirty="0"/>
+              <a:t>Renomeada em 1996 para </a:t>
+            </a:r>
+            <a:r>
+              <a:rPr lang="pt-BR" sz="3200" dirty="0" err="1"/>
+              <a:t>ECMAScript</a:t>
+            </a:r>
+            <a:endParaRPr lang="pt-BR" sz="3200" dirty="0"/>
+          </a:p>
+          <a:p>
+            <a:r>
+              <a:rPr lang="pt-BR" sz="3200" dirty="0"/>
+              <a:t>VERSÃO ATUAL </a:t>
+            </a:r>
+            <a:r>
+              <a:rPr lang="pt-BR" sz="3200" dirty="0" err="1"/>
+              <a:t>ECMAScript</a:t>
+            </a:r>
+            <a:r>
+              <a:rPr lang="pt-BR" sz="3200" dirty="0"/>
+              <a:t> 2022</a:t>
+            </a:r>
+          </a:p>
+          <a:p>
+            <a:endParaRPr lang="pt-BR" sz="3200" dirty="0"/>
+          </a:p>
+        </p:txBody>
+      </p:sp>
+    </p:spTree>
+    <p:extLst>
+      <p:ext uri="{BB962C8B-B14F-4D97-AF65-F5344CB8AC3E}">
+        <p14:creationId xmlns:p14="http://schemas.microsoft.com/office/powerpoint/2010/main" val="2663627898"/>
+      </p:ext>
+    </p:extLst>
+  </p:cSld>
+  <p:clrMapOvr>
+    <a:masterClrMapping/>
+  </p:clrMapOvr>
+</p:sld>
+</file>
+
+<file path=ppt/slides/slide15.xml><?xml version="1.0" encoding="utf-8"?>
+<p:sld xmlns:a="http://schemas.openxmlformats.org/drawingml/2006/main" xmlns:r="http://schemas.openxmlformats.org/officeDocument/2006/relationships" xmlns:p="http://schemas.openxmlformats.org/presentationml/2006/main">
+  <p:cSld>
+    <p:spTree>
+      <p:nvGrpSpPr>
+        <p:cNvPr id="1" name=""/>
+        <p:cNvGrpSpPr/>
+        <p:nvPr/>
+      </p:nvGrpSpPr>
+      <p:grpSpPr>
+        <a:xfrm>
+          <a:off x="0" y="0"/>
+          <a:ext cx="0" cy="0"/>
+          <a:chOff x="0" y="0"/>
+          <a:chExt cx="0" cy="0"/>
+        </a:xfrm>
+      </p:grpSpPr>
+      <p:sp>
+        <p:nvSpPr>
+          <p:cNvPr id="2" name="Título 1">
+            <a:extLst>
+              <a:ext uri="{FF2B5EF4-FFF2-40B4-BE49-F238E27FC236}">
+                <a16:creationId xmlns:a16="http://schemas.microsoft.com/office/drawing/2014/main" id="{9CEC5963-F278-AA5A-BD6D-D091F5B5F7EF}"/>
+              </a:ext>
+            </a:extLst>
+          </p:cNvPr>
+          <p:cNvSpPr>
+            <a:spLocks noGrp="1"/>
+          </p:cNvSpPr>
+          <p:nvPr>
+            <p:ph type="title"/>
+          </p:nvPr>
+        </p:nvSpPr>
+        <p:spPr>
+          <a:xfrm>
+            <a:off x="913775" y="618518"/>
+            <a:ext cx="10364451" cy="1067670"/>
+          </a:xfrm>
+        </p:spPr>
+        <p:txBody>
+          <a:bodyPr>
+            <a:normAutofit/>
+          </a:bodyPr>
+          <a:lstStyle/>
+          <a:p>
+            <a:r>
+              <a:rPr lang="pt-BR" sz="4800" dirty="0" err="1"/>
+              <a:t>Js</a:t>
+            </a:r>
+            <a:r>
+              <a:rPr lang="pt-BR" sz="4800" dirty="0"/>
+              <a:t>: variáveis</a:t>
+            </a:r>
+          </a:p>
+        </p:txBody>
+      </p:sp>
+      <p:sp>
+        <p:nvSpPr>
+          <p:cNvPr id="3" name="Espaço Reservado para Conteúdo 2">
+            <a:extLst>
+              <a:ext uri="{FF2B5EF4-FFF2-40B4-BE49-F238E27FC236}">
+                <a16:creationId xmlns:a16="http://schemas.microsoft.com/office/drawing/2014/main" id="{2C18BE2C-D36D-EA9D-031D-5C5C54A848FC}"/>
+              </a:ext>
+            </a:extLst>
+          </p:cNvPr>
+          <p:cNvSpPr>
+            <a:spLocks noGrp="1"/>
+          </p:cNvSpPr>
+          <p:nvPr>
+            <p:ph sz="quarter" idx="13"/>
+          </p:nvPr>
+        </p:nvSpPr>
+        <p:spPr>
+          <a:xfrm>
+            <a:off x="2072080" y="2038524"/>
+            <a:ext cx="9205519" cy="4200957"/>
+          </a:xfrm>
+        </p:spPr>
+        <p:txBody>
+          <a:bodyPr>
+            <a:normAutofit/>
+          </a:bodyPr>
+          <a:lstStyle/>
+          <a:p>
+            <a:pPr>
+              <a:lnSpc>
+                <a:spcPct val="100000"/>
+              </a:lnSpc>
+              <a:spcBef>
+                <a:spcPts val="1800"/>
+              </a:spcBef>
+            </a:pPr>
+            <a:r>
+              <a:rPr lang="pt-BR" sz="3200" dirty="0"/>
+              <a:t>As variáveis no </a:t>
+            </a:r>
+            <a:r>
+              <a:rPr lang="pt-BR" sz="3200" dirty="0" err="1"/>
+              <a:t>js</a:t>
+            </a:r>
+            <a:r>
+              <a:rPr lang="pt-BR" sz="3200" dirty="0"/>
+              <a:t> são case-</a:t>
+            </a:r>
+            <a:r>
+              <a:rPr lang="pt-BR" sz="3200" dirty="0" err="1"/>
+              <a:t>sensitive</a:t>
+            </a:r>
+            <a:endParaRPr lang="pt-BR" sz="3200" dirty="0"/>
+          </a:p>
+          <a:p>
+            <a:pPr>
+              <a:lnSpc>
+                <a:spcPct val="100000"/>
+              </a:lnSpc>
+              <a:spcBef>
+                <a:spcPts val="1800"/>
+              </a:spcBef>
+            </a:pPr>
+            <a:r>
+              <a:rPr lang="pt-BR" sz="3200" dirty="0"/>
+              <a:t>Utilizam conjunto de caracteres </a:t>
+            </a:r>
+            <a:r>
+              <a:rPr lang="pt-BR" sz="3200" dirty="0" err="1"/>
+              <a:t>unicode</a:t>
+            </a:r>
+            <a:endParaRPr lang="pt-BR" sz="3200" dirty="0"/>
+          </a:p>
+          <a:p>
+            <a:pPr>
+              <a:lnSpc>
+                <a:spcPct val="100000"/>
+              </a:lnSpc>
+              <a:spcBef>
+                <a:spcPts val="1800"/>
+              </a:spcBef>
+            </a:pPr>
+            <a:r>
+              <a:rPr lang="pt-BR" sz="3200" dirty="0"/>
+              <a:t>As variáveis não possuem tipo, ou melhor, aceitam qualquer tipo de valor</a:t>
+            </a:r>
+          </a:p>
+          <a:p>
+            <a:pPr>
+              <a:lnSpc>
+                <a:spcPct val="100000"/>
+              </a:lnSpc>
+              <a:spcBef>
+                <a:spcPts val="1800"/>
+              </a:spcBef>
+            </a:pPr>
+            <a:r>
+              <a:rPr lang="pt-BR" sz="3200" dirty="0"/>
+              <a:t>O valor inicial quando não especificado será </a:t>
+            </a:r>
+            <a:r>
+              <a:rPr lang="pt-BR" sz="3200" cap="none" dirty="0" err="1"/>
+              <a:t>undefined</a:t>
+            </a:r>
+            <a:endParaRPr lang="pt-BR" sz="3200" cap="none" dirty="0"/>
+          </a:p>
+          <a:p>
+            <a:endParaRPr lang="pt-BR" sz="3200" dirty="0"/>
+          </a:p>
+        </p:txBody>
+      </p:sp>
+    </p:spTree>
+    <p:extLst>
+      <p:ext uri="{BB962C8B-B14F-4D97-AF65-F5344CB8AC3E}">
+        <p14:creationId xmlns:p14="http://schemas.microsoft.com/office/powerpoint/2010/main" val="2813348449"/>
+      </p:ext>
+    </p:extLst>
+  </p:cSld>
+  <p:clrMapOvr>
+    <a:masterClrMapping/>
+  </p:clrMapOvr>
+</p:sld>
+</file>
+
+<file path=ppt/slides/slide16.xml><?xml version="1.0" encoding="utf-8"?>
+<p:sld xmlns:a="http://schemas.openxmlformats.org/drawingml/2006/main" xmlns:r="http://schemas.openxmlformats.org/officeDocument/2006/relationships" xmlns:p="http://schemas.openxmlformats.org/presentationml/2006/main">
+  <p:cSld>
+    <p:spTree>
+      <p:nvGrpSpPr>
+        <p:cNvPr id="1" name=""/>
+        <p:cNvGrpSpPr/>
+        <p:nvPr/>
+      </p:nvGrpSpPr>
+      <p:grpSpPr>
+        <a:xfrm>
+          <a:off x="0" y="0"/>
+          <a:ext cx="0" cy="0"/>
+          <a:chOff x="0" y="0"/>
+          <a:chExt cx="0" cy="0"/>
+        </a:xfrm>
+      </p:grpSpPr>
+      <p:sp>
+        <p:nvSpPr>
+          <p:cNvPr id="2" name="Título 1">
+            <a:extLst>
+              <a:ext uri="{FF2B5EF4-FFF2-40B4-BE49-F238E27FC236}">
+                <a16:creationId xmlns:a16="http://schemas.microsoft.com/office/drawing/2014/main" id="{9CEC5963-F278-AA5A-BD6D-D091F5B5F7EF}"/>
+              </a:ext>
+            </a:extLst>
+          </p:cNvPr>
+          <p:cNvSpPr>
+            <a:spLocks noGrp="1"/>
+          </p:cNvSpPr>
+          <p:nvPr>
+            <p:ph type="title"/>
+          </p:nvPr>
+        </p:nvSpPr>
+        <p:spPr>
+          <a:xfrm>
+            <a:off x="913775" y="618518"/>
+            <a:ext cx="10364451" cy="1067670"/>
+          </a:xfrm>
+        </p:spPr>
+        <p:txBody>
+          <a:bodyPr>
+            <a:normAutofit/>
+          </a:bodyPr>
+          <a:lstStyle/>
+          <a:p>
+            <a:r>
+              <a:rPr lang="pt-BR" sz="4800" dirty="0" err="1"/>
+              <a:t>Js</a:t>
+            </a:r>
+            <a:r>
+              <a:rPr lang="pt-BR" sz="4800" dirty="0"/>
+              <a:t>: tipos de dados</a:t>
+            </a:r>
+          </a:p>
+        </p:txBody>
+      </p:sp>
+      <p:sp>
+        <p:nvSpPr>
+          <p:cNvPr id="3" name="Espaço Reservado para Conteúdo 2">
+            <a:extLst>
+              <a:ext uri="{FF2B5EF4-FFF2-40B4-BE49-F238E27FC236}">
+                <a16:creationId xmlns:a16="http://schemas.microsoft.com/office/drawing/2014/main" id="{2C18BE2C-D36D-EA9D-031D-5C5C54A848FC}"/>
+              </a:ext>
+            </a:extLst>
+          </p:cNvPr>
+          <p:cNvSpPr>
+            <a:spLocks noGrp="1"/>
+          </p:cNvSpPr>
+          <p:nvPr>
+            <p:ph sz="quarter" idx="13"/>
+          </p:nvPr>
+        </p:nvSpPr>
+        <p:spPr>
+          <a:xfrm>
+            <a:off x="2072080" y="2038524"/>
+            <a:ext cx="9205519" cy="4278386"/>
+          </a:xfrm>
+        </p:spPr>
+        <p:txBody>
+          <a:bodyPr>
+            <a:normAutofit/>
+          </a:bodyPr>
+          <a:lstStyle/>
+          <a:p>
+            <a:pPr>
+              <a:lnSpc>
+                <a:spcPct val="100000"/>
+              </a:lnSpc>
+              <a:spcBef>
+                <a:spcPts val="0"/>
+              </a:spcBef>
+            </a:pPr>
+            <a:r>
+              <a:rPr lang="pt-BR" sz="3200" cap="none" dirty="0" err="1"/>
+              <a:t>Boolean</a:t>
+            </a:r>
+            <a:r>
+              <a:rPr lang="pt-BR" sz="3200" cap="none" dirty="0"/>
+              <a:t> (</a:t>
+            </a:r>
+            <a:r>
+              <a:rPr lang="pt-BR" sz="3200" cap="none" dirty="0" err="1"/>
+              <a:t>true</a:t>
+            </a:r>
+            <a:r>
+              <a:rPr lang="pt-BR" sz="3200" cap="none" dirty="0"/>
+              <a:t> e false)</a:t>
+            </a:r>
+          </a:p>
+          <a:p>
+            <a:pPr>
+              <a:lnSpc>
+                <a:spcPct val="100000"/>
+              </a:lnSpc>
+              <a:spcBef>
+                <a:spcPts val="0"/>
+              </a:spcBef>
+            </a:pPr>
+            <a:r>
+              <a:rPr lang="pt-BR" sz="3200" cap="none" dirty="0" err="1"/>
+              <a:t>null</a:t>
+            </a:r>
+            <a:r>
+              <a:rPr lang="pt-BR" sz="3200" cap="none" dirty="0"/>
+              <a:t> (Uma palavra-chave que indica valor nulo)</a:t>
+            </a:r>
+          </a:p>
+          <a:p>
+            <a:pPr>
+              <a:lnSpc>
+                <a:spcPct val="100000"/>
+              </a:lnSpc>
+              <a:spcBef>
+                <a:spcPts val="0"/>
+              </a:spcBef>
+            </a:pPr>
+            <a:r>
+              <a:rPr lang="pt-BR" sz="3200" cap="none" dirty="0" err="1"/>
+              <a:t>undefined</a:t>
+            </a:r>
+            <a:r>
+              <a:rPr lang="pt-BR" sz="3200" cap="none" dirty="0"/>
+              <a:t> (Uma </a:t>
+            </a:r>
+            <a:r>
+              <a:rPr lang="pt-BR" sz="3200" cap="none" dirty="0" err="1"/>
+              <a:t>propriedadecujo</a:t>
+            </a:r>
+            <a:r>
+              <a:rPr lang="pt-BR" sz="3200" cap="none" dirty="0"/>
+              <a:t> valor é indefinido)</a:t>
+            </a:r>
+          </a:p>
+          <a:p>
+            <a:pPr>
+              <a:lnSpc>
+                <a:spcPct val="100000"/>
+              </a:lnSpc>
+              <a:spcBef>
+                <a:spcPts val="0"/>
+              </a:spcBef>
+            </a:pPr>
+            <a:r>
+              <a:rPr lang="pt-BR" sz="3200" cap="none" dirty="0" err="1"/>
+              <a:t>Number</a:t>
+            </a:r>
+            <a:r>
+              <a:rPr lang="pt-BR" sz="3200" cap="none" dirty="0"/>
+              <a:t> (Números inteiros e decimais)</a:t>
+            </a:r>
+          </a:p>
+          <a:p>
+            <a:pPr>
+              <a:lnSpc>
+                <a:spcPct val="100000"/>
+              </a:lnSpc>
+              <a:spcBef>
+                <a:spcPts val="0"/>
+              </a:spcBef>
+            </a:pPr>
+            <a:r>
+              <a:rPr lang="pt-BR" sz="3200" cap="none" dirty="0" err="1"/>
+              <a:t>String</a:t>
+            </a:r>
+            <a:r>
+              <a:rPr lang="pt-BR" sz="3200" cap="none" dirty="0"/>
+              <a:t> (Texto)</a:t>
+            </a:r>
+          </a:p>
+          <a:p>
+            <a:pPr>
+              <a:lnSpc>
+                <a:spcPct val="100000"/>
+              </a:lnSpc>
+              <a:spcBef>
+                <a:spcPts val="0"/>
+              </a:spcBef>
+            </a:pPr>
+            <a:r>
+              <a:rPr lang="pt-BR" sz="3200" cap="none" dirty="0" err="1"/>
+              <a:t>Symbol</a:t>
+            </a:r>
+            <a:r>
+              <a:rPr lang="pt-BR" sz="3200" cap="none" dirty="0"/>
+              <a:t> (Um tipo de dado cuja as instâncias são únicas e imutáveis)</a:t>
+            </a:r>
+          </a:p>
+          <a:p>
+            <a:pPr>
+              <a:lnSpc>
+                <a:spcPct val="100000"/>
+              </a:lnSpc>
+              <a:spcBef>
+                <a:spcPts val="0"/>
+              </a:spcBef>
+            </a:pPr>
+            <a:r>
+              <a:rPr lang="pt-BR" sz="3200" cap="none" dirty="0" err="1"/>
+              <a:t>Object</a:t>
+            </a:r>
+            <a:r>
+              <a:rPr lang="pt-BR" sz="3200" cap="none" dirty="0"/>
+              <a:t> (Objetos)</a:t>
+            </a:r>
+          </a:p>
+        </p:txBody>
+      </p:sp>
+    </p:spTree>
+    <p:extLst>
+      <p:ext uri="{BB962C8B-B14F-4D97-AF65-F5344CB8AC3E}">
+        <p14:creationId xmlns:p14="http://schemas.microsoft.com/office/powerpoint/2010/main" val="3034660445"/>
+      </p:ext>
+    </p:extLst>
+  </p:cSld>
+  <p:clrMapOvr>
+    <a:masterClrMapping/>
+  </p:clrMapOvr>
+</p:sld>
+</file>
+
+<file path=ppt/slides/slide17.xml><?xml version="1.0" encoding="utf-8"?>
+<p:sld xmlns:a="http://schemas.openxmlformats.org/drawingml/2006/main" xmlns:r="http://schemas.openxmlformats.org/officeDocument/2006/relationships" xmlns:p="http://schemas.openxmlformats.org/presentationml/2006/main">
+  <p:cSld>
+    <p:spTree>
+      <p:nvGrpSpPr>
+        <p:cNvPr id="1" name=""/>
+        <p:cNvGrpSpPr/>
+        <p:nvPr/>
+      </p:nvGrpSpPr>
+      <p:grpSpPr>
+        <a:xfrm>
+          <a:off x="0" y="0"/>
+          <a:ext cx="0" cy="0"/>
+          <a:chOff x="0" y="0"/>
+          <a:chExt cx="0" cy="0"/>
+        </a:xfrm>
+      </p:grpSpPr>
+      <p:sp>
+        <p:nvSpPr>
+          <p:cNvPr id="2" name="Título 1">
+            <a:extLst>
+              <a:ext uri="{FF2B5EF4-FFF2-40B4-BE49-F238E27FC236}">
+                <a16:creationId xmlns:a16="http://schemas.microsoft.com/office/drawing/2014/main" id="{9CEC5963-F278-AA5A-BD6D-D091F5B5F7EF}"/>
+              </a:ext>
+            </a:extLst>
+          </p:cNvPr>
+          <p:cNvSpPr>
+            <a:spLocks noGrp="1"/>
+          </p:cNvSpPr>
+          <p:nvPr>
+            <p:ph type="title"/>
+          </p:nvPr>
+        </p:nvSpPr>
+        <p:spPr>
+          <a:xfrm>
+            <a:off x="913775" y="618518"/>
+            <a:ext cx="10364451" cy="1067670"/>
+          </a:xfrm>
+        </p:spPr>
+        <p:txBody>
+          <a:bodyPr>
+            <a:normAutofit/>
+          </a:bodyPr>
+          <a:lstStyle/>
+          <a:p>
+            <a:r>
+              <a:rPr lang="pt-BR" sz="4800" dirty="0" err="1"/>
+              <a:t>Js</a:t>
+            </a:r>
+            <a:r>
+              <a:rPr lang="pt-BR" sz="4800" dirty="0"/>
+              <a:t>: declarando variáveis</a:t>
+            </a:r>
+          </a:p>
+        </p:txBody>
+      </p:sp>
+      <p:sp>
+        <p:nvSpPr>
+          <p:cNvPr id="3" name="Espaço Reservado para Conteúdo 2">
+            <a:extLst>
+              <a:ext uri="{FF2B5EF4-FFF2-40B4-BE49-F238E27FC236}">
+                <a16:creationId xmlns:a16="http://schemas.microsoft.com/office/drawing/2014/main" id="{2C18BE2C-D36D-EA9D-031D-5C5C54A848FC}"/>
+              </a:ext>
+            </a:extLst>
+          </p:cNvPr>
+          <p:cNvSpPr>
+            <a:spLocks noGrp="1"/>
+          </p:cNvSpPr>
+          <p:nvPr>
+            <p:ph sz="quarter" idx="13"/>
+          </p:nvPr>
+        </p:nvSpPr>
+        <p:spPr>
+          <a:xfrm>
+            <a:off x="2072080" y="2038524"/>
+            <a:ext cx="9205519" cy="4278386"/>
+          </a:xfrm>
+        </p:spPr>
+        <p:txBody>
+          <a:bodyPr>
+            <a:normAutofit/>
+          </a:bodyPr>
+          <a:lstStyle/>
+          <a:p>
+            <a:pPr>
+              <a:lnSpc>
+                <a:spcPct val="100000"/>
+              </a:lnSpc>
+              <a:spcBef>
+                <a:spcPts val="0"/>
+              </a:spcBef>
+            </a:pPr>
+            <a:r>
+              <a:rPr lang="pt-BR" sz="3200" cap="none" dirty="0"/>
+              <a:t>Através do ‘var’. Pode ser uma variável tanto local quanto global. </a:t>
+            </a:r>
+            <a:r>
+              <a:rPr lang="pt-BR" sz="3200" cap="none" dirty="0" err="1"/>
+              <a:t>Ex</a:t>
+            </a:r>
+            <a:r>
+              <a:rPr lang="pt-BR" sz="3200" cap="none" dirty="0"/>
+              <a:t>: </a:t>
+            </a:r>
+            <a:r>
+              <a:rPr lang="pt-BR" sz="3200" cap="none" dirty="0">
+                <a:highlight>
+                  <a:srgbClr val="C0C0C0"/>
+                </a:highlight>
+              </a:rPr>
+              <a:t>var número = 50;</a:t>
+            </a:r>
+          </a:p>
+          <a:p>
+            <a:pPr>
+              <a:lnSpc>
+                <a:spcPct val="100000"/>
+              </a:lnSpc>
+            </a:pPr>
+            <a:r>
+              <a:rPr lang="pt-BR" sz="3200" cap="none" dirty="0"/>
+              <a:t>Através do ‘</a:t>
+            </a:r>
+            <a:r>
+              <a:rPr lang="pt-BR" sz="3200" cap="none" dirty="0" err="1"/>
+              <a:t>let</a:t>
+            </a:r>
+            <a:r>
+              <a:rPr lang="pt-BR" sz="3200" cap="none" dirty="0"/>
+              <a:t>’. Usada para declarar variáveis de escopo de bloco. </a:t>
+            </a:r>
+            <a:r>
+              <a:rPr lang="pt-BR" sz="3200" cap="none" dirty="0" err="1"/>
+              <a:t>Ex</a:t>
+            </a:r>
+            <a:r>
+              <a:rPr lang="pt-BR" sz="3200" cap="none" dirty="0"/>
+              <a:t>: </a:t>
+            </a:r>
+            <a:r>
+              <a:rPr lang="pt-BR" sz="3200" cap="none" dirty="0" err="1">
+                <a:highlight>
+                  <a:srgbClr val="C0C0C0"/>
+                </a:highlight>
+              </a:rPr>
+              <a:t>if</a:t>
+            </a:r>
+            <a:r>
+              <a:rPr lang="pt-BR" sz="3200" cap="none" dirty="0">
+                <a:highlight>
+                  <a:srgbClr val="C0C0C0"/>
+                </a:highlight>
+              </a:rPr>
+              <a:t> (</a:t>
+            </a:r>
+            <a:r>
+              <a:rPr lang="pt-BR" sz="3200" cap="none" dirty="0" err="1">
+                <a:highlight>
+                  <a:srgbClr val="C0C0C0"/>
+                </a:highlight>
+              </a:rPr>
+              <a:t>isTrue</a:t>
+            </a:r>
+            <a:r>
+              <a:rPr lang="pt-BR" sz="3200" cap="none" dirty="0">
+                <a:highlight>
+                  <a:srgbClr val="C0C0C0"/>
+                </a:highlight>
+              </a:rPr>
+              <a:t>) { </a:t>
+            </a:r>
+            <a:r>
+              <a:rPr lang="pt-BR" sz="3200" cap="none" dirty="0" err="1">
+                <a:highlight>
+                  <a:srgbClr val="C0C0C0"/>
+                </a:highlight>
+              </a:rPr>
+              <a:t>let</a:t>
+            </a:r>
+            <a:r>
+              <a:rPr lang="pt-BR" sz="3200" cap="none" dirty="0">
+                <a:highlight>
+                  <a:srgbClr val="C0C0C0"/>
+                </a:highlight>
+              </a:rPr>
+              <a:t> número = 19.5; };</a:t>
+            </a:r>
+            <a:r>
+              <a:rPr lang="pt-BR" sz="3200" cap="none" dirty="0"/>
+              <a:t> ou </a:t>
+            </a:r>
+            <a:r>
+              <a:rPr lang="pt-BR" sz="3200" cap="none" dirty="0">
+                <a:highlight>
+                  <a:srgbClr val="C0C0C0"/>
+                </a:highlight>
+              </a:rPr>
+              <a:t>for ( </a:t>
+            </a:r>
+            <a:r>
+              <a:rPr lang="pt-BR" sz="3200" cap="none" dirty="0" err="1">
+                <a:highlight>
+                  <a:srgbClr val="C0C0C0"/>
+                </a:highlight>
+              </a:rPr>
+              <a:t>let</a:t>
+            </a:r>
+            <a:r>
+              <a:rPr lang="pt-BR" sz="3200" cap="none" dirty="0">
+                <a:highlight>
+                  <a:srgbClr val="C0C0C0"/>
+                </a:highlight>
+              </a:rPr>
+              <a:t> i = 0, i &lt; 10, i++) {...};</a:t>
+            </a:r>
+          </a:p>
+          <a:p>
+            <a:pPr>
+              <a:lnSpc>
+                <a:spcPct val="100000"/>
+              </a:lnSpc>
+            </a:pPr>
+            <a:r>
+              <a:rPr lang="pt-BR" sz="3200" cap="none" dirty="0"/>
+              <a:t>Por simples adição do valor. </a:t>
+            </a:r>
+            <a:r>
+              <a:rPr lang="pt-BR" sz="3200" cap="none" dirty="0" err="1"/>
+              <a:t>Ex</a:t>
+            </a:r>
+            <a:r>
+              <a:rPr lang="pt-BR" sz="3200" cap="none" dirty="0"/>
+              <a:t>: </a:t>
+            </a:r>
+            <a:r>
+              <a:rPr lang="pt-BR" sz="3200" cap="none" dirty="0">
+                <a:highlight>
+                  <a:srgbClr val="C0C0C0"/>
+                </a:highlight>
+              </a:rPr>
+              <a:t>nome = “João”;</a:t>
+            </a:r>
+            <a:r>
+              <a:rPr lang="pt-BR" sz="3200" cap="none" dirty="0"/>
+              <a:t> Isso declara uma variável global e por boas práticas não deve ser utilizado.</a:t>
+            </a:r>
+          </a:p>
+        </p:txBody>
+      </p:sp>
+    </p:spTree>
+    <p:extLst>
+      <p:ext uri="{BB962C8B-B14F-4D97-AF65-F5344CB8AC3E}">
+        <p14:creationId xmlns:p14="http://schemas.microsoft.com/office/powerpoint/2010/main" val="2257170603"/>
+      </p:ext>
+    </p:extLst>
+  </p:cSld>
+  <p:clrMapOvr>
+    <a:masterClrMapping/>
+  </p:clrMapOvr>
+</p:sld>
+</file>
+
+<file path=ppt/slides/slide18.xml><?xml version="1.0" encoding="utf-8"?>
+<p:sld xmlns:a="http://schemas.openxmlformats.org/drawingml/2006/main" xmlns:r="http://schemas.openxmlformats.org/officeDocument/2006/relationships" xmlns:p="http://schemas.openxmlformats.org/presentationml/2006/main">
+  <p:cSld>
+    <p:spTree>
+      <p:nvGrpSpPr>
+        <p:cNvPr id="1" name=""/>
+        <p:cNvGrpSpPr/>
+        <p:nvPr/>
+      </p:nvGrpSpPr>
+      <p:grpSpPr>
+        <a:xfrm>
+          <a:off x="0" y="0"/>
+          <a:ext cx="0" cy="0"/>
+          <a:chOff x="0" y="0"/>
+          <a:chExt cx="0" cy="0"/>
+        </a:xfrm>
+      </p:grpSpPr>
+      <p:sp>
+        <p:nvSpPr>
+          <p:cNvPr id="2" name="Título 1">
+            <a:extLst>
+              <a:ext uri="{FF2B5EF4-FFF2-40B4-BE49-F238E27FC236}">
+                <a16:creationId xmlns:a16="http://schemas.microsoft.com/office/drawing/2014/main" id="{9CEC5963-F278-AA5A-BD6D-D091F5B5F7EF}"/>
+              </a:ext>
+            </a:extLst>
+          </p:cNvPr>
+          <p:cNvSpPr>
+            <a:spLocks noGrp="1"/>
+          </p:cNvSpPr>
+          <p:nvPr>
+            <p:ph type="title"/>
+          </p:nvPr>
+        </p:nvSpPr>
+        <p:spPr>
+          <a:xfrm>
+            <a:off x="913775" y="618518"/>
+            <a:ext cx="10364451" cy="1067670"/>
+          </a:xfrm>
+        </p:spPr>
+        <p:txBody>
+          <a:bodyPr>
+            <a:normAutofit/>
+          </a:bodyPr>
+          <a:lstStyle/>
+          <a:p>
+            <a:r>
+              <a:rPr lang="pt-BR" sz="4800" dirty="0" err="1"/>
+              <a:t>Js</a:t>
+            </a:r>
+            <a:r>
+              <a:rPr lang="pt-BR" sz="4800" dirty="0"/>
+              <a:t>: constantes</a:t>
+            </a:r>
+          </a:p>
+        </p:txBody>
+      </p:sp>
+      <p:sp>
+        <p:nvSpPr>
+          <p:cNvPr id="3" name="Espaço Reservado para Conteúdo 2">
+            <a:extLst>
+              <a:ext uri="{FF2B5EF4-FFF2-40B4-BE49-F238E27FC236}">
+                <a16:creationId xmlns:a16="http://schemas.microsoft.com/office/drawing/2014/main" id="{2C18BE2C-D36D-EA9D-031D-5C5C54A848FC}"/>
+              </a:ext>
+            </a:extLst>
+          </p:cNvPr>
+          <p:cNvSpPr>
+            <a:spLocks noGrp="1"/>
+          </p:cNvSpPr>
+          <p:nvPr>
+            <p:ph sz="quarter" idx="13"/>
+          </p:nvPr>
+        </p:nvSpPr>
+        <p:spPr>
+          <a:xfrm>
+            <a:off x="2072080" y="2038524"/>
+            <a:ext cx="9205519" cy="4278386"/>
+          </a:xfrm>
+        </p:spPr>
+        <p:txBody>
+          <a:bodyPr>
+            <a:normAutofit/>
+          </a:bodyPr>
+          <a:lstStyle/>
+          <a:p>
+            <a:pPr>
+              <a:lnSpc>
+                <a:spcPct val="100000"/>
+              </a:lnSpc>
+              <a:spcBef>
+                <a:spcPts val="1200"/>
+              </a:spcBef>
+            </a:pPr>
+            <a:r>
+              <a:rPr lang="pt-BR" sz="3200" dirty="0"/>
+              <a:t>não podem alterar seu valor por meio de uma atribuição</a:t>
+            </a:r>
+          </a:p>
+          <a:p>
+            <a:pPr>
+              <a:lnSpc>
+                <a:spcPct val="100000"/>
+              </a:lnSpc>
+              <a:spcBef>
+                <a:spcPts val="1200"/>
+              </a:spcBef>
+            </a:pPr>
+            <a:r>
+              <a:rPr lang="pt-BR" sz="3200" dirty="0"/>
+              <a:t>Não podem ser declarada novamente enquanto o script está em execução</a:t>
+            </a:r>
+          </a:p>
+          <a:p>
+            <a:pPr>
+              <a:lnSpc>
+                <a:spcPct val="100000"/>
+              </a:lnSpc>
+              <a:spcBef>
+                <a:spcPts val="1200"/>
+              </a:spcBef>
+            </a:pPr>
+            <a:r>
+              <a:rPr lang="pt-BR" sz="3200" dirty="0"/>
+              <a:t>Deve ser inicializada com um valor.</a:t>
+            </a:r>
+          </a:p>
+          <a:p>
+            <a:pPr>
+              <a:lnSpc>
+                <a:spcPct val="100000"/>
+              </a:lnSpc>
+              <a:spcBef>
+                <a:spcPts val="1200"/>
+              </a:spcBef>
+            </a:pPr>
+            <a:r>
+              <a:rPr lang="pt-BR" sz="3200" dirty="0"/>
+              <a:t>Exemplo de declaração. </a:t>
+            </a:r>
+            <a:r>
+              <a:rPr lang="pt-BR" sz="3200" cap="none" dirty="0" err="1">
+                <a:highlight>
+                  <a:srgbClr val="C0C0C0"/>
+                </a:highlight>
+              </a:rPr>
+              <a:t>const</a:t>
+            </a:r>
+            <a:r>
+              <a:rPr lang="pt-BR" sz="3200" cap="none" dirty="0">
+                <a:highlight>
+                  <a:srgbClr val="C0C0C0"/>
+                </a:highlight>
+              </a:rPr>
+              <a:t> PI = 3.14;</a:t>
+            </a:r>
+          </a:p>
+          <a:p>
+            <a:pPr>
+              <a:lnSpc>
+                <a:spcPct val="100000"/>
+              </a:lnSpc>
+              <a:spcBef>
+                <a:spcPts val="1200"/>
+              </a:spcBef>
+            </a:pPr>
+            <a:endParaRPr lang="pt-BR" sz="3200" dirty="0"/>
+          </a:p>
+        </p:txBody>
+      </p:sp>
+    </p:spTree>
+    <p:extLst>
+      <p:ext uri="{BB962C8B-B14F-4D97-AF65-F5344CB8AC3E}">
+        <p14:creationId xmlns:p14="http://schemas.microsoft.com/office/powerpoint/2010/main" val="21185226"/>
+      </p:ext>
+    </p:extLst>
+  </p:cSld>
+  <p:clrMapOvr>
+    <a:masterClrMapping/>
+  </p:clrMapOvr>
+</p:sld>
+</file>
+
+<file path=ppt/slides/slide19.xml><?xml version="1.0" encoding="utf-8"?>
+<p:sld xmlns:a="http://schemas.openxmlformats.org/drawingml/2006/main" xmlns:r="http://schemas.openxmlformats.org/officeDocument/2006/relationships" xmlns:p="http://schemas.openxmlformats.org/presentationml/2006/main">
+  <p:cSld>
+    <p:spTree>
+      <p:nvGrpSpPr>
+        <p:cNvPr id="1" name=""/>
+        <p:cNvGrpSpPr/>
+        <p:nvPr/>
+      </p:nvGrpSpPr>
+      <p:grpSpPr>
+        <a:xfrm>
+          <a:off x="0" y="0"/>
+          <a:ext cx="0" cy="0"/>
+          <a:chOff x="0" y="0"/>
+          <a:chExt cx="0" cy="0"/>
+        </a:xfrm>
+      </p:grpSpPr>
+      <p:sp>
+        <p:nvSpPr>
+          <p:cNvPr id="2" name="Título 1">
+            <a:extLst>
+              <a:ext uri="{FF2B5EF4-FFF2-40B4-BE49-F238E27FC236}">
+                <a16:creationId xmlns:a16="http://schemas.microsoft.com/office/drawing/2014/main" id="{9CEC5963-F278-AA5A-BD6D-D091F5B5F7EF}"/>
+              </a:ext>
+            </a:extLst>
+          </p:cNvPr>
+          <p:cNvSpPr>
+            <a:spLocks noGrp="1"/>
+          </p:cNvSpPr>
+          <p:nvPr>
+            <p:ph type="title"/>
+          </p:nvPr>
+        </p:nvSpPr>
+        <p:spPr>
+          <a:xfrm>
+            <a:off x="913775" y="618518"/>
+            <a:ext cx="10364451" cy="1067670"/>
+          </a:xfrm>
+        </p:spPr>
+        <p:txBody>
+          <a:bodyPr>
+            <a:normAutofit/>
+          </a:bodyPr>
+          <a:lstStyle/>
+          <a:p>
+            <a:r>
+              <a:rPr lang="pt-BR" sz="4800" dirty="0" err="1"/>
+              <a:t>Js</a:t>
+            </a:r>
+            <a:r>
+              <a:rPr lang="pt-BR" sz="4800" dirty="0"/>
+              <a:t>: </a:t>
+            </a:r>
+            <a:r>
+              <a:rPr lang="pt-BR" sz="4800" dirty="0" err="1"/>
+              <a:t>arrays</a:t>
+            </a:r>
+            <a:endParaRPr lang="pt-BR" sz="4800" dirty="0"/>
+          </a:p>
+        </p:txBody>
+      </p:sp>
+      <p:sp>
+        <p:nvSpPr>
+          <p:cNvPr id="3" name="Espaço Reservado para Conteúdo 2">
+            <a:extLst>
+              <a:ext uri="{FF2B5EF4-FFF2-40B4-BE49-F238E27FC236}">
+                <a16:creationId xmlns:a16="http://schemas.microsoft.com/office/drawing/2014/main" id="{2C18BE2C-D36D-EA9D-031D-5C5C54A848FC}"/>
+              </a:ext>
+            </a:extLst>
+          </p:cNvPr>
+          <p:cNvSpPr>
+            <a:spLocks noGrp="1"/>
+          </p:cNvSpPr>
+          <p:nvPr>
+            <p:ph sz="quarter" idx="13"/>
+          </p:nvPr>
+        </p:nvSpPr>
+        <p:spPr>
+          <a:xfrm>
+            <a:off x="2072080" y="2038524"/>
+            <a:ext cx="9205519" cy="4278386"/>
+          </a:xfrm>
+        </p:spPr>
+        <p:txBody>
+          <a:bodyPr>
+            <a:normAutofit/>
+          </a:bodyPr>
+          <a:lstStyle/>
+          <a:p>
+            <a:pPr marL="0" indent="0">
+              <a:lnSpc>
+                <a:spcPct val="100000"/>
+              </a:lnSpc>
+              <a:spcBef>
+                <a:spcPts val="0"/>
+              </a:spcBef>
+              <a:buNone/>
+            </a:pPr>
+            <a:r>
+              <a:rPr lang="pt-BR" sz="3200" cap="none" dirty="0"/>
+              <a:t>var nomes = new </a:t>
+            </a:r>
+            <a:r>
+              <a:rPr lang="pt-BR" sz="3200" cap="none" dirty="0" err="1"/>
+              <a:t>Array</a:t>
+            </a:r>
+            <a:r>
+              <a:rPr lang="pt-BR" sz="3200" cap="none" dirty="0"/>
+              <a:t>(“Maria”, “Bruno”, 54);</a:t>
+            </a:r>
+          </a:p>
+          <a:p>
+            <a:pPr marL="0" indent="0">
+              <a:lnSpc>
+                <a:spcPct val="100000"/>
+              </a:lnSpc>
+              <a:spcBef>
+                <a:spcPts val="0"/>
+              </a:spcBef>
+              <a:buNone/>
+            </a:pPr>
+            <a:r>
+              <a:rPr lang="pt-BR" sz="3200" cap="none" dirty="0"/>
+              <a:t>OU var nomes = [“Maria”, “Bruno”, 54];</a:t>
+            </a:r>
+          </a:p>
+          <a:p>
+            <a:pPr marL="0" indent="0">
+              <a:lnSpc>
+                <a:spcPct val="100000"/>
+              </a:lnSpc>
+              <a:spcBef>
+                <a:spcPts val="1800"/>
+              </a:spcBef>
+              <a:buNone/>
+            </a:pPr>
+            <a:r>
+              <a:rPr lang="pt-BR" sz="3200" cap="none" dirty="0"/>
+              <a:t>nomes[0] // retorna “Maria”</a:t>
+            </a:r>
+          </a:p>
+          <a:p>
+            <a:pPr marL="0" indent="0">
+              <a:lnSpc>
+                <a:spcPct val="100000"/>
+              </a:lnSpc>
+              <a:spcBef>
+                <a:spcPts val="1800"/>
+              </a:spcBef>
+              <a:buNone/>
+            </a:pPr>
+            <a:r>
+              <a:rPr lang="pt-BR" sz="3200" cap="none" dirty="0"/>
+              <a:t>nomes[4] = “João” // insere “João” em nomes[4] e ‘</a:t>
+            </a:r>
+            <a:r>
+              <a:rPr lang="pt-BR" sz="3200" cap="none" dirty="0" err="1"/>
+              <a:t>undefined</a:t>
+            </a:r>
+            <a:r>
+              <a:rPr lang="pt-BR" sz="3200" cap="none" dirty="0"/>
+              <a:t>’ em nomes[3]</a:t>
+            </a:r>
+          </a:p>
+          <a:p>
+            <a:pPr marL="0" indent="0">
+              <a:lnSpc>
+                <a:spcPct val="100000"/>
+              </a:lnSpc>
+              <a:spcBef>
+                <a:spcPts val="1800"/>
+              </a:spcBef>
+              <a:buNone/>
+            </a:pPr>
+            <a:r>
+              <a:rPr lang="pt-BR" sz="3200" cap="none" dirty="0" err="1"/>
+              <a:t>nomes.push</a:t>
+            </a:r>
+            <a:r>
+              <a:rPr lang="pt-BR" sz="3200" cap="none" dirty="0"/>
+              <a:t>(“Ana”) // insere “Ana” em nomes[5]</a:t>
+            </a:r>
+          </a:p>
+        </p:txBody>
+      </p:sp>
+    </p:spTree>
+    <p:extLst>
+      <p:ext uri="{BB962C8B-B14F-4D97-AF65-F5344CB8AC3E}">
+        <p14:creationId xmlns:p14="http://schemas.microsoft.com/office/powerpoint/2010/main" val="2738119805"/>
+      </p:ext>
+    </p:extLst>
+  </p:cSld>
+  <p:clrMapOvr>
+    <a:masterClrMapping/>
+  </p:clrMapOvr>
+</p:sld>
+</file>
+
 <file path=ppt/slides/slide2.xml><?xml version="1.0" encoding="utf-8"?>
 <p:sld xmlns:a="http://schemas.openxmlformats.org/drawingml/2006/main" xmlns:r="http://schemas.openxmlformats.org/officeDocument/2006/relationships" xmlns:p="http://schemas.openxmlformats.org/presentationml/2006/main">
   <p:cSld>
@@ -6382,6 +8858,1004 @@
     <p:extLst>
       <p:ext uri="{BB962C8B-B14F-4D97-AF65-F5344CB8AC3E}">
         <p14:creationId xmlns:p14="http://schemas.microsoft.com/office/powerpoint/2010/main" val="3653109930"/>
+      </p:ext>
+    </p:extLst>
+  </p:cSld>
+  <p:clrMapOvr>
+    <a:masterClrMapping/>
+  </p:clrMapOvr>
+</p:sld>
+</file>
+
+<file path=ppt/slides/slide20.xml><?xml version="1.0" encoding="utf-8"?>
+<p:sld xmlns:a="http://schemas.openxmlformats.org/drawingml/2006/main" xmlns:r="http://schemas.openxmlformats.org/officeDocument/2006/relationships" xmlns:p="http://schemas.openxmlformats.org/presentationml/2006/main">
+  <p:cSld>
+    <p:spTree>
+      <p:nvGrpSpPr>
+        <p:cNvPr id="1" name=""/>
+        <p:cNvGrpSpPr/>
+        <p:nvPr/>
+      </p:nvGrpSpPr>
+      <p:grpSpPr>
+        <a:xfrm>
+          <a:off x="0" y="0"/>
+          <a:ext cx="0" cy="0"/>
+          <a:chOff x="0" y="0"/>
+          <a:chExt cx="0" cy="0"/>
+        </a:xfrm>
+      </p:grpSpPr>
+      <p:sp>
+        <p:nvSpPr>
+          <p:cNvPr id="2" name="Título 1">
+            <a:extLst>
+              <a:ext uri="{FF2B5EF4-FFF2-40B4-BE49-F238E27FC236}">
+                <a16:creationId xmlns:a16="http://schemas.microsoft.com/office/drawing/2014/main" id="{9CEC5963-F278-AA5A-BD6D-D091F5B5F7EF}"/>
+              </a:ext>
+            </a:extLst>
+          </p:cNvPr>
+          <p:cNvSpPr>
+            <a:spLocks noGrp="1"/>
+          </p:cNvSpPr>
+          <p:nvPr>
+            <p:ph type="title"/>
+          </p:nvPr>
+        </p:nvSpPr>
+        <p:spPr>
+          <a:xfrm>
+            <a:off x="913775" y="618518"/>
+            <a:ext cx="10364451" cy="1067670"/>
+          </a:xfrm>
+        </p:spPr>
+        <p:txBody>
+          <a:bodyPr>
+            <a:normAutofit/>
+          </a:bodyPr>
+          <a:lstStyle/>
+          <a:p>
+            <a:r>
+              <a:rPr lang="pt-BR" sz="4800" dirty="0" err="1"/>
+              <a:t>Js</a:t>
+            </a:r>
+            <a:r>
+              <a:rPr lang="pt-BR" sz="4800" dirty="0"/>
+              <a:t>: declarando funções</a:t>
+            </a:r>
+          </a:p>
+        </p:txBody>
+      </p:sp>
+      <p:sp>
+        <p:nvSpPr>
+          <p:cNvPr id="3" name="Espaço Reservado para Conteúdo 2">
+            <a:extLst>
+              <a:ext uri="{FF2B5EF4-FFF2-40B4-BE49-F238E27FC236}">
+                <a16:creationId xmlns:a16="http://schemas.microsoft.com/office/drawing/2014/main" id="{2C18BE2C-D36D-EA9D-031D-5C5C54A848FC}"/>
+              </a:ext>
+            </a:extLst>
+          </p:cNvPr>
+          <p:cNvSpPr>
+            <a:spLocks noGrp="1"/>
+          </p:cNvSpPr>
+          <p:nvPr>
+            <p:ph sz="quarter" idx="13"/>
+          </p:nvPr>
+        </p:nvSpPr>
+        <p:spPr>
+          <a:xfrm>
+            <a:off x="2072080" y="2038523"/>
+            <a:ext cx="9205519" cy="4471333"/>
+          </a:xfrm>
+        </p:spPr>
+        <p:txBody>
+          <a:bodyPr>
+            <a:normAutofit/>
+          </a:bodyPr>
+          <a:lstStyle/>
+          <a:p>
+            <a:pPr marL="0" indent="0">
+              <a:lnSpc>
+                <a:spcPct val="100000"/>
+              </a:lnSpc>
+              <a:spcBef>
+                <a:spcPts val="0"/>
+              </a:spcBef>
+              <a:buNone/>
+            </a:pPr>
+            <a:r>
+              <a:rPr lang="pt-BR" sz="3200" cap="none" dirty="0" err="1"/>
+              <a:t>function</a:t>
+            </a:r>
+            <a:r>
+              <a:rPr lang="pt-BR" sz="3200" cap="none" dirty="0"/>
+              <a:t> somar(a, b) {</a:t>
+            </a:r>
+          </a:p>
+          <a:p>
+            <a:pPr marL="0" indent="0">
+              <a:lnSpc>
+                <a:spcPct val="100000"/>
+              </a:lnSpc>
+              <a:spcBef>
+                <a:spcPts val="0"/>
+              </a:spcBef>
+              <a:buNone/>
+            </a:pPr>
+            <a:r>
+              <a:rPr lang="pt-BR" sz="3200" cap="none" dirty="0"/>
+              <a:t>	</a:t>
+            </a:r>
+            <a:r>
+              <a:rPr lang="pt-BR" sz="3200" cap="none" dirty="0" err="1"/>
+              <a:t>return</a:t>
+            </a:r>
+            <a:r>
+              <a:rPr lang="pt-BR" sz="3200" cap="none" dirty="0"/>
+              <a:t> a + b;</a:t>
+            </a:r>
+          </a:p>
+          <a:p>
+            <a:pPr marL="0" indent="0">
+              <a:lnSpc>
+                <a:spcPct val="100000"/>
+              </a:lnSpc>
+              <a:spcBef>
+                <a:spcPts val="0"/>
+              </a:spcBef>
+              <a:buNone/>
+            </a:pPr>
+            <a:r>
+              <a:rPr lang="pt-BR" sz="3200" cap="none" dirty="0"/>
+              <a:t>};</a:t>
+            </a:r>
+          </a:p>
+          <a:p>
+            <a:pPr marL="0" indent="0">
+              <a:lnSpc>
+                <a:spcPct val="100000"/>
+              </a:lnSpc>
+              <a:spcBef>
+                <a:spcPts val="0"/>
+              </a:spcBef>
+              <a:buNone/>
+            </a:pPr>
+            <a:endParaRPr lang="pt-BR" sz="3200" cap="none" dirty="0"/>
+          </a:p>
+          <a:p>
+            <a:pPr marL="0" indent="0">
+              <a:lnSpc>
+                <a:spcPct val="100000"/>
+              </a:lnSpc>
+              <a:spcBef>
+                <a:spcPts val="0"/>
+              </a:spcBef>
+              <a:buNone/>
+            </a:pPr>
+            <a:r>
+              <a:rPr lang="pt-BR" sz="3200" cap="none" dirty="0"/>
+              <a:t>var </a:t>
+            </a:r>
+            <a:r>
+              <a:rPr lang="pt-BR" sz="3200" cap="none" dirty="0" err="1"/>
+              <a:t>minhaFunção</a:t>
+            </a:r>
+            <a:r>
+              <a:rPr lang="pt-BR" sz="3200" cap="none" dirty="0"/>
+              <a:t> = </a:t>
+            </a:r>
+            <a:r>
+              <a:rPr lang="pt-BR" sz="3200" cap="none" dirty="0" err="1"/>
+              <a:t>function</a:t>
+            </a:r>
+            <a:r>
+              <a:rPr lang="pt-BR" sz="3200" cap="none" dirty="0"/>
+              <a:t>(nome) {</a:t>
+            </a:r>
+          </a:p>
+          <a:p>
+            <a:pPr marL="0" indent="0">
+              <a:lnSpc>
+                <a:spcPct val="100000"/>
+              </a:lnSpc>
+              <a:spcBef>
+                <a:spcPts val="0"/>
+              </a:spcBef>
+              <a:buNone/>
+            </a:pPr>
+            <a:r>
+              <a:rPr lang="pt-BR" sz="3200" cap="none" dirty="0"/>
+              <a:t>	console.log(“Olá, ” + nome);</a:t>
+            </a:r>
+          </a:p>
+          <a:p>
+            <a:pPr marL="0" indent="0">
+              <a:lnSpc>
+                <a:spcPct val="100000"/>
+              </a:lnSpc>
+              <a:spcBef>
+                <a:spcPts val="0"/>
+              </a:spcBef>
+              <a:buNone/>
+            </a:pPr>
+            <a:r>
+              <a:rPr lang="pt-BR" sz="3200" cap="none" dirty="0"/>
+              <a:t>}</a:t>
+            </a:r>
+          </a:p>
+        </p:txBody>
+      </p:sp>
+    </p:spTree>
+    <p:extLst>
+      <p:ext uri="{BB962C8B-B14F-4D97-AF65-F5344CB8AC3E}">
+        <p14:creationId xmlns:p14="http://schemas.microsoft.com/office/powerpoint/2010/main" val="1260522875"/>
+      </p:ext>
+    </p:extLst>
+  </p:cSld>
+  <p:clrMapOvr>
+    <a:masterClrMapping/>
+  </p:clrMapOvr>
+</p:sld>
+</file>
+
+<file path=ppt/slides/slide21.xml><?xml version="1.0" encoding="utf-8"?>
+<p:sld xmlns:a="http://schemas.openxmlformats.org/drawingml/2006/main" xmlns:r="http://schemas.openxmlformats.org/officeDocument/2006/relationships" xmlns:p="http://schemas.openxmlformats.org/presentationml/2006/main">
+  <p:cSld>
+    <p:spTree>
+      <p:nvGrpSpPr>
+        <p:cNvPr id="1" name=""/>
+        <p:cNvGrpSpPr/>
+        <p:nvPr/>
+      </p:nvGrpSpPr>
+      <p:grpSpPr>
+        <a:xfrm>
+          <a:off x="0" y="0"/>
+          <a:ext cx="0" cy="0"/>
+          <a:chOff x="0" y="0"/>
+          <a:chExt cx="0" cy="0"/>
+        </a:xfrm>
+      </p:grpSpPr>
+      <p:sp>
+        <p:nvSpPr>
+          <p:cNvPr id="2" name="Título 1">
+            <a:extLst>
+              <a:ext uri="{FF2B5EF4-FFF2-40B4-BE49-F238E27FC236}">
+                <a16:creationId xmlns:a16="http://schemas.microsoft.com/office/drawing/2014/main" id="{9CEC5963-F278-AA5A-BD6D-D091F5B5F7EF}"/>
+              </a:ext>
+            </a:extLst>
+          </p:cNvPr>
+          <p:cNvSpPr>
+            <a:spLocks noGrp="1"/>
+          </p:cNvSpPr>
+          <p:nvPr>
+            <p:ph type="title"/>
+          </p:nvPr>
+        </p:nvSpPr>
+        <p:spPr>
+          <a:xfrm>
+            <a:off x="913775" y="618518"/>
+            <a:ext cx="10364451" cy="1067670"/>
+          </a:xfrm>
+        </p:spPr>
+        <p:txBody>
+          <a:bodyPr>
+            <a:normAutofit/>
+          </a:bodyPr>
+          <a:lstStyle/>
+          <a:p>
+            <a:r>
+              <a:rPr lang="pt-BR" sz="4800" dirty="0" err="1"/>
+              <a:t>Js</a:t>
+            </a:r>
+            <a:r>
+              <a:rPr lang="pt-BR" sz="4800" dirty="0"/>
+              <a:t>: chamando funções</a:t>
+            </a:r>
+          </a:p>
+        </p:txBody>
+      </p:sp>
+      <p:sp>
+        <p:nvSpPr>
+          <p:cNvPr id="3" name="Espaço Reservado para Conteúdo 2">
+            <a:extLst>
+              <a:ext uri="{FF2B5EF4-FFF2-40B4-BE49-F238E27FC236}">
+                <a16:creationId xmlns:a16="http://schemas.microsoft.com/office/drawing/2014/main" id="{2C18BE2C-D36D-EA9D-031D-5C5C54A848FC}"/>
+              </a:ext>
+            </a:extLst>
+          </p:cNvPr>
+          <p:cNvSpPr>
+            <a:spLocks noGrp="1"/>
+          </p:cNvSpPr>
+          <p:nvPr>
+            <p:ph sz="quarter" idx="13"/>
+          </p:nvPr>
+        </p:nvSpPr>
+        <p:spPr>
+          <a:xfrm>
+            <a:off x="2072080" y="2038523"/>
+            <a:ext cx="9205519" cy="4471333"/>
+          </a:xfrm>
+        </p:spPr>
+        <p:txBody>
+          <a:bodyPr>
+            <a:normAutofit/>
+          </a:bodyPr>
+          <a:lstStyle/>
+          <a:p>
+            <a:pPr marL="0" indent="0">
+              <a:lnSpc>
+                <a:spcPct val="100000"/>
+              </a:lnSpc>
+              <a:spcBef>
+                <a:spcPts val="1200"/>
+              </a:spcBef>
+              <a:buNone/>
+            </a:pPr>
+            <a:endParaRPr lang="pt-BR" sz="3200" cap="none" dirty="0"/>
+          </a:p>
+          <a:p>
+            <a:pPr marL="0" indent="0">
+              <a:lnSpc>
+                <a:spcPct val="100000"/>
+              </a:lnSpc>
+              <a:spcBef>
+                <a:spcPts val="1200"/>
+              </a:spcBef>
+              <a:buNone/>
+            </a:pPr>
+            <a:r>
+              <a:rPr lang="pt-BR" sz="3200" cap="none" dirty="0"/>
+              <a:t>somar(50, 20);</a:t>
+            </a:r>
+          </a:p>
+          <a:p>
+            <a:pPr marL="0" indent="0">
+              <a:lnSpc>
+                <a:spcPct val="100000"/>
+              </a:lnSpc>
+              <a:spcBef>
+                <a:spcPts val="1200"/>
+              </a:spcBef>
+              <a:buNone/>
+            </a:pPr>
+            <a:endParaRPr lang="pt-BR" sz="3200" cap="none" dirty="0"/>
+          </a:p>
+          <a:p>
+            <a:pPr marL="0" indent="0">
+              <a:lnSpc>
+                <a:spcPct val="100000"/>
+              </a:lnSpc>
+              <a:spcBef>
+                <a:spcPts val="1200"/>
+              </a:spcBef>
+              <a:buNone/>
+            </a:pPr>
+            <a:r>
+              <a:rPr lang="pt-BR" sz="3200" cap="none" dirty="0" err="1"/>
+              <a:t>minhaFunção</a:t>
+            </a:r>
+            <a:r>
+              <a:rPr lang="pt-BR" sz="3200" cap="none" dirty="0"/>
+              <a:t>(“Fulano”);</a:t>
+            </a:r>
+          </a:p>
+        </p:txBody>
+      </p:sp>
+    </p:spTree>
+    <p:extLst>
+      <p:ext uri="{BB962C8B-B14F-4D97-AF65-F5344CB8AC3E}">
+        <p14:creationId xmlns:p14="http://schemas.microsoft.com/office/powerpoint/2010/main" val="3250882497"/>
+      </p:ext>
+    </p:extLst>
+  </p:cSld>
+  <p:clrMapOvr>
+    <a:masterClrMapping/>
+  </p:clrMapOvr>
+</p:sld>
+</file>
+
+<file path=ppt/slides/slide22.xml><?xml version="1.0" encoding="utf-8"?>
+<p:sld xmlns:a="http://schemas.openxmlformats.org/drawingml/2006/main" xmlns:r="http://schemas.openxmlformats.org/officeDocument/2006/relationships" xmlns:p="http://schemas.openxmlformats.org/presentationml/2006/main">
+  <p:cSld>
+    <p:spTree>
+      <p:nvGrpSpPr>
+        <p:cNvPr id="1" name=""/>
+        <p:cNvGrpSpPr/>
+        <p:nvPr/>
+      </p:nvGrpSpPr>
+      <p:grpSpPr>
+        <a:xfrm>
+          <a:off x="0" y="0"/>
+          <a:ext cx="0" cy="0"/>
+          <a:chOff x="0" y="0"/>
+          <a:chExt cx="0" cy="0"/>
+        </a:xfrm>
+      </p:grpSpPr>
+      <p:sp>
+        <p:nvSpPr>
+          <p:cNvPr id="2" name="Título 1">
+            <a:extLst>
+              <a:ext uri="{FF2B5EF4-FFF2-40B4-BE49-F238E27FC236}">
+                <a16:creationId xmlns:a16="http://schemas.microsoft.com/office/drawing/2014/main" id="{9CEC5963-F278-AA5A-BD6D-D091F5B5F7EF}"/>
+              </a:ext>
+            </a:extLst>
+          </p:cNvPr>
+          <p:cNvSpPr>
+            <a:spLocks noGrp="1"/>
+          </p:cNvSpPr>
+          <p:nvPr>
+            <p:ph type="title"/>
+          </p:nvPr>
+        </p:nvSpPr>
+        <p:spPr>
+          <a:xfrm>
+            <a:off x="913775" y="618518"/>
+            <a:ext cx="10364451" cy="1067670"/>
+          </a:xfrm>
+        </p:spPr>
+        <p:txBody>
+          <a:bodyPr>
+            <a:normAutofit/>
+          </a:bodyPr>
+          <a:lstStyle/>
+          <a:p>
+            <a:r>
+              <a:rPr lang="pt-BR" sz="4800" dirty="0" err="1"/>
+              <a:t>Js</a:t>
+            </a:r>
+            <a:r>
+              <a:rPr lang="pt-BR" sz="4800" dirty="0"/>
+              <a:t>: objetos</a:t>
+            </a:r>
+          </a:p>
+        </p:txBody>
+      </p:sp>
+      <p:sp>
+        <p:nvSpPr>
+          <p:cNvPr id="3" name="Espaço Reservado para Conteúdo 2">
+            <a:extLst>
+              <a:ext uri="{FF2B5EF4-FFF2-40B4-BE49-F238E27FC236}">
+                <a16:creationId xmlns:a16="http://schemas.microsoft.com/office/drawing/2014/main" id="{2C18BE2C-D36D-EA9D-031D-5C5C54A848FC}"/>
+              </a:ext>
+            </a:extLst>
+          </p:cNvPr>
+          <p:cNvSpPr>
+            <a:spLocks noGrp="1"/>
+          </p:cNvSpPr>
+          <p:nvPr>
+            <p:ph sz="quarter" idx="13"/>
+          </p:nvPr>
+        </p:nvSpPr>
+        <p:spPr>
+          <a:xfrm>
+            <a:off x="2072080" y="2038523"/>
+            <a:ext cx="9205519" cy="4471333"/>
+          </a:xfrm>
+        </p:spPr>
+        <p:txBody>
+          <a:bodyPr>
+            <a:normAutofit/>
+          </a:bodyPr>
+          <a:lstStyle/>
+          <a:p>
+            <a:pPr marL="0" indent="0">
+              <a:lnSpc>
+                <a:spcPct val="100000"/>
+              </a:lnSpc>
+              <a:spcBef>
+                <a:spcPts val="600"/>
+              </a:spcBef>
+              <a:buNone/>
+            </a:pPr>
+            <a:r>
+              <a:rPr lang="pt-BR" sz="3200" cap="none" dirty="0"/>
+              <a:t>var pessoa = {</a:t>
+            </a:r>
+          </a:p>
+          <a:p>
+            <a:pPr marL="0" indent="0">
+              <a:lnSpc>
+                <a:spcPct val="100000"/>
+              </a:lnSpc>
+              <a:spcBef>
+                <a:spcPts val="600"/>
+              </a:spcBef>
+              <a:buNone/>
+            </a:pPr>
+            <a:r>
+              <a:rPr lang="pt-BR" sz="3200" cap="none" dirty="0"/>
+              <a:t>	nome: “Érica”,</a:t>
+            </a:r>
+          </a:p>
+          <a:p>
+            <a:pPr marL="0" indent="0">
+              <a:lnSpc>
+                <a:spcPct val="100000"/>
+              </a:lnSpc>
+              <a:spcBef>
+                <a:spcPts val="600"/>
+              </a:spcBef>
+              <a:buNone/>
+            </a:pPr>
+            <a:r>
+              <a:rPr lang="pt-BR" sz="3200" cap="none" dirty="0"/>
+              <a:t>	idade: 23,</a:t>
+            </a:r>
+          </a:p>
+          <a:p>
+            <a:pPr marL="0" indent="0">
+              <a:lnSpc>
+                <a:spcPct val="100000"/>
+              </a:lnSpc>
+              <a:spcBef>
+                <a:spcPts val="600"/>
+              </a:spcBef>
+              <a:buNone/>
+            </a:pPr>
+            <a:r>
+              <a:rPr lang="pt-BR" sz="3200" cap="none" dirty="0"/>
+              <a:t>	</a:t>
+            </a:r>
+            <a:r>
+              <a:rPr lang="pt-BR" sz="3200" cap="none" dirty="0" err="1"/>
+              <a:t>info</a:t>
+            </a:r>
+            <a:r>
+              <a:rPr lang="pt-BR" sz="3200" cap="none" dirty="0"/>
+              <a:t>: </a:t>
+            </a:r>
+            <a:r>
+              <a:rPr lang="pt-BR" sz="3200" cap="none" dirty="0" err="1"/>
+              <a:t>function</a:t>
+            </a:r>
+            <a:r>
+              <a:rPr lang="pt-BR" sz="3200" cap="none" dirty="0"/>
+              <a:t>() {</a:t>
+            </a:r>
+          </a:p>
+          <a:p>
+            <a:pPr marL="0" indent="0">
+              <a:lnSpc>
+                <a:spcPct val="100000"/>
+              </a:lnSpc>
+              <a:spcBef>
+                <a:spcPts val="600"/>
+              </a:spcBef>
+              <a:buNone/>
+            </a:pPr>
+            <a:r>
+              <a:rPr lang="pt-BR" sz="3200" cap="none" dirty="0"/>
+              <a:t>		</a:t>
+            </a:r>
+            <a:r>
+              <a:rPr lang="pt-BR" sz="3200" cap="none" dirty="0" err="1"/>
+              <a:t>returm</a:t>
+            </a:r>
+            <a:r>
+              <a:rPr lang="pt-BR" sz="3200" cap="none" dirty="0"/>
+              <a:t> nome + “, idade “ + idade;</a:t>
+            </a:r>
+          </a:p>
+          <a:p>
+            <a:pPr marL="0" indent="0">
+              <a:lnSpc>
+                <a:spcPct val="100000"/>
+              </a:lnSpc>
+              <a:spcBef>
+                <a:spcPts val="600"/>
+              </a:spcBef>
+              <a:buNone/>
+            </a:pPr>
+            <a:r>
+              <a:rPr lang="pt-BR" sz="3200" cap="none" dirty="0"/>
+              <a:t>	}</a:t>
+            </a:r>
+          </a:p>
+          <a:p>
+            <a:pPr marL="0" indent="0">
+              <a:lnSpc>
+                <a:spcPct val="100000"/>
+              </a:lnSpc>
+              <a:spcBef>
+                <a:spcPts val="600"/>
+              </a:spcBef>
+              <a:buNone/>
+            </a:pPr>
+            <a:r>
+              <a:rPr lang="pt-BR" sz="3200" cap="none" dirty="0"/>
+              <a:t>}</a:t>
+            </a:r>
+          </a:p>
+        </p:txBody>
+      </p:sp>
+    </p:spTree>
+    <p:extLst>
+      <p:ext uri="{BB962C8B-B14F-4D97-AF65-F5344CB8AC3E}">
+        <p14:creationId xmlns:p14="http://schemas.microsoft.com/office/powerpoint/2010/main" val="2331749796"/>
+      </p:ext>
+    </p:extLst>
+  </p:cSld>
+  <p:clrMapOvr>
+    <a:masterClrMapping/>
+  </p:clrMapOvr>
+</p:sld>
+</file>
+
+<file path=ppt/slides/slide23.xml><?xml version="1.0" encoding="utf-8"?>
+<p:sld xmlns:a="http://schemas.openxmlformats.org/drawingml/2006/main" xmlns:r="http://schemas.openxmlformats.org/officeDocument/2006/relationships" xmlns:p="http://schemas.openxmlformats.org/presentationml/2006/main">
+  <p:cSld>
+    <p:spTree>
+      <p:nvGrpSpPr>
+        <p:cNvPr id="1" name=""/>
+        <p:cNvGrpSpPr/>
+        <p:nvPr/>
+      </p:nvGrpSpPr>
+      <p:grpSpPr>
+        <a:xfrm>
+          <a:off x="0" y="0"/>
+          <a:ext cx="0" cy="0"/>
+          <a:chOff x="0" y="0"/>
+          <a:chExt cx="0" cy="0"/>
+        </a:xfrm>
+      </p:grpSpPr>
+      <p:sp>
+        <p:nvSpPr>
+          <p:cNvPr id="2" name="Título 1">
+            <a:extLst>
+              <a:ext uri="{FF2B5EF4-FFF2-40B4-BE49-F238E27FC236}">
+                <a16:creationId xmlns:a16="http://schemas.microsoft.com/office/drawing/2014/main" id="{9CEC5963-F278-AA5A-BD6D-D091F5B5F7EF}"/>
+              </a:ext>
+            </a:extLst>
+          </p:cNvPr>
+          <p:cNvSpPr>
+            <a:spLocks noGrp="1"/>
+          </p:cNvSpPr>
+          <p:nvPr>
+            <p:ph type="title"/>
+          </p:nvPr>
+        </p:nvSpPr>
+        <p:spPr>
+          <a:xfrm>
+            <a:off x="913775" y="618518"/>
+            <a:ext cx="10364451" cy="1067670"/>
+          </a:xfrm>
+        </p:spPr>
+        <p:txBody>
+          <a:bodyPr>
+            <a:normAutofit/>
+          </a:bodyPr>
+          <a:lstStyle/>
+          <a:p>
+            <a:r>
+              <a:rPr lang="pt-BR" sz="4800" dirty="0" err="1"/>
+              <a:t>Js</a:t>
+            </a:r>
+            <a:r>
+              <a:rPr lang="pt-BR" sz="4800" dirty="0"/>
+              <a:t>: objetos</a:t>
+            </a:r>
+          </a:p>
+        </p:txBody>
+      </p:sp>
+      <p:sp>
+        <p:nvSpPr>
+          <p:cNvPr id="3" name="Espaço Reservado para Conteúdo 2">
+            <a:extLst>
+              <a:ext uri="{FF2B5EF4-FFF2-40B4-BE49-F238E27FC236}">
+                <a16:creationId xmlns:a16="http://schemas.microsoft.com/office/drawing/2014/main" id="{2C18BE2C-D36D-EA9D-031D-5C5C54A848FC}"/>
+              </a:ext>
+            </a:extLst>
+          </p:cNvPr>
+          <p:cNvSpPr>
+            <a:spLocks noGrp="1"/>
+          </p:cNvSpPr>
+          <p:nvPr>
+            <p:ph sz="quarter" idx="13"/>
+          </p:nvPr>
+        </p:nvSpPr>
+        <p:spPr>
+          <a:xfrm>
+            <a:off x="2072080" y="2038523"/>
+            <a:ext cx="9205519" cy="4471333"/>
+          </a:xfrm>
+        </p:spPr>
+        <p:txBody>
+          <a:bodyPr>
+            <a:normAutofit/>
+          </a:bodyPr>
+          <a:lstStyle/>
+          <a:p>
+            <a:pPr marL="0" indent="0">
+              <a:lnSpc>
+                <a:spcPct val="100000"/>
+              </a:lnSpc>
+              <a:spcBef>
+                <a:spcPts val="600"/>
+              </a:spcBef>
+              <a:buNone/>
+            </a:pPr>
+            <a:r>
+              <a:rPr lang="pt-BR" sz="3200" cap="none" dirty="0"/>
+              <a:t>var pessoa = {</a:t>
+            </a:r>
+          </a:p>
+          <a:p>
+            <a:pPr marL="0" indent="0">
+              <a:lnSpc>
+                <a:spcPct val="100000"/>
+              </a:lnSpc>
+              <a:spcBef>
+                <a:spcPts val="600"/>
+              </a:spcBef>
+              <a:buNone/>
+            </a:pPr>
+            <a:r>
+              <a:rPr lang="pt-BR" sz="3200" cap="none" dirty="0"/>
+              <a:t>	nome: “Érica”,</a:t>
+            </a:r>
+          </a:p>
+          <a:p>
+            <a:pPr marL="0" indent="0">
+              <a:lnSpc>
+                <a:spcPct val="100000"/>
+              </a:lnSpc>
+              <a:spcBef>
+                <a:spcPts val="600"/>
+              </a:spcBef>
+              <a:buNone/>
+            </a:pPr>
+            <a:r>
+              <a:rPr lang="pt-BR" sz="3200" cap="none" dirty="0"/>
+              <a:t>	idade: 23,</a:t>
+            </a:r>
+          </a:p>
+          <a:p>
+            <a:pPr marL="0" indent="0">
+              <a:lnSpc>
+                <a:spcPct val="100000"/>
+              </a:lnSpc>
+              <a:spcBef>
+                <a:spcPts val="600"/>
+              </a:spcBef>
+              <a:buNone/>
+            </a:pPr>
+            <a:r>
+              <a:rPr lang="pt-BR" sz="3200" cap="none" dirty="0"/>
+              <a:t>	</a:t>
+            </a:r>
+            <a:r>
+              <a:rPr lang="pt-BR" sz="3200" cap="none" dirty="0" err="1"/>
+              <a:t>info</a:t>
+            </a:r>
+            <a:r>
+              <a:rPr lang="pt-BR" sz="3200" cap="none" dirty="0"/>
+              <a:t>: </a:t>
+            </a:r>
+            <a:r>
+              <a:rPr lang="pt-BR" sz="3200" cap="none" dirty="0" err="1"/>
+              <a:t>function</a:t>
+            </a:r>
+            <a:r>
+              <a:rPr lang="pt-BR" sz="3200" cap="none" dirty="0"/>
+              <a:t>() {</a:t>
+            </a:r>
+          </a:p>
+          <a:p>
+            <a:pPr marL="0" indent="0">
+              <a:lnSpc>
+                <a:spcPct val="100000"/>
+              </a:lnSpc>
+              <a:spcBef>
+                <a:spcPts val="600"/>
+              </a:spcBef>
+              <a:buNone/>
+            </a:pPr>
+            <a:r>
+              <a:rPr lang="pt-BR" sz="3200" cap="none" dirty="0"/>
+              <a:t>		</a:t>
+            </a:r>
+            <a:r>
+              <a:rPr lang="pt-BR" sz="3200" cap="none" dirty="0" err="1"/>
+              <a:t>returm</a:t>
+            </a:r>
+            <a:r>
+              <a:rPr lang="pt-BR" sz="3200" cap="none" dirty="0"/>
+              <a:t> nome + “, idade “ + idade;</a:t>
+            </a:r>
+          </a:p>
+          <a:p>
+            <a:pPr marL="0" indent="0">
+              <a:lnSpc>
+                <a:spcPct val="100000"/>
+              </a:lnSpc>
+              <a:spcBef>
+                <a:spcPts val="600"/>
+              </a:spcBef>
+              <a:buNone/>
+            </a:pPr>
+            <a:r>
+              <a:rPr lang="pt-BR" sz="3200" cap="none" dirty="0"/>
+              <a:t>	}</a:t>
+            </a:r>
+          </a:p>
+          <a:p>
+            <a:pPr marL="0" indent="0">
+              <a:lnSpc>
+                <a:spcPct val="100000"/>
+              </a:lnSpc>
+              <a:spcBef>
+                <a:spcPts val="600"/>
+              </a:spcBef>
+              <a:buNone/>
+            </a:pPr>
+            <a:r>
+              <a:rPr lang="pt-BR" sz="3200" cap="none" dirty="0"/>
+              <a:t>}</a:t>
+            </a:r>
+          </a:p>
+        </p:txBody>
+      </p:sp>
+    </p:spTree>
+    <p:extLst>
+      <p:ext uri="{BB962C8B-B14F-4D97-AF65-F5344CB8AC3E}">
+        <p14:creationId xmlns:p14="http://schemas.microsoft.com/office/powerpoint/2010/main" val="626281702"/>
+      </p:ext>
+    </p:extLst>
+  </p:cSld>
+  <p:clrMapOvr>
+    <a:masterClrMapping/>
+  </p:clrMapOvr>
+</p:sld>
+</file>
+
+<file path=ppt/slides/slide24.xml><?xml version="1.0" encoding="utf-8"?>
+<p:sld xmlns:a="http://schemas.openxmlformats.org/drawingml/2006/main" xmlns:r="http://schemas.openxmlformats.org/officeDocument/2006/relationships" xmlns:p="http://schemas.openxmlformats.org/presentationml/2006/main">
+  <p:cSld>
+    <p:spTree>
+      <p:nvGrpSpPr>
+        <p:cNvPr id="1" name=""/>
+        <p:cNvGrpSpPr/>
+        <p:nvPr/>
+      </p:nvGrpSpPr>
+      <p:grpSpPr>
+        <a:xfrm>
+          <a:off x="0" y="0"/>
+          <a:ext cx="0" cy="0"/>
+          <a:chOff x="0" y="0"/>
+          <a:chExt cx="0" cy="0"/>
+        </a:xfrm>
+      </p:grpSpPr>
+      <p:sp>
+        <p:nvSpPr>
+          <p:cNvPr id="2" name="Título 1">
+            <a:extLst>
+              <a:ext uri="{FF2B5EF4-FFF2-40B4-BE49-F238E27FC236}">
+                <a16:creationId xmlns:a16="http://schemas.microsoft.com/office/drawing/2014/main" id="{9CEC5963-F278-AA5A-BD6D-D091F5B5F7EF}"/>
+              </a:ext>
+            </a:extLst>
+          </p:cNvPr>
+          <p:cNvSpPr>
+            <a:spLocks noGrp="1"/>
+          </p:cNvSpPr>
+          <p:nvPr>
+            <p:ph type="title"/>
+          </p:nvPr>
+        </p:nvSpPr>
+        <p:spPr>
+          <a:xfrm>
+            <a:off x="913775" y="618518"/>
+            <a:ext cx="10364451" cy="1067670"/>
+          </a:xfrm>
+        </p:spPr>
+        <p:txBody>
+          <a:bodyPr>
+            <a:normAutofit/>
+          </a:bodyPr>
+          <a:lstStyle/>
+          <a:p>
+            <a:r>
+              <a:rPr lang="pt-BR" sz="5300" dirty="0"/>
+              <a:t>Carregando </a:t>
+            </a:r>
+            <a:r>
+              <a:rPr lang="pt-BR" sz="5300" dirty="0" err="1"/>
+              <a:t>js</a:t>
+            </a:r>
+            <a:r>
+              <a:rPr lang="pt-BR" sz="5300" dirty="0"/>
+              <a:t> dentro do </a:t>
+            </a:r>
+            <a:r>
+              <a:rPr lang="pt-BR" sz="5300" dirty="0" err="1"/>
+              <a:t>html</a:t>
+            </a:r>
+            <a:endParaRPr lang="pt-BR" dirty="0"/>
+          </a:p>
+        </p:txBody>
+      </p:sp>
+      <p:sp>
+        <p:nvSpPr>
+          <p:cNvPr id="3" name="Espaço Reservado para Conteúdo 2">
+            <a:extLst>
+              <a:ext uri="{FF2B5EF4-FFF2-40B4-BE49-F238E27FC236}">
+                <a16:creationId xmlns:a16="http://schemas.microsoft.com/office/drawing/2014/main" id="{2C18BE2C-D36D-EA9D-031D-5C5C54A848FC}"/>
+              </a:ext>
+            </a:extLst>
+          </p:cNvPr>
+          <p:cNvSpPr>
+            <a:spLocks noGrp="1"/>
+          </p:cNvSpPr>
+          <p:nvPr>
+            <p:ph sz="quarter" idx="13"/>
+          </p:nvPr>
+        </p:nvSpPr>
+        <p:spPr>
+          <a:xfrm>
+            <a:off x="0" y="2399251"/>
+            <a:ext cx="12192000" cy="3840230"/>
+          </a:xfrm>
+        </p:spPr>
+        <p:txBody>
+          <a:bodyPr>
+            <a:normAutofit/>
+          </a:bodyPr>
+          <a:lstStyle/>
+          <a:p>
+            <a:pPr marL="0" indent="0" algn="ctr">
+              <a:buNone/>
+            </a:pPr>
+            <a:r>
+              <a:rPr lang="pt-BR" sz="3200" dirty="0"/>
+              <a:t>&lt;</a:t>
+            </a:r>
+            <a:r>
+              <a:rPr lang="pt-BR" sz="3200" cap="none" dirty="0"/>
+              <a:t>script </a:t>
+            </a:r>
+            <a:r>
+              <a:rPr lang="pt-BR" sz="3200" cap="none" dirty="0" err="1"/>
+              <a:t>type</a:t>
+            </a:r>
+            <a:r>
+              <a:rPr lang="pt-BR" sz="3200" cap="none" dirty="0"/>
+              <a:t>="</a:t>
+            </a:r>
+            <a:r>
+              <a:rPr lang="pt-BR" sz="3200" cap="none" dirty="0" err="1"/>
+              <a:t>text</a:t>
+            </a:r>
+            <a:r>
+              <a:rPr lang="pt-BR" sz="3200" cap="none" dirty="0"/>
+              <a:t>/</a:t>
+            </a:r>
+            <a:r>
+              <a:rPr lang="pt-BR" sz="3200" cap="none" dirty="0" err="1"/>
+              <a:t>javascript</a:t>
+            </a:r>
+            <a:r>
+              <a:rPr lang="pt-BR" sz="3200" cap="none" dirty="0"/>
+              <a:t>" </a:t>
+            </a:r>
+            <a:r>
+              <a:rPr lang="pt-BR" sz="3200" cap="none" dirty="0" err="1"/>
+              <a:t>src</a:t>
+            </a:r>
+            <a:r>
+              <a:rPr lang="pt-BR" sz="3200" cap="none" dirty="0"/>
+              <a:t>="</a:t>
+            </a:r>
+            <a:r>
+              <a:rPr lang="pt-BR" sz="3200" cap="none" dirty="0" err="1"/>
+              <a:t>js</a:t>
+            </a:r>
+            <a:r>
+              <a:rPr lang="pt-BR" sz="3200" cap="none" dirty="0"/>
+              <a:t>/jquery-3.6.1.min.js"&gt;&lt;/script&gt;</a:t>
+            </a:r>
+          </a:p>
+        </p:txBody>
+      </p:sp>
+    </p:spTree>
+    <p:extLst>
+      <p:ext uri="{BB962C8B-B14F-4D97-AF65-F5344CB8AC3E}">
+        <p14:creationId xmlns:p14="http://schemas.microsoft.com/office/powerpoint/2010/main" val="3490082055"/>
       </p:ext>
     </p:extLst>
   </p:cSld>
@@ -6577,6 +10051,14 @@
           <a:p>
             <a:r>
               <a:rPr lang="pt-BR" sz="4800" dirty="0" err="1"/>
+              <a:t>Html</a:t>
+            </a:r>
+            <a:r>
+              <a:rPr lang="pt-BR" sz="4800" dirty="0"/>
+              <a:t>: </a:t>
+            </a:r>
+            <a:r>
+              <a:rPr lang="pt-BR" sz="4800" dirty="0" err="1"/>
               <a:t>Extrutura</a:t>
             </a:r>
             <a:r>
@@ -6866,6 +10348,14 @@
           <a:p>
             <a:r>
               <a:rPr lang="pt-BR" sz="4800" dirty="0" err="1"/>
+              <a:t>Html</a:t>
+            </a:r>
+            <a:r>
+              <a:rPr lang="pt-BR" sz="4800" dirty="0"/>
+              <a:t>: </a:t>
+            </a:r>
+            <a:r>
+              <a:rPr lang="pt-BR" sz="4800" dirty="0" err="1"/>
               <a:t>Tags</a:t>
             </a:r>
             <a:r>
@@ -7248,6 +10738,14 @@
           <a:p>
             <a:r>
               <a:rPr lang="pt-BR" sz="4800" dirty="0" err="1"/>
+              <a:t>Html</a:t>
+            </a:r>
+            <a:r>
+              <a:rPr lang="pt-BR" sz="4800" dirty="0"/>
+              <a:t>: </a:t>
+            </a:r>
+            <a:r>
+              <a:rPr lang="pt-BR" sz="4800" dirty="0" err="1"/>
               <a:t>Tags</a:t>
             </a:r>
             <a:r>
@@ -7626,8 +11124,12 @@
           <a:lstStyle/>
           <a:p>
             <a:r>
+              <a:rPr lang="pt-BR" sz="4800" dirty="0" err="1"/>
+              <a:t>Html</a:t>
+            </a:r>
+            <a:r>
               <a:rPr lang="pt-BR" sz="4800" dirty="0"/>
-              <a:t>Outras </a:t>
+              <a:t>: Outras </a:t>
             </a:r>
             <a:r>
               <a:rPr lang="pt-BR" sz="4800" dirty="0" err="1"/>
@@ -7967,6 +11469,344 @@
     <p:extLst>
       <p:ext uri="{BB962C8B-B14F-4D97-AF65-F5344CB8AC3E}">
         <p14:creationId xmlns:p14="http://schemas.microsoft.com/office/powerpoint/2010/main" val="2458659191"/>
+      </p:ext>
+    </p:extLst>
+  </p:cSld>
+  <p:clrMapOvr>
+    <a:masterClrMapping/>
+  </p:clrMapOvr>
+</p:sld>
+</file>
+
+<file path=ppt/slides/slide8.xml><?xml version="1.0" encoding="utf-8"?>
+<p:sld xmlns:a="http://schemas.openxmlformats.org/drawingml/2006/main" xmlns:r="http://schemas.openxmlformats.org/officeDocument/2006/relationships" xmlns:p="http://schemas.openxmlformats.org/presentationml/2006/main">
+  <p:cSld>
+    <p:spTree>
+      <p:nvGrpSpPr>
+        <p:cNvPr id="1" name=""/>
+        <p:cNvGrpSpPr/>
+        <p:nvPr/>
+      </p:nvGrpSpPr>
+      <p:grpSpPr>
+        <a:xfrm>
+          <a:off x="0" y="0"/>
+          <a:ext cx="0" cy="0"/>
+          <a:chOff x="0" y="0"/>
+          <a:chExt cx="0" cy="0"/>
+        </a:xfrm>
+      </p:grpSpPr>
+      <p:sp>
+        <p:nvSpPr>
+          <p:cNvPr id="2" name="Título 1">
+            <a:extLst>
+              <a:ext uri="{FF2B5EF4-FFF2-40B4-BE49-F238E27FC236}">
+                <a16:creationId xmlns:a16="http://schemas.microsoft.com/office/drawing/2014/main" id="{9CEC5963-F278-AA5A-BD6D-D091F5B5F7EF}"/>
+              </a:ext>
+            </a:extLst>
+          </p:cNvPr>
+          <p:cNvSpPr>
+            <a:spLocks noGrp="1"/>
+          </p:cNvSpPr>
+          <p:nvPr>
+            <p:ph type="title"/>
+          </p:nvPr>
+        </p:nvSpPr>
+        <p:spPr>
+          <a:xfrm>
+            <a:off x="913775" y="618518"/>
+            <a:ext cx="10364451" cy="1067670"/>
+          </a:xfrm>
+        </p:spPr>
+        <p:txBody>
+          <a:bodyPr>
+            <a:normAutofit fontScale="90000"/>
+          </a:bodyPr>
+          <a:lstStyle/>
+          <a:p>
+            <a:r>
+              <a:rPr lang="pt-BR" sz="5300" dirty="0"/>
+              <a:t>CSS</a:t>
+            </a:r>
+            <a:r>
+              <a:rPr lang="pt-BR" sz="4800" dirty="0"/>
+              <a:t> </a:t>
+            </a:r>
+            <a:br>
+              <a:rPr lang="pt-BR" sz="4800" dirty="0"/>
+            </a:br>
+            <a:r>
+              <a:rPr lang="pt-BR" dirty="0"/>
+              <a:t>(</a:t>
+            </a:r>
+            <a:r>
+              <a:rPr lang="pt-BR" dirty="0" err="1"/>
+              <a:t>Cascading</a:t>
+            </a:r>
+            <a:r>
+              <a:rPr lang="pt-BR" dirty="0"/>
+              <a:t> </a:t>
+            </a:r>
+            <a:r>
+              <a:rPr lang="pt-BR" dirty="0" err="1"/>
+              <a:t>Style</a:t>
+            </a:r>
+            <a:r>
+              <a:rPr lang="pt-BR" dirty="0"/>
+              <a:t> </a:t>
+            </a:r>
+            <a:r>
+              <a:rPr lang="pt-BR" dirty="0" err="1"/>
+              <a:t>Sheets</a:t>
+            </a:r>
+            <a:r>
+              <a:rPr lang="pt-BR" dirty="0"/>
+              <a:t> )</a:t>
+            </a:r>
+          </a:p>
+        </p:txBody>
+      </p:sp>
+      <p:sp>
+        <p:nvSpPr>
+          <p:cNvPr id="3" name="Espaço Reservado para Conteúdo 2">
+            <a:extLst>
+              <a:ext uri="{FF2B5EF4-FFF2-40B4-BE49-F238E27FC236}">
+                <a16:creationId xmlns:a16="http://schemas.microsoft.com/office/drawing/2014/main" id="{2C18BE2C-D36D-EA9D-031D-5C5C54A848FC}"/>
+              </a:ext>
+            </a:extLst>
+          </p:cNvPr>
+          <p:cNvSpPr>
+            <a:spLocks noGrp="1"/>
+          </p:cNvSpPr>
+          <p:nvPr>
+            <p:ph sz="quarter" idx="13"/>
+          </p:nvPr>
+        </p:nvSpPr>
+        <p:spPr>
+          <a:xfrm>
+            <a:off x="2072080" y="2399251"/>
+            <a:ext cx="9205519" cy="3840230"/>
+          </a:xfrm>
+        </p:spPr>
+        <p:txBody>
+          <a:bodyPr>
+            <a:normAutofit/>
+          </a:bodyPr>
+          <a:lstStyle/>
+          <a:p>
+            <a:r>
+              <a:rPr lang="pt-BR" sz="3200" dirty="0"/>
+              <a:t>proposto EM 1994, POR </a:t>
+            </a:r>
+            <a:r>
+              <a:rPr lang="pt-BR" sz="3200" dirty="0" err="1"/>
+              <a:t>Hakon</a:t>
+            </a:r>
+            <a:r>
+              <a:rPr lang="pt-BR" sz="3200" dirty="0"/>
+              <a:t> Lie</a:t>
+            </a:r>
+          </a:p>
+          <a:p>
+            <a:r>
+              <a:rPr lang="pt-BR" sz="3200" dirty="0"/>
+              <a:t>Desenvolvido em 1995, pela w3c</a:t>
+            </a:r>
+          </a:p>
+          <a:p>
+            <a:r>
+              <a:rPr lang="pt-BR" sz="3200" dirty="0"/>
+              <a:t>LINGUAGEM DE estilo</a:t>
+            </a:r>
+          </a:p>
+          <a:p>
+            <a:r>
+              <a:rPr lang="pt-BR" sz="3200" dirty="0"/>
+              <a:t>VERSÃO ATUAL css3</a:t>
+            </a:r>
+          </a:p>
+        </p:txBody>
+      </p:sp>
+    </p:spTree>
+    <p:extLst>
+      <p:ext uri="{BB962C8B-B14F-4D97-AF65-F5344CB8AC3E}">
+        <p14:creationId xmlns:p14="http://schemas.microsoft.com/office/powerpoint/2010/main" val="389602069"/>
+      </p:ext>
+    </p:extLst>
+  </p:cSld>
+  <p:clrMapOvr>
+    <a:masterClrMapping/>
+  </p:clrMapOvr>
+</p:sld>
+</file>
+
+<file path=ppt/slides/slide9.xml><?xml version="1.0" encoding="utf-8"?>
+<p:sld xmlns:a="http://schemas.openxmlformats.org/drawingml/2006/main" xmlns:r="http://schemas.openxmlformats.org/officeDocument/2006/relationships" xmlns:p="http://schemas.openxmlformats.org/presentationml/2006/main">
+  <p:cSld>
+    <p:spTree>
+      <p:nvGrpSpPr>
+        <p:cNvPr id="1" name=""/>
+        <p:cNvGrpSpPr/>
+        <p:nvPr/>
+      </p:nvGrpSpPr>
+      <p:grpSpPr>
+        <a:xfrm>
+          <a:off x="0" y="0"/>
+          <a:ext cx="0" cy="0"/>
+          <a:chOff x="0" y="0"/>
+          <a:chExt cx="0" cy="0"/>
+        </a:xfrm>
+      </p:grpSpPr>
+      <p:sp>
+        <p:nvSpPr>
+          <p:cNvPr id="2" name="Título 1">
+            <a:extLst>
+              <a:ext uri="{FF2B5EF4-FFF2-40B4-BE49-F238E27FC236}">
+                <a16:creationId xmlns:a16="http://schemas.microsoft.com/office/drawing/2014/main" id="{9CEC5963-F278-AA5A-BD6D-D091F5B5F7EF}"/>
+              </a:ext>
+            </a:extLst>
+          </p:cNvPr>
+          <p:cNvSpPr>
+            <a:spLocks noGrp="1"/>
+          </p:cNvSpPr>
+          <p:nvPr>
+            <p:ph type="title"/>
+          </p:nvPr>
+        </p:nvSpPr>
+        <p:spPr>
+          <a:xfrm>
+            <a:off x="913775" y="618518"/>
+            <a:ext cx="10364451" cy="1067670"/>
+          </a:xfrm>
+        </p:spPr>
+        <p:txBody>
+          <a:bodyPr>
+            <a:normAutofit fontScale="90000"/>
+          </a:bodyPr>
+          <a:lstStyle/>
+          <a:p>
+            <a:r>
+              <a:rPr lang="pt-BR" sz="5300" dirty="0"/>
+              <a:t>Carregando </a:t>
+            </a:r>
+            <a:r>
+              <a:rPr lang="pt-BR" sz="5300" dirty="0" err="1"/>
+              <a:t>css</a:t>
+            </a:r>
+            <a:r>
+              <a:rPr lang="pt-BR" sz="5300" dirty="0"/>
+              <a:t> dentro do </a:t>
+            </a:r>
+            <a:r>
+              <a:rPr lang="pt-BR" sz="5300" dirty="0" err="1"/>
+              <a:t>html</a:t>
+            </a:r>
+            <a:endParaRPr lang="pt-BR" dirty="0"/>
+          </a:p>
+        </p:txBody>
+      </p:sp>
+      <p:sp>
+        <p:nvSpPr>
+          <p:cNvPr id="3" name="Espaço Reservado para Conteúdo 2">
+            <a:extLst>
+              <a:ext uri="{FF2B5EF4-FFF2-40B4-BE49-F238E27FC236}">
+                <a16:creationId xmlns:a16="http://schemas.microsoft.com/office/drawing/2014/main" id="{2C18BE2C-D36D-EA9D-031D-5C5C54A848FC}"/>
+              </a:ext>
+            </a:extLst>
+          </p:cNvPr>
+          <p:cNvSpPr>
+            <a:spLocks noGrp="1"/>
+          </p:cNvSpPr>
+          <p:nvPr>
+            <p:ph sz="quarter" idx="13"/>
+          </p:nvPr>
+        </p:nvSpPr>
+        <p:spPr>
+          <a:xfrm>
+            <a:off x="0" y="2399251"/>
+            <a:ext cx="12192000" cy="3840230"/>
+          </a:xfrm>
+        </p:spPr>
+        <p:txBody>
+          <a:bodyPr>
+            <a:normAutofit/>
+          </a:bodyPr>
+          <a:lstStyle/>
+          <a:p>
+            <a:pPr marL="0" indent="0" algn="ctr">
+              <a:buNone/>
+            </a:pPr>
+            <a:r>
+              <a:rPr lang="pt-BR" sz="3200" dirty="0"/>
+              <a:t>&lt;</a:t>
+            </a:r>
+            <a:r>
+              <a:rPr lang="pt-BR" sz="3200" cap="none" dirty="0"/>
+              <a:t>link </a:t>
+            </a:r>
+            <a:r>
+              <a:rPr lang="pt-BR" sz="3200" cap="none" dirty="0" err="1"/>
+              <a:t>rel</a:t>
+            </a:r>
+            <a:r>
+              <a:rPr lang="pt-BR" sz="3200" cap="none" dirty="0"/>
+              <a:t>=“</a:t>
+            </a:r>
+            <a:r>
+              <a:rPr lang="pt-BR" sz="3200" cap="none" dirty="0" err="1"/>
+              <a:t>stylesheet</a:t>
+            </a:r>
+            <a:r>
+              <a:rPr lang="pt-BR" sz="3200" cap="none" dirty="0"/>
+              <a:t>” </a:t>
+            </a:r>
+            <a:r>
+              <a:rPr lang="pt-BR" sz="3200" cap="none" dirty="0" err="1"/>
+              <a:t>type</a:t>
+            </a:r>
+            <a:r>
+              <a:rPr lang="pt-BR" sz="3200" cap="none" dirty="0"/>
+              <a:t>=“</a:t>
+            </a:r>
+            <a:r>
+              <a:rPr lang="pt-BR" sz="3200" cap="none" dirty="0" err="1"/>
+              <a:t>text</a:t>
+            </a:r>
+            <a:r>
+              <a:rPr lang="pt-BR" sz="3200" cap="none" dirty="0"/>
+              <a:t>/</a:t>
+            </a:r>
+            <a:r>
+              <a:rPr lang="pt-BR" sz="3200" cap="none" dirty="0" err="1"/>
+              <a:t>css</a:t>
+            </a:r>
+            <a:r>
+              <a:rPr lang="pt-BR" sz="3200" cap="none" dirty="0"/>
+              <a:t>” </a:t>
+            </a:r>
+            <a:r>
+              <a:rPr lang="pt-BR" sz="3200" cap="none" dirty="0" err="1"/>
+              <a:t>href</a:t>
+            </a:r>
+            <a:r>
+              <a:rPr lang="pt-BR" sz="3200" cap="none" dirty="0"/>
+              <a:t>=“</a:t>
+            </a:r>
+            <a:r>
+              <a:rPr lang="pt-BR" sz="3200" cap="none" dirty="0" err="1"/>
+              <a:t>css</a:t>
+            </a:r>
+            <a:r>
+              <a:rPr lang="pt-BR" sz="3200" cap="none" dirty="0"/>
+              <a:t>/styles.css” /&gt;</a:t>
+            </a:r>
+            <a:endParaRPr lang="pt-BR" sz="3200" dirty="0"/>
+          </a:p>
+        </p:txBody>
+      </p:sp>
+    </p:spTree>
+    <p:extLst>
+      <p:ext uri="{BB962C8B-B14F-4D97-AF65-F5344CB8AC3E}">
+        <p14:creationId xmlns:p14="http://schemas.microsoft.com/office/powerpoint/2010/main" val="1078827909"/>
       </p:ext>
     </p:extLst>
   </p:cSld>

</xml_diff>

<commit_message>
Finalização dos slides da apresentação
</commit_message>
<xml_diff>
--- a/Arquivos/INTRODUÇÃO A FRONT-END.pptx
+++ b/Arquivos/INTRODUÇÃO A FRONT-END.pptx
@@ -31,6 +31,18 @@
     <p:sldId id="279" r:id="rId25"/>
     <p:sldId id="280" r:id="rId26"/>
     <p:sldId id="281" r:id="rId27"/>
+    <p:sldId id="282" r:id="rId28"/>
+    <p:sldId id="283" r:id="rId29"/>
+    <p:sldId id="284" r:id="rId30"/>
+    <p:sldId id="287" r:id="rId31"/>
+    <p:sldId id="285" r:id="rId32"/>
+    <p:sldId id="288" r:id="rId33"/>
+    <p:sldId id="289" r:id="rId34"/>
+    <p:sldId id="290" r:id="rId35"/>
+    <p:sldId id="291" r:id="rId36"/>
+    <p:sldId id="292" r:id="rId37"/>
+    <p:sldId id="293" r:id="rId38"/>
+    <p:sldId id="294" r:id="rId39"/>
   </p:sldIdLst>
   <p:sldSz cx="12192000" cy="6858000"/>
   <p:notesSz cx="6858000" cy="9144000"/>
@@ -316,7 +328,7 @@
           <a:p>
             <a:fld id="{EF64EDD3-CC31-4653-85DF-1A82825891C3}" type="datetimeFigureOut">
               <a:rPr lang="pt-BR" smtClean="0"/>
-              <a:t>24/10/2022</a:t>
+              <a:t>27/10/2022</a:t>
             </a:fld>
             <a:endParaRPr lang="pt-BR"/>
           </a:p>
@@ -628,7 +640,7 @@
           <a:p>
             <a:fld id="{EF64EDD3-CC31-4653-85DF-1A82825891C3}" type="datetimeFigureOut">
               <a:rPr lang="pt-BR" smtClean="0"/>
-              <a:t>24/10/2022</a:t>
+              <a:t>27/10/2022</a:t>
             </a:fld>
             <a:endParaRPr lang="pt-BR"/>
           </a:p>
@@ -850,7 +862,7 @@
           <a:p>
             <a:fld id="{EF64EDD3-CC31-4653-85DF-1A82825891C3}" type="datetimeFigureOut">
               <a:rPr lang="pt-BR" smtClean="0"/>
-              <a:t>24/10/2022</a:t>
+              <a:t>27/10/2022</a:t>
             </a:fld>
             <a:endParaRPr lang="pt-BR"/>
           </a:p>
@@ -1141,7 +1153,7 @@
           <a:p>
             <a:fld id="{EF64EDD3-CC31-4653-85DF-1A82825891C3}" type="datetimeFigureOut">
               <a:rPr lang="pt-BR" smtClean="0"/>
-              <a:t>24/10/2022</a:t>
+              <a:t>27/10/2022</a:t>
             </a:fld>
             <a:endParaRPr lang="pt-BR"/>
           </a:p>
@@ -1595,7 +1607,7 @@
           <a:p>
             <a:fld id="{EF64EDD3-CC31-4653-85DF-1A82825891C3}" type="datetimeFigureOut">
               <a:rPr lang="pt-BR" smtClean="0"/>
-              <a:t>24/10/2022</a:t>
+              <a:t>27/10/2022</a:t>
             </a:fld>
             <a:endParaRPr lang="pt-BR"/>
           </a:p>
@@ -2171,7 +2183,7 @@
           <a:p>
             <a:fld id="{EF64EDD3-CC31-4653-85DF-1A82825891C3}" type="datetimeFigureOut">
               <a:rPr lang="pt-BR" smtClean="0"/>
-              <a:t>24/10/2022</a:t>
+              <a:t>27/10/2022</a:t>
             </a:fld>
             <a:endParaRPr lang="pt-BR"/>
           </a:p>
@@ -3023,7 +3035,7 @@
           <a:p>
             <a:fld id="{EF64EDD3-CC31-4653-85DF-1A82825891C3}" type="datetimeFigureOut">
               <a:rPr lang="pt-BR" smtClean="0"/>
-              <a:t>24/10/2022</a:t>
+              <a:t>27/10/2022</a:t>
             </a:fld>
             <a:endParaRPr lang="pt-BR"/>
           </a:p>
@@ -3228,7 +3240,7 @@
           <a:p>
             <a:fld id="{EF64EDD3-CC31-4653-85DF-1A82825891C3}" type="datetimeFigureOut">
               <a:rPr lang="pt-BR" smtClean="0"/>
-              <a:t>24/10/2022</a:t>
+              <a:t>27/10/2022</a:t>
             </a:fld>
             <a:endParaRPr lang="pt-BR"/>
           </a:p>
@@ -3442,7 +3454,7 @@
           <a:p>
             <a:fld id="{EF64EDD3-CC31-4653-85DF-1A82825891C3}" type="datetimeFigureOut">
               <a:rPr lang="pt-BR" smtClean="0"/>
-              <a:t>24/10/2022</a:t>
+              <a:t>27/10/2022</a:t>
             </a:fld>
             <a:endParaRPr lang="pt-BR"/>
           </a:p>
@@ -3647,7 +3659,7 @@
           <a:p>
             <a:fld id="{EF64EDD3-CC31-4653-85DF-1A82825891C3}" type="datetimeFigureOut">
               <a:rPr lang="pt-BR" smtClean="0"/>
-              <a:t>24/10/2022</a:t>
+              <a:t>27/10/2022</a:t>
             </a:fld>
             <a:endParaRPr lang="pt-BR"/>
           </a:p>
@@ -3927,7 +3939,7 @@
           <a:p>
             <a:fld id="{EF64EDD3-CC31-4653-85DF-1A82825891C3}" type="datetimeFigureOut">
               <a:rPr lang="pt-BR" smtClean="0"/>
-              <a:t>24/10/2022</a:t>
+              <a:t>27/10/2022</a:t>
             </a:fld>
             <a:endParaRPr lang="pt-BR"/>
           </a:p>
@@ -4194,7 +4206,7 @@
           <a:p>
             <a:fld id="{EF64EDD3-CC31-4653-85DF-1A82825891C3}" type="datetimeFigureOut">
               <a:rPr lang="pt-BR" smtClean="0"/>
-              <a:t>24/10/2022</a:t>
+              <a:t>27/10/2022</a:t>
             </a:fld>
             <a:endParaRPr lang="pt-BR"/>
           </a:p>
@@ -4609,7 +4621,7 @@
           <a:p>
             <a:fld id="{EF64EDD3-CC31-4653-85DF-1A82825891C3}" type="datetimeFigureOut">
               <a:rPr lang="pt-BR" smtClean="0"/>
-              <a:t>24/10/2022</a:t>
+              <a:t>27/10/2022</a:t>
             </a:fld>
             <a:endParaRPr lang="pt-BR"/>
           </a:p>
@@ -4757,7 +4769,7 @@
           <a:p>
             <a:fld id="{EF64EDD3-CC31-4653-85DF-1A82825891C3}" type="datetimeFigureOut">
               <a:rPr lang="pt-BR" smtClean="0"/>
-              <a:t>24/10/2022</a:t>
+              <a:t>27/10/2022</a:t>
             </a:fld>
             <a:endParaRPr lang="pt-BR"/>
           </a:p>
@@ -4882,7 +4894,7 @@
           <a:p>
             <a:fld id="{EF64EDD3-CC31-4653-85DF-1A82825891C3}" type="datetimeFigureOut">
               <a:rPr lang="pt-BR" smtClean="0"/>
-              <a:t>24/10/2022</a:t>
+              <a:t>27/10/2022</a:t>
             </a:fld>
             <a:endParaRPr lang="pt-BR"/>
           </a:p>
@@ -5161,7 +5173,7 @@
           <a:p>
             <a:fld id="{EF64EDD3-CC31-4653-85DF-1A82825891C3}" type="datetimeFigureOut">
               <a:rPr lang="pt-BR" smtClean="0"/>
-              <a:t>24/10/2022</a:t>
+              <a:t>27/10/2022</a:t>
             </a:fld>
             <a:endParaRPr lang="pt-BR"/>
           </a:p>
@@ -5473,7 +5485,7 @@
           <a:p>
             <a:fld id="{EF64EDD3-CC31-4653-85DF-1A82825891C3}" type="datetimeFigureOut">
               <a:rPr lang="pt-BR" smtClean="0"/>
-              <a:t>24/10/2022</a:t>
+              <a:t>27/10/2022</a:t>
             </a:fld>
             <a:endParaRPr lang="pt-BR"/>
           </a:p>
@@ -5726,7 +5738,7 @@
           <a:p>
             <a:fld id="{EF64EDD3-CC31-4653-85DF-1A82825891C3}" type="datetimeFigureOut">
               <a:rPr lang="pt-BR" smtClean="0"/>
-              <a:t>24/10/2022</a:t>
+              <a:t>27/10/2022</a:t>
             </a:fld>
             <a:endParaRPr lang="pt-BR"/>
           </a:p>
@@ -10171,6 +10183,1020 @@
 </p:sld>
 </file>
 
+<file path=ppt/slides/slide27.xml><?xml version="1.0" encoding="utf-8"?>
+<p:sld xmlns:a="http://schemas.openxmlformats.org/drawingml/2006/main" xmlns:r="http://schemas.openxmlformats.org/officeDocument/2006/relationships" xmlns:p="http://schemas.openxmlformats.org/presentationml/2006/main">
+  <p:cSld>
+    <p:spTree>
+      <p:nvGrpSpPr>
+        <p:cNvPr id="1" name=""/>
+        <p:cNvGrpSpPr/>
+        <p:nvPr/>
+      </p:nvGrpSpPr>
+      <p:grpSpPr>
+        <a:xfrm>
+          <a:off x="0" y="0"/>
+          <a:ext cx="0" cy="0"/>
+          <a:chOff x="0" y="0"/>
+          <a:chExt cx="0" cy="0"/>
+        </a:xfrm>
+      </p:grpSpPr>
+      <p:sp>
+        <p:nvSpPr>
+          <p:cNvPr id="2" name="Título 1">
+            <a:extLst>
+              <a:ext uri="{FF2B5EF4-FFF2-40B4-BE49-F238E27FC236}">
+                <a16:creationId xmlns:a16="http://schemas.microsoft.com/office/drawing/2014/main" id="{9CEC5963-F278-AA5A-BD6D-D091F5B5F7EF}"/>
+              </a:ext>
+            </a:extLst>
+          </p:cNvPr>
+          <p:cNvSpPr>
+            <a:spLocks noGrp="1"/>
+          </p:cNvSpPr>
+          <p:nvPr>
+            <p:ph type="title"/>
+          </p:nvPr>
+        </p:nvSpPr>
+        <p:spPr>
+          <a:xfrm>
+            <a:off x="913775" y="618518"/>
+            <a:ext cx="10364451" cy="1067670"/>
+          </a:xfrm>
+        </p:spPr>
+        <p:txBody>
+          <a:bodyPr>
+            <a:normAutofit/>
+          </a:bodyPr>
+          <a:lstStyle/>
+          <a:p>
+            <a:r>
+              <a:rPr lang="pt-BR" sz="4800" dirty="0"/>
+              <a:t>Selecionando elementos dom</a:t>
+            </a:r>
+          </a:p>
+        </p:txBody>
+      </p:sp>
+      <p:sp>
+        <p:nvSpPr>
+          <p:cNvPr id="3" name="Espaço Reservado para Conteúdo 2">
+            <a:extLst>
+              <a:ext uri="{FF2B5EF4-FFF2-40B4-BE49-F238E27FC236}">
+                <a16:creationId xmlns:a16="http://schemas.microsoft.com/office/drawing/2014/main" id="{2C18BE2C-D36D-EA9D-031D-5C5C54A848FC}"/>
+              </a:ext>
+            </a:extLst>
+          </p:cNvPr>
+          <p:cNvSpPr>
+            <a:spLocks noGrp="1"/>
+          </p:cNvSpPr>
+          <p:nvPr>
+            <p:ph sz="quarter" idx="13"/>
+          </p:nvPr>
+        </p:nvSpPr>
+        <p:spPr>
+          <a:xfrm>
+            <a:off x="2072080" y="2038524"/>
+            <a:ext cx="9205519" cy="4429388"/>
+          </a:xfrm>
+        </p:spPr>
+        <p:txBody>
+          <a:bodyPr>
+            <a:normAutofit/>
+          </a:bodyPr>
+          <a:lstStyle/>
+          <a:p>
+            <a:pPr>
+              <a:lnSpc>
+                <a:spcPct val="100000"/>
+              </a:lnSpc>
+              <a:spcBef>
+                <a:spcPts val="1200"/>
+              </a:spcBef>
+            </a:pPr>
+            <a:r>
+              <a:rPr lang="pt-BR" sz="3200" dirty="0"/>
+              <a:t>Javascript:</a:t>
+            </a:r>
+          </a:p>
+          <a:p>
+            <a:pPr marL="0" indent="0">
+              <a:lnSpc>
+                <a:spcPct val="100000"/>
+              </a:lnSpc>
+              <a:spcBef>
+                <a:spcPts val="0"/>
+              </a:spcBef>
+              <a:buNone/>
+            </a:pPr>
+            <a:r>
+              <a:rPr lang="pt-BR" sz="3200" cap="none" dirty="0"/>
+              <a:t>	</a:t>
+            </a:r>
+            <a:r>
+              <a:rPr lang="pt-BR" sz="3200" cap="none" dirty="0" err="1">
+                <a:highlight>
+                  <a:srgbClr val="C0C0C0"/>
+                </a:highlight>
+              </a:rPr>
+              <a:t>document.querySelector</a:t>
+            </a:r>
+            <a:r>
+              <a:rPr lang="pt-BR" sz="3200" cap="none" dirty="0">
+                <a:highlight>
+                  <a:srgbClr val="C0C0C0"/>
+                </a:highlight>
+              </a:rPr>
+              <a:t>(“#div1”);</a:t>
+            </a:r>
+            <a:r>
+              <a:rPr lang="pt-BR" sz="3200" cap="none" dirty="0"/>
+              <a:t> ou</a:t>
+            </a:r>
+          </a:p>
+          <a:p>
+            <a:pPr marL="0" indent="0">
+              <a:lnSpc>
+                <a:spcPct val="100000"/>
+              </a:lnSpc>
+              <a:spcBef>
+                <a:spcPts val="0"/>
+              </a:spcBef>
+              <a:buNone/>
+            </a:pPr>
+            <a:r>
+              <a:rPr lang="pt-BR" sz="3200" cap="none" dirty="0"/>
+              <a:t>	</a:t>
+            </a:r>
+            <a:r>
+              <a:rPr lang="pt-BR" sz="3200" cap="none" dirty="0" err="1">
+                <a:highlight>
+                  <a:srgbClr val="C0C0C0"/>
+                </a:highlight>
+              </a:rPr>
+              <a:t>document.getElementById</a:t>
+            </a:r>
+            <a:r>
+              <a:rPr lang="pt-BR" sz="3200" cap="none" dirty="0">
+                <a:highlight>
+                  <a:srgbClr val="C0C0C0"/>
+                </a:highlight>
+              </a:rPr>
+              <a:t>(“div1”);</a:t>
+            </a:r>
+          </a:p>
+          <a:p>
+            <a:pPr marL="0" indent="0">
+              <a:lnSpc>
+                <a:spcPct val="100000"/>
+              </a:lnSpc>
+              <a:spcBef>
+                <a:spcPts val="0"/>
+              </a:spcBef>
+              <a:buNone/>
+            </a:pPr>
+            <a:endParaRPr lang="pt-BR" sz="3200" cap="none" dirty="0">
+              <a:highlight>
+                <a:srgbClr val="C0C0C0"/>
+              </a:highlight>
+            </a:endParaRPr>
+          </a:p>
+          <a:p>
+            <a:pPr>
+              <a:lnSpc>
+                <a:spcPct val="100000"/>
+              </a:lnSpc>
+              <a:spcBef>
+                <a:spcPts val="1200"/>
+              </a:spcBef>
+            </a:pPr>
+            <a:r>
+              <a:rPr lang="pt-BR" sz="3200" dirty="0" err="1"/>
+              <a:t>jquery</a:t>
+            </a:r>
+            <a:r>
+              <a:rPr lang="pt-BR" sz="3200" dirty="0"/>
+              <a:t>:</a:t>
+            </a:r>
+          </a:p>
+          <a:p>
+            <a:pPr marL="0" indent="0">
+              <a:lnSpc>
+                <a:spcPct val="100000"/>
+              </a:lnSpc>
+              <a:spcBef>
+                <a:spcPts val="0"/>
+              </a:spcBef>
+              <a:buNone/>
+            </a:pPr>
+            <a:r>
+              <a:rPr lang="pt-BR" sz="3200" cap="none" dirty="0"/>
+              <a:t>	</a:t>
+            </a:r>
+            <a:r>
+              <a:rPr lang="pt-BR" sz="3200" cap="none" dirty="0">
+                <a:highlight>
+                  <a:srgbClr val="C0C0C0"/>
+                </a:highlight>
+              </a:rPr>
+              <a:t>$(“#div1”)</a:t>
+            </a:r>
+          </a:p>
+        </p:txBody>
+      </p:sp>
+    </p:spTree>
+    <p:extLst>
+      <p:ext uri="{BB962C8B-B14F-4D97-AF65-F5344CB8AC3E}">
+        <p14:creationId xmlns:p14="http://schemas.microsoft.com/office/powerpoint/2010/main" val="2315111271"/>
+      </p:ext>
+    </p:extLst>
+  </p:cSld>
+  <p:clrMapOvr>
+    <a:masterClrMapping/>
+  </p:clrMapOvr>
+</p:sld>
+</file>
+
+<file path=ppt/slides/slide28.xml><?xml version="1.0" encoding="utf-8"?>
+<p:sld xmlns:a="http://schemas.openxmlformats.org/drawingml/2006/main" xmlns:r="http://schemas.openxmlformats.org/officeDocument/2006/relationships" xmlns:p="http://schemas.openxmlformats.org/presentationml/2006/main">
+  <p:cSld>
+    <p:spTree>
+      <p:nvGrpSpPr>
+        <p:cNvPr id="1" name=""/>
+        <p:cNvGrpSpPr/>
+        <p:nvPr/>
+      </p:nvGrpSpPr>
+      <p:grpSpPr>
+        <a:xfrm>
+          <a:off x="0" y="0"/>
+          <a:ext cx="0" cy="0"/>
+          <a:chOff x="0" y="0"/>
+          <a:chExt cx="0" cy="0"/>
+        </a:xfrm>
+      </p:grpSpPr>
+      <p:sp>
+        <p:nvSpPr>
+          <p:cNvPr id="2" name="Título 1">
+            <a:extLst>
+              <a:ext uri="{FF2B5EF4-FFF2-40B4-BE49-F238E27FC236}">
+                <a16:creationId xmlns:a16="http://schemas.microsoft.com/office/drawing/2014/main" id="{9CEC5963-F278-AA5A-BD6D-D091F5B5F7EF}"/>
+              </a:ext>
+            </a:extLst>
+          </p:cNvPr>
+          <p:cNvSpPr>
+            <a:spLocks noGrp="1"/>
+          </p:cNvSpPr>
+          <p:nvPr>
+            <p:ph type="title"/>
+          </p:nvPr>
+        </p:nvSpPr>
+        <p:spPr>
+          <a:xfrm>
+            <a:off x="913775" y="618518"/>
+            <a:ext cx="10364451" cy="1067670"/>
+          </a:xfrm>
+        </p:spPr>
+        <p:txBody>
+          <a:bodyPr>
+            <a:normAutofit/>
+          </a:bodyPr>
+          <a:lstStyle/>
+          <a:p>
+            <a:r>
+              <a:rPr lang="pt-BR" sz="4800" dirty="0"/>
+              <a:t>Adicionando estilos</a:t>
+            </a:r>
+          </a:p>
+        </p:txBody>
+      </p:sp>
+      <p:sp>
+        <p:nvSpPr>
+          <p:cNvPr id="3" name="Espaço Reservado para Conteúdo 2">
+            <a:extLst>
+              <a:ext uri="{FF2B5EF4-FFF2-40B4-BE49-F238E27FC236}">
+                <a16:creationId xmlns:a16="http://schemas.microsoft.com/office/drawing/2014/main" id="{2C18BE2C-D36D-EA9D-031D-5C5C54A848FC}"/>
+              </a:ext>
+            </a:extLst>
+          </p:cNvPr>
+          <p:cNvSpPr>
+            <a:spLocks noGrp="1"/>
+          </p:cNvSpPr>
+          <p:nvPr>
+            <p:ph sz="quarter" idx="13"/>
+          </p:nvPr>
+        </p:nvSpPr>
+        <p:spPr>
+          <a:xfrm>
+            <a:off x="444618" y="1895912"/>
+            <a:ext cx="11747382" cy="4706224"/>
+          </a:xfrm>
+        </p:spPr>
+        <p:txBody>
+          <a:bodyPr>
+            <a:normAutofit/>
+          </a:bodyPr>
+          <a:lstStyle/>
+          <a:p>
+            <a:pPr lvl="1">
+              <a:lnSpc>
+                <a:spcPct val="100000"/>
+              </a:lnSpc>
+              <a:spcBef>
+                <a:spcPts val="1200"/>
+              </a:spcBef>
+            </a:pPr>
+            <a:r>
+              <a:rPr lang="pt-BR" sz="3000" dirty="0"/>
+              <a:t>Javascript:</a:t>
+            </a:r>
+          </a:p>
+          <a:p>
+            <a:pPr marL="0" indent="0">
+              <a:lnSpc>
+                <a:spcPct val="100000"/>
+              </a:lnSpc>
+              <a:spcBef>
+                <a:spcPts val="0"/>
+              </a:spcBef>
+              <a:spcAft>
+                <a:spcPts val="1200"/>
+              </a:spcAft>
+              <a:buNone/>
+            </a:pPr>
+            <a:r>
+              <a:rPr lang="pt-BR" sz="3200" cap="none" dirty="0"/>
+              <a:t>	</a:t>
+            </a:r>
+            <a:r>
+              <a:rPr lang="pt-BR" sz="3200" cap="none" dirty="0" err="1">
+                <a:highlight>
+                  <a:srgbClr val="C0C0C0"/>
+                </a:highlight>
+              </a:rPr>
+              <a:t>document.getElementById</a:t>
+            </a:r>
+            <a:r>
+              <a:rPr lang="pt-BR" sz="3200" cap="none" dirty="0">
+                <a:highlight>
+                  <a:srgbClr val="C0C0C0"/>
+                </a:highlight>
+              </a:rPr>
+              <a:t>('</a:t>
+            </a:r>
+            <a:r>
+              <a:rPr lang="pt-BR" sz="3200" cap="none" dirty="0" err="1">
+                <a:highlight>
+                  <a:srgbClr val="C0C0C0"/>
+                </a:highlight>
+              </a:rPr>
+              <a:t>myDiv</a:t>
+            </a:r>
+            <a:r>
+              <a:rPr lang="pt-BR" sz="3200" cap="none" dirty="0">
+                <a:highlight>
+                  <a:srgbClr val="C0C0C0"/>
+                </a:highlight>
+              </a:rPr>
+              <a:t>’).</a:t>
+            </a:r>
+            <a:r>
+              <a:rPr lang="pt-BR" sz="3200" cap="none" dirty="0" err="1">
+                <a:highlight>
+                  <a:srgbClr val="C0C0C0"/>
+                </a:highlight>
+              </a:rPr>
+              <a:t>style.background</a:t>
+            </a:r>
+            <a:r>
+              <a:rPr lang="pt-BR" sz="3200" cap="none" dirty="0">
+                <a:highlight>
+                  <a:srgbClr val="C0C0C0"/>
+                </a:highlight>
+              </a:rPr>
+              <a:t>="#FFF“</a:t>
+            </a:r>
+          </a:p>
+          <a:p>
+            <a:pPr marL="0" indent="0">
+              <a:lnSpc>
+                <a:spcPts val="3200"/>
+              </a:lnSpc>
+              <a:spcBef>
+                <a:spcPts val="0"/>
+              </a:spcBef>
+              <a:buNone/>
+            </a:pPr>
+            <a:r>
+              <a:rPr lang="pt-BR" sz="3200" cap="none" dirty="0"/>
+              <a:t>	</a:t>
+            </a:r>
+            <a:r>
+              <a:rPr lang="pt-BR" sz="3200" cap="none" dirty="0" err="1">
+                <a:highlight>
+                  <a:srgbClr val="C0C0C0"/>
+                </a:highlight>
+              </a:rPr>
+              <a:t>document.getElementById</a:t>
+            </a:r>
+            <a:r>
+              <a:rPr lang="pt-BR" sz="3200" cap="none" dirty="0">
+                <a:highlight>
+                  <a:srgbClr val="C0C0C0"/>
+                </a:highlight>
+              </a:rPr>
+              <a:t>(‘</a:t>
+            </a:r>
+            <a:r>
+              <a:rPr lang="pt-BR" sz="3200" cap="none" dirty="0" err="1">
+                <a:highlight>
+                  <a:srgbClr val="C0C0C0"/>
+                </a:highlight>
+              </a:rPr>
+              <a:t>myDiv</a:t>
+            </a:r>
+            <a:r>
+              <a:rPr lang="pt-BR" sz="3200" cap="none" dirty="0">
+                <a:highlight>
+                  <a:srgbClr val="C0C0C0"/>
+                </a:highlight>
+              </a:rPr>
+              <a:t>’).</a:t>
+            </a:r>
+            <a:r>
+              <a:rPr lang="pt-BR" sz="3200" cap="none" dirty="0" err="1">
+                <a:highlight>
+                  <a:srgbClr val="C0C0C0"/>
+                </a:highlight>
+              </a:rPr>
+              <a:t>style.cssText</a:t>
+            </a:r>
+            <a:r>
+              <a:rPr lang="pt-BR" sz="3200" cap="none" dirty="0">
+                <a:highlight>
+                  <a:srgbClr val="C0C0C0"/>
+                </a:highlight>
+              </a:rPr>
+              <a:t> += `</a:t>
+            </a:r>
+          </a:p>
+          <a:p>
+            <a:pPr marL="0" indent="0">
+              <a:lnSpc>
+                <a:spcPts val="3200"/>
+              </a:lnSpc>
+              <a:spcBef>
+                <a:spcPts val="0"/>
+              </a:spcBef>
+              <a:buNone/>
+            </a:pPr>
+            <a:r>
+              <a:rPr lang="pt-BR" sz="3200" cap="none" dirty="0"/>
+              <a:t>					</a:t>
+            </a:r>
+            <a:r>
+              <a:rPr lang="pt-BR" sz="3200" cap="none" dirty="0" err="1">
+                <a:highlight>
+                  <a:srgbClr val="C0C0C0"/>
+                </a:highlight>
+              </a:rPr>
+              <a:t>font-size</a:t>
+            </a:r>
+            <a:r>
+              <a:rPr lang="pt-BR" sz="3200" cap="none" dirty="0">
+                <a:highlight>
+                  <a:srgbClr val="C0C0C0"/>
+                </a:highlight>
+              </a:rPr>
+              <a:t>: 30px, color: </a:t>
+            </a:r>
+            <a:r>
+              <a:rPr lang="pt-BR" sz="3200" cap="none" dirty="0" err="1">
+                <a:highlight>
+                  <a:srgbClr val="C0C0C0"/>
+                </a:highlight>
+              </a:rPr>
+              <a:t>red</a:t>
+            </a:r>
+            <a:r>
+              <a:rPr lang="pt-BR" sz="3200" cap="none" dirty="0">
+                <a:highlight>
+                  <a:srgbClr val="C0C0C0"/>
+                </a:highlight>
+              </a:rPr>
+              <a:t>`;</a:t>
+            </a:r>
+          </a:p>
+          <a:p>
+            <a:pPr lvl="1">
+              <a:lnSpc>
+                <a:spcPct val="100000"/>
+              </a:lnSpc>
+              <a:spcBef>
+                <a:spcPts val="1200"/>
+              </a:spcBef>
+            </a:pPr>
+            <a:r>
+              <a:rPr lang="pt-BR" sz="3000" dirty="0" err="1"/>
+              <a:t>jquery</a:t>
+            </a:r>
+            <a:r>
+              <a:rPr lang="pt-BR" sz="3000" dirty="0"/>
+              <a:t>:</a:t>
+            </a:r>
+          </a:p>
+          <a:p>
+            <a:pPr marL="0" indent="0">
+              <a:lnSpc>
+                <a:spcPct val="100000"/>
+              </a:lnSpc>
+              <a:spcBef>
+                <a:spcPts val="0"/>
+              </a:spcBef>
+              <a:spcAft>
+                <a:spcPts val="1200"/>
+              </a:spcAft>
+              <a:buNone/>
+            </a:pPr>
+            <a:r>
+              <a:rPr lang="pt-BR" sz="3200" cap="none" dirty="0"/>
+              <a:t>	</a:t>
+            </a:r>
+            <a:r>
+              <a:rPr lang="pt-BR" sz="3200" cap="none" dirty="0">
+                <a:highlight>
+                  <a:srgbClr val="C0C0C0"/>
+                </a:highlight>
+              </a:rPr>
+              <a:t>$('#myDiv').</a:t>
+            </a:r>
+            <a:r>
+              <a:rPr lang="pt-BR" sz="3200" cap="none" dirty="0" err="1">
+                <a:highlight>
+                  <a:srgbClr val="C0C0C0"/>
+                </a:highlight>
+              </a:rPr>
+              <a:t>css</a:t>
+            </a:r>
+            <a:r>
+              <a:rPr lang="pt-BR" sz="3200" cap="none" dirty="0">
+                <a:highlight>
+                  <a:srgbClr val="C0C0C0"/>
+                </a:highlight>
+              </a:rPr>
+              <a:t>(‘</a:t>
+            </a:r>
+            <a:r>
+              <a:rPr lang="pt-BR" sz="3200" cap="none" dirty="0" err="1">
+                <a:highlight>
+                  <a:srgbClr val="C0C0C0"/>
+                </a:highlight>
+              </a:rPr>
+              <a:t>background','#FFF</a:t>
+            </a:r>
+            <a:r>
+              <a:rPr lang="pt-BR" sz="3200" cap="none" dirty="0">
+                <a:highlight>
+                  <a:srgbClr val="C0C0C0"/>
+                </a:highlight>
+              </a:rPr>
+              <a:t>’);</a:t>
+            </a:r>
+          </a:p>
+          <a:p>
+            <a:pPr marL="0" indent="0">
+              <a:lnSpc>
+                <a:spcPct val="100000"/>
+              </a:lnSpc>
+              <a:spcBef>
+                <a:spcPts val="0"/>
+              </a:spcBef>
+              <a:buNone/>
+            </a:pPr>
+            <a:r>
+              <a:rPr lang="pt-BR" sz="3200" cap="none" dirty="0">
+                <a:highlight>
+                  <a:srgbClr val="C0C0C0"/>
+                </a:highlight>
+              </a:rPr>
+              <a:t>	$(‘#</a:t>
+            </a:r>
+            <a:r>
+              <a:rPr lang="pt-BR" sz="3200" cap="none" dirty="0" err="1">
+                <a:highlight>
+                  <a:srgbClr val="C0C0C0"/>
+                </a:highlight>
+              </a:rPr>
+              <a:t>myDiv</a:t>
+            </a:r>
+            <a:r>
+              <a:rPr lang="pt-BR" sz="3200" cap="none" dirty="0">
+                <a:highlight>
+                  <a:srgbClr val="C0C0C0"/>
+                </a:highlight>
+              </a:rPr>
+              <a:t>’).</a:t>
+            </a:r>
+            <a:r>
+              <a:rPr lang="pt-BR" sz="3200" cap="none" dirty="0" err="1">
+                <a:highlight>
+                  <a:srgbClr val="C0C0C0"/>
+                </a:highlight>
+              </a:rPr>
+              <a:t>css</a:t>
+            </a:r>
+            <a:r>
+              <a:rPr lang="pt-BR" sz="3200" cap="none" dirty="0">
+                <a:highlight>
+                  <a:srgbClr val="C0C0C0"/>
+                </a:highlight>
+              </a:rPr>
+              <a:t>({</a:t>
+            </a:r>
+            <a:r>
+              <a:rPr lang="pt-BR" sz="3200" cap="none" dirty="0" err="1">
+                <a:highlight>
+                  <a:srgbClr val="C0C0C0"/>
+                </a:highlight>
+              </a:rPr>
+              <a:t>font-size</a:t>
+            </a:r>
+            <a:r>
+              <a:rPr lang="pt-BR" sz="3200" cap="none" dirty="0">
+                <a:highlight>
+                  <a:srgbClr val="C0C0C0"/>
+                </a:highlight>
+              </a:rPr>
+              <a:t>: ‘30px’, color: ‘</a:t>
+            </a:r>
+            <a:r>
+              <a:rPr lang="pt-BR" sz="3200" cap="none" dirty="0" err="1">
+                <a:highlight>
+                  <a:srgbClr val="C0C0C0"/>
+                </a:highlight>
+              </a:rPr>
+              <a:t>red</a:t>
+            </a:r>
+            <a:r>
+              <a:rPr lang="pt-BR" sz="3200" cap="none" dirty="0">
+                <a:highlight>
+                  <a:srgbClr val="C0C0C0"/>
+                </a:highlight>
+              </a:rPr>
+              <a:t>’});</a:t>
+            </a:r>
+          </a:p>
+        </p:txBody>
+      </p:sp>
+    </p:spTree>
+    <p:extLst>
+      <p:ext uri="{BB962C8B-B14F-4D97-AF65-F5344CB8AC3E}">
+        <p14:creationId xmlns:p14="http://schemas.microsoft.com/office/powerpoint/2010/main" val="500316653"/>
+      </p:ext>
+    </p:extLst>
+  </p:cSld>
+  <p:clrMapOvr>
+    <a:masterClrMapping/>
+  </p:clrMapOvr>
+</p:sld>
+</file>
+
+<file path=ppt/slides/slide29.xml><?xml version="1.0" encoding="utf-8"?>
+<p:sld xmlns:a="http://schemas.openxmlformats.org/drawingml/2006/main" xmlns:r="http://schemas.openxmlformats.org/officeDocument/2006/relationships" xmlns:p="http://schemas.openxmlformats.org/presentationml/2006/main">
+  <p:cSld>
+    <p:spTree>
+      <p:nvGrpSpPr>
+        <p:cNvPr id="1" name=""/>
+        <p:cNvGrpSpPr/>
+        <p:nvPr/>
+      </p:nvGrpSpPr>
+      <p:grpSpPr>
+        <a:xfrm>
+          <a:off x="0" y="0"/>
+          <a:ext cx="0" cy="0"/>
+          <a:chOff x="0" y="0"/>
+          <a:chExt cx="0" cy="0"/>
+        </a:xfrm>
+      </p:grpSpPr>
+      <p:sp>
+        <p:nvSpPr>
+          <p:cNvPr id="2" name="Título 1">
+            <a:extLst>
+              <a:ext uri="{FF2B5EF4-FFF2-40B4-BE49-F238E27FC236}">
+                <a16:creationId xmlns:a16="http://schemas.microsoft.com/office/drawing/2014/main" id="{9CEC5963-F278-AA5A-BD6D-D091F5B5F7EF}"/>
+              </a:ext>
+            </a:extLst>
+          </p:cNvPr>
+          <p:cNvSpPr>
+            <a:spLocks noGrp="1"/>
+          </p:cNvSpPr>
+          <p:nvPr>
+            <p:ph type="title"/>
+          </p:nvPr>
+        </p:nvSpPr>
+        <p:spPr>
+          <a:xfrm>
+            <a:off x="913775" y="618518"/>
+            <a:ext cx="10364451" cy="1067670"/>
+          </a:xfrm>
+        </p:spPr>
+        <p:txBody>
+          <a:bodyPr>
+            <a:normAutofit/>
+          </a:bodyPr>
+          <a:lstStyle/>
+          <a:p>
+            <a:r>
+              <a:rPr lang="pt-BR" sz="4800" dirty="0"/>
+              <a:t>Chamada de eventos</a:t>
+            </a:r>
+          </a:p>
+        </p:txBody>
+      </p:sp>
+      <p:sp>
+        <p:nvSpPr>
+          <p:cNvPr id="3" name="Espaço Reservado para Conteúdo 2">
+            <a:extLst>
+              <a:ext uri="{FF2B5EF4-FFF2-40B4-BE49-F238E27FC236}">
+                <a16:creationId xmlns:a16="http://schemas.microsoft.com/office/drawing/2014/main" id="{2C18BE2C-D36D-EA9D-031D-5C5C54A848FC}"/>
+              </a:ext>
+            </a:extLst>
+          </p:cNvPr>
+          <p:cNvSpPr>
+            <a:spLocks noGrp="1"/>
+          </p:cNvSpPr>
+          <p:nvPr>
+            <p:ph sz="quarter" idx="13"/>
+          </p:nvPr>
+        </p:nvSpPr>
+        <p:spPr>
+          <a:xfrm>
+            <a:off x="0" y="1686188"/>
+            <a:ext cx="12192000" cy="4915948"/>
+          </a:xfrm>
+        </p:spPr>
+        <p:txBody>
+          <a:bodyPr>
+            <a:normAutofit/>
+          </a:bodyPr>
+          <a:lstStyle/>
+          <a:p>
+            <a:pPr lvl="1">
+              <a:lnSpc>
+                <a:spcPct val="100000"/>
+              </a:lnSpc>
+              <a:spcBef>
+                <a:spcPts val="1200"/>
+              </a:spcBef>
+            </a:pPr>
+            <a:r>
+              <a:rPr lang="pt-BR" sz="3000" dirty="0"/>
+              <a:t>Javascript:</a:t>
+            </a:r>
+          </a:p>
+          <a:p>
+            <a:pPr marL="914400" lvl="2" indent="0">
+              <a:lnSpc>
+                <a:spcPts val="3000"/>
+              </a:lnSpc>
+              <a:spcBef>
+                <a:spcPts val="0"/>
+              </a:spcBef>
+              <a:buNone/>
+            </a:pPr>
+            <a:r>
+              <a:rPr lang="pt-BR" sz="3000" cap="none" dirty="0" err="1">
+                <a:highlight>
+                  <a:srgbClr val="C0C0C0"/>
+                </a:highlight>
+              </a:rPr>
+              <a:t>document.getElementById</a:t>
+            </a:r>
+            <a:r>
+              <a:rPr lang="pt-BR" sz="3000" cap="none" dirty="0">
+                <a:highlight>
+                  <a:srgbClr val="C0C0C0"/>
+                </a:highlight>
+              </a:rPr>
+              <a:t>(“</a:t>
+            </a:r>
+            <a:r>
+              <a:rPr lang="pt-BR" sz="3000" cap="none" dirty="0" err="1">
+                <a:highlight>
+                  <a:srgbClr val="C0C0C0"/>
+                </a:highlight>
+              </a:rPr>
+              <a:t>btnOK</a:t>
+            </a:r>
+            <a:r>
+              <a:rPr lang="pt-BR" sz="3000" cap="none" dirty="0">
+                <a:highlight>
+                  <a:srgbClr val="C0C0C0"/>
+                </a:highlight>
+              </a:rPr>
+              <a:t>").</a:t>
+            </a:r>
+            <a:r>
+              <a:rPr lang="pt-BR" sz="3000" cap="none" dirty="0" err="1">
+                <a:highlight>
+                  <a:srgbClr val="C0C0C0"/>
+                </a:highlight>
+              </a:rPr>
+              <a:t>addEventListener</a:t>
+            </a:r>
+            <a:r>
+              <a:rPr lang="pt-BR" sz="3000" cap="none" dirty="0">
+                <a:highlight>
+                  <a:srgbClr val="C0C0C0"/>
+                </a:highlight>
+              </a:rPr>
+              <a:t>("click”, </a:t>
+            </a:r>
+            <a:r>
+              <a:rPr lang="pt-BR" sz="3000" cap="none" dirty="0" err="1">
+                <a:highlight>
+                  <a:srgbClr val="C0C0C0"/>
+                </a:highlight>
+              </a:rPr>
+              <a:t>function</a:t>
+            </a:r>
+            <a:r>
+              <a:rPr lang="pt-BR" sz="3000" cap="none" dirty="0">
+                <a:highlight>
+                  <a:srgbClr val="C0C0C0"/>
+                </a:highlight>
+              </a:rPr>
+              <a:t> () {   </a:t>
+            </a:r>
+          </a:p>
+          <a:p>
+            <a:pPr marL="914400" lvl="2" indent="0">
+              <a:lnSpc>
+                <a:spcPts val="3000"/>
+              </a:lnSpc>
+              <a:spcBef>
+                <a:spcPts val="0"/>
+              </a:spcBef>
+              <a:buNone/>
+            </a:pPr>
+            <a:r>
+              <a:rPr lang="pt-BR" sz="3000" cap="none" dirty="0">
+                <a:highlight>
+                  <a:srgbClr val="C0C0C0"/>
+                </a:highlight>
+              </a:rPr>
+              <a:t>	//chama a ação do evento	</a:t>
+            </a:r>
+          </a:p>
+          <a:p>
+            <a:pPr marL="914400" lvl="2" indent="0">
+              <a:lnSpc>
+                <a:spcPts val="3000"/>
+              </a:lnSpc>
+              <a:spcBef>
+                <a:spcPts val="0"/>
+              </a:spcBef>
+              <a:buNone/>
+            </a:pPr>
+            <a:r>
+              <a:rPr lang="pt-BR" sz="3000" cap="none" dirty="0">
+                <a:highlight>
+                  <a:srgbClr val="C0C0C0"/>
+                </a:highlight>
+              </a:rPr>
+              <a:t>});</a:t>
+            </a:r>
+          </a:p>
+          <a:p>
+            <a:pPr lvl="1">
+              <a:lnSpc>
+                <a:spcPct val="100000"/>
+              </a:lnSpc>
+              <a:spcBef>
+                <a:spcPts val="1200"/>
+              </a:spcBef>
+            </a:pPr>
+            <a:r>
+              <a:rPr lang="pt-BR" sz="3000" dirty="0" err="1"/>
+              <a:t>jquery</a:t>
+            </a:r>
+            <a:r>
+              <a:rPr lang="pt-BR" sz="3000" dirty="0"/>
+              <a:t>:</a:t>
+            </a:r>
+          </a:p>
+          <a:p>
+            <a:pPr marL="0" indent="0">
+              <a:lnSpc>
+                <a:spcPts val="3000"/>
+              </a:lnSpc>
+              <a:spcBef>
+                <a:spcPts val="0"/>
+              </a:spcBef>
+              <a:buNone/>
+            </a:pPr>
+            <a:r>
+              <a:rPr lang="pt-BR" sz="3200" cap="none" dirty="0"/>
+              <a:t>	</a:t>
+            </a:r>
+            <a:r>
+              <a:rPr lang="pt-BR" sz="3000" cap="none" dirty="0">
+                <a:highlight>
+                  <a:srgbClr val="C0C0C0"/>
+                </a:highlight>
+              </a:rPr>
+              <a:t>$(“#</a:t>
+            </a:r>
+            <a:r>
+              <a:rPr lang="pt-BR" sz="3000" cap="none" dirty="0" err="1">
+                <a:highlight>
+                  <a:srgbClr val="C0C0C0"/>
+                </a:highlight>
+              </a:rPr>
+              <a:t>btnOK</a:t>
+            </a:r>
+            <a:r>
+              <a:rPr lang="pt-BR" sz="3000" cap="none" dirty="0">
+                <a:highlight>
+                  <a:srgbClr val="C0C0C0"/>
+                </a:highlight>
+              </a:rPr>
+              <a:t>”).click(</a:t>
+            </a:r>
+            <a:r>
+              <a:rPr lang="pt-BR" sz="3000" cap="none" dirty="0" err="1">
+                <a:highlight>
+                  <a:srgbClr val="C0C0C0"/>
+                </a:highlight>
+              </a:rPr>
+              <a:t>function</a:t>
+            </a:r>
+            <a:r>
+              <a:rPr lang="pt-BR" sz="3000" cap="none" dirty="0">
+                <a:highlight>
+                  <a:srgbClr val="C0C0C0"/>
+                </a:highlight>
+              </a:rPr>
+              <a:t>() {</a:t>
+            </a:r>
+          </a:p>
+          <a:p>
+            <a:pPr marL="0" indent="0">
+              <a:lnSpc>
+                <a:spcPts val="3000"/>
+              </a:lnSpc>
+              <a:spcBef>
+                <a:spcPts val="0"/>
+              </a:spcBef>
+              <a:buNone/>
+            </a:pPr>
+            <a:r>
+              <a:rPr lang="pt-BR" sz="3000" cap="none" dirty="0"/>
+              <a:t>	</a:t>
+            </a:r>
+            <a:r>
+              <a:rPr lang="pt-BR" sz="3000" cap="none" dirty="0">
+                <a:highlight>
+                  <a:srgbClr val="C0C0C0"/>
+                </a:highlight>
+              </a:rPr>
+              <a:t>	//chama a ação do evento</a:t>
+            </a:r>
+          </a:p>
+          <a:p>
+            <a:pPr marL="0" indent="0">
+              <a:lnSpc>
+                <a:spcPts val="3000"/>
+              </a:lnSpc>
+              <a:spcBef>
+                <a:spcPts val="0"/>
+              </a:spcBef>
+              <a:buNone/>
+            </a:pPr>
+            <a:r>
+              <a:rPr lang="pt-BR" sz="3000" cap="none" dirty="0"/>
+              <a:t>	</a:t>
+            </a:r>
+            <a:r>
+              <a:rPr lang="pt-BR" sz="3000" cap="none" dirty="0">
+                <a:highlight>
+                  <a:srgbClr val="C0C0C0"/>
+                </a:highlight>
+              </a:rPr>
+              <a:t>};</a:t>
+            </a:r>
+          </a:p>
+        </p:txBody>
+      </p:sp>
+    </p:spTree>
+    <p:extLst>
+      <p:ext uri="{BB962C8B-B14F-4D97-AF65-F5344CB8AC3E}">
+        <p14:creationId xmlns:p14="http://schemas.microsoft.com/office/powerpoint/2010/main" val="640735604"/>
+      </p:ext>
+    </p:extLst>
+  </p:cSld>
+  <p:clrMapOvr>
+    <a:masterClrMapping/>
+  </p:clrMapOvr>
+</p:sld>
+</file>
+
 <file path=ppt/slides/slide3.xml><?xml version="1.0" encoding="utf-8"?>
 <p:sld xmlns:a="http://schemas.openxmlformats.org/drawingml/2006/main" xmlns:r="http://schemas.openxmlformats.org/officeDocument/2006/relationships" xmlns:p="http://schemas.openxmlformats.org/presentationml/2006/main">
   <p:cSld>
@@ -10301,6 +11327,2173 @@
     <p:extLst>
       <p:ext uri="{BB962C8B-B14F-4D97-AF65-F5344CB8AC3E}">
         <p14:creationId xmlns:p14="http://schemas.microsoft.com/office/powerpoint/2010/main" val="3170131449"/>
+      </p:ext>
+    </p:extLst>
+  </p:cSld>
+  <p:clrMapOvr>
+    <a:masterClrMapping/>
+  </p:clrMapOvr>
+</p:sld>
+</file>
+
+<file path=ppt/slides/slide30.xml><?xml version="1.0" encoding="utf-8"?>
+<p:sld xmlns:a="http://schemas.openxmlformats.org/drawingml/2006/main" xmlns:r="http://schemas.openxmlformats.org/officeDocument/2006/relationships" xmlns:p="http://schemas.openxmlformats.org/presentationml/2006/main">
+  <p:cSld>
+    <p:spTree>
+      <p:nvGrpSpPr>
+        <p:cNvPr id="1" name=""/>
+        <p:cNvGrpSpPr/>
+        <p:nvPr/>
+      </p:nvGrpSpPr>
+      <p:grpSpPr>
+        <a:xfrm>
+          <a:off x="0" y="0"/>
+          <a:ext cx="0" cy="0"/>
+          <a:chOff x="0" y="0"/>
+          <a:chExt cx="0" cy="0"/>
+        </a:xfrm>
+      </p:grpSpPr>
+      <p:sp>
+        <p:nvSpPr>
+          <p:cNvPr id="2" name="Título 1">
+            <a:extLst>
+              <a:ext uri="{FF2B5EF4-FFF2-40B4-BE49-F238E27FC236}">
+                <a16:creationId xmlns:a16="http://schemas.microsoft.com/office/drawing/2014/main" id="{9CEC5963-F278-AA5A-BD6D-D091F5B5F7EF}"/>
+              </a:ext>
+            </a:extLst>
+          </p:cNvPr>
+          <p:cNvSpPr>
+            <a:spLocks noGrp="1"/>
+          </p:cNvSpPr>
+          <p:nvPr>
+            <p:ph type="title"/>
+          </p:nvPr>
+        </p:nvSpPr>
+        <p:spPr>
+          <a:xfrm>
+            <a:off x="913774" y="491518"/>
+            <a:ext cx="10364451" cy="1067670"/>
+          </a:xfrm>
+        </p:spPr>
+        <p:txBody>
+          <a:bodyPr>
+            <a:normAutofit/>
+          </a:bodyPr>
+          <a:lstStyle/>
+          <a:p>
+            <a:r>
+              <a:rPr lang="pt-BR" sz="4800" dirty="0"/>
+              <a:t>Animações com </a:t>
+            </a:r>
+            <a:r>
+              <a:rPr lang="pt-BR" sz="4800" dirty="0" err="1"/>
+              <a:t>jquery</a:t>
+            </a:r>
+            <a:endParaRPr lang="pt-BR" sz="4800" dirty="0"/>
+          </a:p>
+        </p:txBody>
+      </p:sp>
+      <p:sp>
+        <p:nvSpPr>
+          <p:cNvPr id="3" name="Espaço Reservado para Conteúdo 2">
+            <a:extLst>
+              <a:ext uri="{FF2B5EF4-FFF2-40B4-BE49-F238E27FC236}">
+                <a16:creationId xmlns:a16="http://schemas.microsoft.com/office/drawing/2014/main" id="{2C18BE2C-D36D-EA9D-031D-5C5C54A848FC}"/>
+              </a:ext>
+            </a:extLst>
+          </p:cNvPr>
+          <p:cNvSpPr>
+            <a:spLocks noGrp="1"/>
+          </p:cNvSpPr>
+          <p:nvPr>
+            <p:ph sz="quarter" idx="13"/>
+          </p:nvPr>
+        </p:nvSpPr>
+        <p:spPr>
+          <a:xfrm>
+            <a:off x="1661021" y="1686188"/>
+            <a:ext cx="4231780" cy="4781724"/>
+          </a:xfrm>
+        </p:spPr>
+        <p:txBody>
+          <a:bodyPr>
+            <a:normAutofit/>
+          </a:bodyPr>
+          <a:lstStyle/>
+          <a:p>
+            <a:pPr>
+              <a:lnSpc>
+                <a:spcPts val="3200"/>
+              </a:lnSpc>
+              <a:spcBef>
+                <a:spcPts val="0"/>
+              </a:spcBef>
+              <a:spcAft>
+                <a:spcPts val="1200"/>
+              </a:spcAft>
+            </a:pPr>
+            <a:r>
+              <a:rPr lang="pt-BR" sz="3200" cap="none" dirty="0"/>
+              <a:t>TIPOS DE ANIMAÇÕES</a:t>
+            </a:r>
+          </a:p>
+          <a:p>
+            <a:pPr lvl="1">
+              <a:lnSpc>
+                <a:spcPts val="3200"/>
+              </a:lnSpc>
+              <a:spcBef>
+                <a:spcPts val="0"/>
+              </a:spcBef>
+              <a:spcAft>
+                <a:spcPts val="1200"/>
+              </a:spcAft>
+              <a:buFont typeface="Wingdings" panose="05000000000000000000" pitchFamily="2" charset="2"/>
+              <a:buChar char="Ø"/>
+            </a:pPr>
+            <a:r>
+              <a:rPr lang="pt-BR" sz="3000" cap="none" dirty="0" err="1"/>
+              <a:t>animate</a:t>
+            </a:r>
+            <a:r>
+              <a:rPr lang="pt-BR" sz="3000" cap="none" dirty="0"/>
+              <a:t>()</a:t>
+            </a:r>
+          </a:p>
+          <a:p>
+            <a:pPr lvl="1">
+              <a:lnSpc>
+                <a:spcPts val="3200"/>
+              </a:lnSpc>
+              <a:spcBef>
+                <a:spcPts val="0"/>
+              </a:spcBef>
+              <a:spcAft>
+                <a:spcPts val="1200"/>
+              </a:spcAft>
+              <a:buFont typeface="Wingdings" panose="05000000000000000000" pitchFamily="2" charset="2"/>
+              <a:buChar char="Ø"/>
+            </a:pPr>
+            <a:r>
+              <a:rPr lang="pt-BR" sz="3000" cap="none" dirty="0" err="1"/>
+              <a:t>queue</a:t>
+            </a:r>
+            <a:r>
+              <a:rPr lang="pt-BR" sz="3000" cap="none" dirty="0"/>
+              <a:t>()</a:t>
+            </a:r>
+          </a:p>
+          <a:p>
+            <a:pPr lvl="1">
+              <a:lnSpc>
+                <a:spcPts val="3200"/>
+              </a:lnSpc>
+              <a:spcBef>
+                <a:spcPts val="0"/>
+              </a:spcBef>
+              <a:spcAft>
+                <a:spcPts val="1200"/>
+              </a:spcAft>
+              <a:buFont typeface="Wingdings" panose="05000000000000000000" pitchFamily="2" charset="2"/>
+              <a:buChar char="Ø"/>
+            </a:pPr>
+            <a:r>
+              <a:rPr lang="pt-BR" sz="3000" cap="none" dirty="0"/>
+              <a:t>stop()</a:t>
+            </a:r>
+          </a:p>
+          <a:p>
+            <a:pPr lvl="1">
+              <a:lnSpc>
+                <a:spcPts val="3200"/>
+              </a:lnSpc>
+              <a:spcBef>
+                <a:spcPts val="0"/>
+              </a:spcBef>
+              <a:spcAft>
+                <a:spcPts val="1200"/>
+              </a:spcAft>
+              <a:buFont typeface="Wingdings" panose="05000000000000000000" pitchFamily="2" charset="2"/>
+              <a:buChar char="Ø"/>
+            </a:pPr>
+            <a:r>
+              <a:rPr lang="pt-BR" sz="3000" cap="none" dirty="0" err="1"/>
+              <a:t>fadeIn</a:t>
+            </a:r>
+            <a:r>
+              <a:rPr lang="pt-BR" sz="3000" cap="none" dirty="0"/>
+              <a:t>()</a:t>
+            </a:r>
+          </a:p>
+          <a:p>
+            <a:pPr lvl="1">
+              <a:lnSpc>
+                <a:spcPts val="3200"/>
+              </a:lnSpc>
+              <a:spcBef>
+                <a:spcPts val="0"/>
+              </a:spcBef>
+              <a:spcAft>
+                <a:spcPts val="1200"/>
+              </a:spcAft>
+              <a:buFont typeface="Wingdings" panose="05000000000000000000" pitchFamily="2" charset="2"/>
+              <a:buChar char="Ø"/>
+            </a:pPr>
+            <a:r>
+              <a:rPr lang="pt-BR" sz="3000" cap="none" dirty="0" err="1"/>
+              <a:t>fadeOut</a:t>
+            </a:r>
+            <a:r>
+              <a:rPr lang="pt-BR" sz="3000" cap="none" dirty="0"/>
+              <a:t>()</a:t>
+            </a:r>
+          </a:p>
+          <a:p>
+            <a:pPr lvl="1">
+              <a:lnSpc>
+                <a:spcPts val="3200"/>
+              </a:lnSpc>
+              <a:spcBef>
+                <a:spcPts val="0"/>
+              </a:spcBef>
+              <a:spcAft>
+                <a:spcPts val="1200"/>
+              </a:spcAft>
+              <a:buFont typeface="Wingdings" panose="05000000000000000000" pitchFamily="2" charset="2"/>
+              <a:buChar char="Ø"/>
+            </a:pPr>
+            <a:r>
+              <a:rPr lang="pt-BR" sz="3000" cap="none" dirty="0" err="1"/>
+              <a:t>fadeTo</a:t>
+            </a:r>
+            <a:r>
+              <a:rPr lang="pt-BR" sz="3000" cap="none" dirty="0"/>
+              <a:t>()</a:t>
+            </a:r>
+          </a:p>
+          <a:p>
+            <a:pPr lvl="1">
+              <a:lnSpc>
+                <a:spcPts val="3200"/>
+              </a:lnSpc>
+              <a:spcBef>
+                <a:spcPts val="0"/>
+              </a:spcBef>
+              <a:spcAft>
+                <a:spcPts val="1200"/>
+              </a:spcAft>
+              <a:buFont typeface="Wingdings" panose="05000000000000000000" pitchFamily="2" charset="2"/>
+              <a:buChar char="Ø"/>
+            </a:pPr>
+            <a:r>
+              <a:rPr lang="pt-BR" sz="3000" cap="none" dirty="0" err="1"/>
+              <a:t>fadeToggle</a:t>
+            </a:r>
+            <a:r>
+              <a:rPr lang="pt-BR" sz="3000" cap="none" dirty="0"/>
+              <a:t>()</a:t>
+            </a:r>
+          </a:p>
+        </p:txBody>
+      </p:sp>
+      <p:sp>
+        <p:nvSpPr>
+          <p:cNvPr id="4" name="Espaço Reservado para Conteúdo 2">
+            <a:extLst>
+              <a:ext uri="{FF2B5EF4-FFF2-40B4-BE49-F238E27FC236}">
+                <a16:creationId xmlns:a16="http://schemas.microsoft.com/office/drawing/2014/main" id="{D371ED5E-E12A-8DF5-BD9C-8C3D26A0AF9E}"/>
+              </a:ext>
+            </a:extLst>
+          </p:cNvPr>
+          <p:cNvSpPr txBox="1">
+            <a:spLocks/>
+          </p:cNvSpPr>
+          <p:nvPr/>
+        </p:nvSpPr>
+        <p:spPr>
+          <a:xfrm>
+            <a:off x="6469623" y="1686188"/>
+            <a:ext cx="4231780" cy="4429388"/>
+          </a:xfrm>
+          <a:prstGeom prst="rect">
+            <a:avLst/>
+          </a:prstGeom>
+        </p:spPr>
+        <p:txBody>
+          <a:bodyPr vert="horz" lIns="91440" tIns="45720" rIns="91440" bIns="45720" rtlCol="0">
+            <a:normAutofit/>
+          </a:bodyPr>
+          <a:lstStyle>
+            <a:lvl1pPr marL="228600" indent="-228600" algn="l" defTabSz="914400" rtl="0" eaLnBrk="1" latinLnBrk="0" hangingPunct="1">
+              <a:lnSpc>
+                <a:spcPct val="120000"/>
+              </a:lnSpc>
+              <a:spcBef>
+                <a:spcPts val="1000"/>
+              </a:spcBef>
+              <a:buClr>
+                <a:schemeClr val="tx1"/>
+              </a:buClr>
+              <a:buFont typeface="Arial" panose="020B0604020202020204" pitchFamily="34" charset="0"/>
+              <a:buChar char="•"/>
+              <a:defRPr sz="2000" kern="1200" cap="all" baseline="0">
+                <a:solidFill>
+                  <a:schemeClr val="tx1"/>
+                </a:solidFill>
+                <a:effectLst/>
+                <a:latin typeface="+mn-lt"/>
+                <a:ea typeface="+mn-ea"/>
+                <a:cs typeface="+mn-cs"/>
+              </a:defRPr>
+            </a:lvl1pPr>
+            <a:lvl2pPr marL="685800" indent="-228600" algn="l" defTabSz="914400" rtl="0" eaLnBrk="1" latinLnBrk="0" hangingPunct="1">
+              <a:lnSpc>
+                <a:spcPct val="120000"/>
+              </a:lnSpc>
+              <a:spcBef>
+                <a:spcPts val="500"/>
+              </a:spcBef>
+              <a:buClr>
+                <a:schemeClr val="tx1"/>
+              </a:buClr>
+              <a:buFont typeface="Arial" panose="020B0604020202020204" pitchFamily="34" charset="0"/>
+              <a:buChar char="•"/>
+              <a:defRPr sz="1800" kern="1200" cap="all" baseline="0">
+                <a:solidFill>
+                  <a:schemeClr val="tx1"/>
+                </a:solidFill>
+                <a:effectLst/>
+                <a:latin typeface="+mn-lt"/>
+                <a:ea typeface="+mn-ea"/>
+                <a:cs typeface="+mn-cs"/>
+              </a:defRPr>
+            </a:lvl2pPr>
+            <a:lvl3pPr marL="1143000" indent="-228600" algn="l" defTabSz="914400" rtl="0" eaLnBrk="1" latinLnBrk="0" hangingPunct="1">
+              <a:lnSpc>
+                <a:spcPct val="120000"/>
+              </a:lnSpc>
+              <a:spcBef>
+                <a:spcPts val="500"/>
+              </a:spcBef>
+              <a:buClr>
+                <a:schemeClr val="tx1"/>
+              </a:buClr>
+              <a:buFont typeface="Arial" panose="020B0604020202020204" pitchFamily="34" charset="0"/>
+              <a:buChar char="•"/>
+              <a:defRPr sz="1600" kern="1200" cap="all" baseline="0">
+                <a:solidFill>
+                  <a:schemeClr val="tx1"/>
+                </a:solidFill>
+                <a:effectLst/>
+                <a:latin typeface="+mn-lt"/>
+                <a:ea typeface="+mn-ea"/>
+                <a:cs typeface="+mn-cs"/>
+              </a:defRPr>
+            </a:lvl3pPr>
+            <a:lvl4pPr marL="1600200" indent="-228600" algn="l" defTabSz="914400" rtl="0" eaLnBrk="1" latinLnBrk="0" hangingPunct="1">
+              <a:lnSpc>
+                <a:spcPct val="120000"/>
+              </a:lnSpc>
+              <a:spcBef>
+                <a:spcPts val="500"/>
+              </a:spcBef>
+              <a:buClr>
+                <a:schemeClr val="tx1"/>
+              </a:buClr>
+              <a:buFont typeface="Arial" panose="020B0604020202020204" pitchFamily="34" charset="0"/>
+              <a:buChar char="•"/>
+              <a:defRPr sz="1400" kern="1200" cap="all" baseline="0">
+                <a:solidFill>
+                  <a:schemeClr val="tx1"/>
+                </a:solidFill>
+                <a:effectLst/>
+                <a:latin typeface="+mn-lt"/>
+                <a:ea typeface="+mn-ea"/>
+                <a:cs typeface="+mn-cs"/>
+              </a:defRPr>
+            </a:lvl4pPr>
+            <a:lvl5pPr marL="2057400" indent="-228600" algn="l" defTabSz="914400" rtl="0" eaLnBrk="1" latinLnBrk="0" hangingPunct="1">
+              <a:lnSpc>
+                <a:spcPct val="120000"/>
+              </a:lnSpc>
+              <a:spcBef>
+                <a:spcPts val="500"/>
+              </a:spcBef>
+              <a:buClr>
+                <a:schemeClr val="tx1"/>
+              </a:buClr>
+              <a:buFont typeface="Arial" panose="020B0604020202020204" pitchFamily="34" charset="0"/>
+              <a:buChar char="•"/>
+              <a:defRPr sz="1400" kern="1200" cap="all" baseline="0">
+                <a:solidFill>
+                  <a:schemeClr val="tx1"/>
+                </a:solidFill>
+                <a:effectLst/>
+                <a:latin typeface="+mn-lt"/>
+                <a:ea typeface="+mn-ea"/>
+                <a:cs typeface="+mn-cs"/>
+              </a:defRPr>
+            </a:lvl5pPr>
+            <a:lvl6pPr marL="2514600" indent="-228600" algn="l" defTabSz="914400" rtl="0" eaLnBrk="1" latinLnBrk="0" hangingPunct="1">
+              <a:lnSpc>
+                <a:spcPct val="120000"/>
+              </a:lnSpc>
+              <a:spcBef>
+                <a:spcPts val="500"/>
+              </a:spcBef>
+              <a:buClr>
+                <a:schemeClr val="tx1"/>
+              </a:buClr>
+              <a:buFont typeface="Arial" panose="020B0604020202020204" pitchFamily="34" charset="0"/>
+              <a:buChar char="•"/>
+              <a:defRPr sz="1400" kern="1200" cap="all" baseline="0">
+                <a:solidFill>
+                  <a:schemeClr val="tx1"/>
+                </a:solidFill>
+                <a:effectLst/>
+                <a:latin typeface="+mn-lt"/>
+                <a:ea typeface="+mn-ea"/>
+                <a:cs typeface="+mn-cs"/>
+              </a:defRPr>
+            </a:lvl6pPr>
+            <a:lvl7pPr marL="2971800" indent="-228600" algn="l" defTabSz="914400" rtl="0" eaLnBrk="1" latinLnBrk="0" hangingPunct="1">
+              <a:lnSpc>
+                <a:spcPct val="120000"/>
+              </a:lnSpc>
+              <a:spcBef>
+                <a:spcPts val="500"/>
+              </a:spcBef>
+              <a:buClr>
+                <a:schemeClr val="tx1"/>
+              </a:buClr>
+              <a:buFont typeface="Arial" panose="020B0604020202020204" pitchFamily="34" charset="0"/>
+              <a:buChar char="•"/>
+              <a:defRPr sz="1400" kern="1200" cap="all" baseline="0">
+                <a:solidFill>
+                  <a:schemeClr val="tx1"/>
+                </a:solidFill>
+                <a:effectLst/>
+                <a:latin typeface="+mn-lt"/>
+                <a:ea typeface="+mn-ea"/>
+                <a:cs typeface="+mn-cs"/>
+              </a:defRPr>
+            </a:lvl7pPr>
+            <a:lvl8pPr marL="3429000" indent="-228600" algn="l" defTabSz="914400" rtl="0" eaLnBrk="1" latinLnBrk="0" hangingPunct="1">
+              <a:lnSpc>
+                <a:spcPct val="120000"/>
+              </a:lnSpc>
+              <a:spcBef>
+                <a:spcPts val="500"/>
+              </a:spcBef>
+              <a:buClr>
+                <a:schemeClr val="tx1"/>
+              </a:buClr>
+              <a:buFont typeface="Arial" panose="020B0604020202020204" pitchFamily="34" charset="0"/>
+              <a:buChar char="•"/>
+              <a:defRPr sz="1400" kern="1200" cap="all" baseline="0">
+                <a:solidFill>
+                  <a:schemeClr val="tx1"/>
+                </a:solidFill>
+                <a:effectLst/>
+                <a:latin typeface="+mn-lt"/>
+                <a:ea typeface="+mn-ea"/>
+                <a:cs typeface="+mn-cs"/>
+              </a:defRPr>
+            </a:lvl8pPr>
+            <a:lvl9pPr marL="3886200" indent="-228600" algn="l" defTabSz="914400" rtl="0" eaLnBrk="1" latinLnBrk="0" hangingPunct="1">
+              <a:lnSpc>
+                <a:spcPct val="120000"/>
+              </a:lnSpc>
+              <a:spcBef>
+                <a:spcPts val="500"/>
+              </a:spcBef>
+              <a:buClr>
+                <a:schemeClr val="tx1"/>
+              </a:buClr>
+              <a:buFont typeface="Arial" panose="020B0604020202020204" pitchFamily="34" charset="0"/>
+              <a:buChar char="•"/>
+              <a:defRPr sz="1400" kern="1200" cap="all" baseline="0">
+                <a:solidFill>
+                  <a:schemeClr val="tx1"/>
+                </a:solidFill>
+                <a:effectLst/>
+                <a:latin typeface="+mn-lt"/>
+                <a:ea typeface="+mn-ea"/>
+                <a:cs typeface="+mn-cs"/>
+              </a:defRPr>
+            </a:lvl9pPr>
+          </a:lstStyle>
+          <a:p>
+            <a:pPr lvl="1">
+              <a:lnSpc>
+                <a:spcPts val="3200"/>
+              </a:lnSpc>
+              <a:spcBef>
+                <a:spcPts val="0"/>
+              </a:spcBef>
+              <a:spcAft>
+                <a:spcPts val="1200"/>
+              </a:spcAft>
+              <a:buFont typeface="Wingdings" panose="05000000000000000000" pitchFamily="2" charset="2"/>
+              <a:buChar char="Ø"/>
+            </a:pPr>
+            <a:endParaRPr lang="pt-BR" sz="3000" cap="none" dirty="0"/>
+          </a:p>
+          <a:p>
+            <a:pPr lvl="1">
+              <a:lnSpc>
+                <a:spcPts val="3200"/>
+              </a:lnSpc>
+              <a:spcBef>
+                <a:spcPts val="0"/>
+              </a:spcBef>
+              <a:spcAft>
+                <a:spcPts val="1200"/>
+              </a:spcAft>
+              <a:buFont typeface="Wingdings" panose="05000000000000000000" pitchFamily="2" charset="2"/>
+              <a:buChar char="Ø"/>
+            </a:pPr>
+            <a:r>
+              <a:rPr lang="pt-BR" sz="3000" cap="none" dirty="0" err="1"/>
+              <a:t>hide</a:t>
+            </a:r>
+            <a:r>
+              <a:rPr lang="pt-BR" sz="3000" cap="none" dirty="0"/>
+              <a:t>()</a:t>
+            </a:r>
+          </a:p>
+          <a:p>
+            <a:pPr lvl="1">
+              <a:lnSpc>
+                <a:spcPts val="3200"/>
+              </a:lnSpc>
+              <a:spcBef>
+                <a:spcPts val="0"/>
+              </a:spcBef>
+              <a:spcAft>
+                <a:spcPts val="1200"/>
+              </a:spcAft>
+              <a:buFont typeface="Wingdings" panose="05000000000000000000" pitchFamily="2" charset="2"/>
+              <a:buChar char="Ø"/>
+            </a:pPr>
+            <a:r>
+              <a:rPr lang="pt-BR" sz="3000" cap="none" dirty="0"/>
+              <a:t>show()</a:t>
+            </a:r>
+          </a:p>
+          <a:p>
+            <a:pPr lvl="1">
+              <a:lnSpc>
+                <a:spcPts val="3200"/>
+              </a:lnSpc>
+              <a:spcBef>
+                <a:spcPts val="0"/>
+              </a:spcBef>
+              <a:spcAft>
+                <a:spcPts val="1200"/>
+              </a:spcAft>
+              <a:buFont typeface="Wingdings" panose="05000000000000000000" pitchFamily="2" charset="2"/>
+              <a:buChar char="Ø"/>
+            </a:pPr>
+            <a:r>
+              <a:rPr lang="pt-BR" sz="3000" cap="none" dirty="0" err="1"/>
+              <a:t>toggle</a:t>
+            </a:r>
+            <a:r>
+              <a:rPr lang="pt-BR" sz="3000" cap="none" dirty="0"/>
+              <a:t>()</a:t>
+            </a:r>
+          </a:p>
+          <a:p>
+            <a:pPr lvl="1">
+              <a:lnSpc>
+                <a:spcPts val="3200"/>
+              </a:lnSpc>
+              <a:spcBef>
+                <a:spcPts val="0"/>
+              </a:spcBef>
+              <a:spcAft>
+                <a:spcPts val="1200"/>
+              </a:spcAft>
+              <a:buFont typeface="Wingdings" panose="05000000000000000000" pitchFamily="2" charset="2"/>
+              <a:buChar char="Ø"/>
+            </a:pPr>
+            <a:r>
+              <a:rPr lang="pt-BR" sz="3000" cap="none" dirty="0" err="1"/>
+              <a:t>slideUp</a:t>
+            </a:r>
+            <a:r>
+              <a:rPr lang="pt-BR" sz="3000" cap="none" dirty="0"/>
+              <a:t>()</a:t>
+            </a:r>
+          </a:p>
+          <a:p>
+            <a:pPr lvl="1">
+              <a:lnSpc>
+                <a:spcPts val="3200"/>
+              </a:lnSpc>
+              <a:spcBef>
+                <a:spcPts val="0"/>
+              </a:spcBef>
+              <a:spcAft>
+                <a:spcPts val="1200"/>
+              </a:spcAft>
+              <a:buFont typeface="Wingdings" panose="05000000000000000000" pitchFamily="2" charset="2"/>
+              <a:buChar char="Ø"/>
+            </a:pPr>
+            <a:r>
+              <a:rPr lang="pt-BR" sz="3000" cap="none" dirty="0" err="1"/>
+              <a:t>slideDown</a:t>
+            </a:r>
+            <a:r>
+              <a:rPr lang="pt-BR" sz="3000" cap="none" dirty="0"/>
+              <a:t>()</a:t>
+            </a:r>
+          </a:p>
+          <a:p>
+            <a:pPr lvl="1">
+              <a:lnSpc>
+                <a:spcPts val="3200"/>
+              </a:lnSpc>
+              <a:spcBef>
+                <a:spcPts val="0"/>
+              </a:spcBef>
+              <a:spcAft>
+                <a:spcPts val="1200"/>
+              </a:spcAft>
+              <a:buFont typeface="Wingdings" panose="05000000000000000000" pitchFamily="2" charset="2"/>
+              <a:buChar char="Ø"/>
+            </a:pPr>
+            <a:r>
+              <a:rPr lang="pt-BR" sz="3000" cap="none" dirty="0" err="1"/>
+              <a:t>slideToggle</a:t>
+            </a:r>
+            <a:r>
+              <a:rPr lang="pt-BR" sz="3000" cap="none" dirty="0"/>
+              <a:t>()</a:t>
+            </a:r>
+          </a:p>
+        </p:txBody>
+      </p:sp>
+    </p:spTree>
+    <p:extLst>
+      <p:ext uri="{BB962C8B-B14F-4D97-AF65-F5344CB8AC3E}">
+        <p14:creationId xmlns:p14="http://schemas.microsoft.com/office/powerpoint/2010/main" val="3037859413"/>
+      </p:ext>
+    </p:extLst>
+  </p:cSld>
+  <p:clrMapOvr>
+    <a:masterClrMapping/>
+  </p:clrMapOvr>
+</p:sld>
+</file>
+
+<file path=ppt/slides/slide31.xml><?xml version="1.0" encoding="utf-8"?>
+<p:sld xmlns:a="http://schemas.openxmlformats.org/drawingml/2006/main" xmlns:r="http://schemas.openxmlformats.org/officeDocument/2006/relationships" xmlns:p="http://schemas.openxmlformats.org/presentationml/2006/main">
+  <p:cSld>
+    <p:spTree>
+      <p:nvGrpSpPr>
+        <p:cNvPr id="1" name=""/>
+        <p:cNvGrpSpPr/>
+        <p:nvPr/>
+      </p:nvGrpSpPr>
+      <p:grpSpPr>
+        <a:xfrm>
+          <a:off x="0" y="0"/>
+          <a:ext cx="0" cy="0"/>
+          <a:chOff x="0" y="0"/>
+          <a:chExt cx="0" cy="0"/>
+        </a:xfrm>
+      </p:grpSpPr>
+      <p:sp>
+        <p:nvSpPr>
+          <p:cNvPr id="2" name="Título 1">
+            <a:extLst>
+              <a:ext uri="{FF2B5EF4-FFF2-40B4-BE49-F238E27FC236}">
+                <a16:creationId xmlns:a16="http://schemas.microsoft.com/office/drawing/2014/main" id="{9CEC5963-F278-AA5A-BD6D-D091F5B5F7EF}"/>
+              </a:ext>
+            </a:extLst>
+          </p:cNvPr>
+          <p:cNvSpPr>
+            <a:spLocks noGrp="1"/>
+          </p:cNvSpPr>
+          <p:nvPr>
+            <p:ph type="title"/>
+          </p:nvPr>
+        </p:nvSpPr>
+        <p:spPr>
+          <a:xfrm>
+            <a:off x="913775" y="618518"/>
+            <a:ext cx="10364451" cy="1067670"/>
+          </a:xfrm>
+        </p:spPr>
+        <p:txBody>
+          <a:bodyPr>
+            <a:normAutofit/>
+          </a:bodyPr>
+          <a:lstStyle/>
+          <a:p>
+            <a:r>
+              <a:rPr lang="pt-BR" sz="4800" dirty="0"/>
+              <a:t>Animações com </a:t>
+            </a:r>
+            <a:r>
+              <a:rPr lang="pt-BR" sz="4800" dirty="0" err="1"/>
+              <a:t>jquery</a:t>
+            </a:r>
+            <a:endParaRPr lang="pt-BR" sz="4800" dirty="0"/>
+          </a:p>
+        </p:txBody>
+      </p:sp>
+      <p:sp>
+        <p:nvSpPr>
+          <p:cNvPr id="3" name="Espaço Reservado para Conteúdo 2">
+            <a:extLst>
+              <a:ext uri="{FF2B5EF4-FFF2-40B4-BE49-F238E27FC236}">
+                <a16:creationId xmlns:a16="http://schemas.microsoft.com/office/drawing/2014/main" id="{2C18BE2C-D36D-EA9D-031D-5C5C54A848FC}"/>
+              </a:ext>
+            </a:extLst>
+          </p:cNvPr>
+          <p:cNvSpPr>
+            <a:spLocks noGrp="1"/>
+          </p:cNvSpPr>
+          <p:nvPr>
+            <p:ph sz="quarter" idx="13"/>
+          </p:nvPr>
+        </p:nvSpPr>
+        <p:spPr>
+          <a:xfrm>
+            <a:off x="1661020" y="2038524"/>
+            <a:ext cx="9616579" cy="4429388"/>
+          </a:xfrm>
+        </p:spPr>
+        <p:txBody>
+          <a:bodyPr>
+            <a:normAutofit/>
+          </a:bodyPr>
+          <a:lstStyle/>
+          <a:p>
+            <a:pPr marL="0" indent="0">
+              <a:lnSpc>
+                <a:spcPts val="3200"/>
+              </a:lnSpc>
+              <a:spcBef>
+                <a:spcPts val="0"/>
+              </a:spcBef>
+              <a:buNone/>
+            </a:pPr>
+            <a:r>
+              <a:rPr lang="en-US" sz="3200" cap="none" dirty="0"/>
+              <a:t>$(</a:t>
+            </a:r>
+            <a:r>
+              <a:rPr lang="en-US" sz="3200" i="1" cap="none" dirty="0"/>
+              <a:t>element</a:t>
+            </a:r>
+            <a:r>
+              <a:rPr lang="en-US" sz="3200" cap="none" dirty="0"/>
+              <a:t>).animate({ height : ‘200px'},</a:t>
+            </a:r>
+          </a:p>
+          <a:p>
+            <a:pPr marL="0" indent="0">
+              <a:lnSpc>
+                <a:spcPts val="3200"/>
+              </a:lnSpc>
+              <a:spcBef>
+                <a:spcPts val="0"/>
+              </a:spcBef>
+              <a:buNone/>
+            </a:pPr>
+            <a:r>
+              <a:rPr lang="en-US" sz="3200" cap="none" dirty="0"/>
+              <a:t>                                350,</a:t>
+            </a:r>
+          </a:p>
+          <a:p>
+            <a:pPr marL="0" indent="0">
+              <a:lnSpc>
+                <a:spcPts val="3200"/>
+              </a:lnSpc>
+              <a:spcBef>
+                <a:spcPts val="0"/>
+              </a:spcBef>
+              <a:buNone/>
+            </a:pPr>
+            <a:r>
+              <a:rPr lang="en-US" sz="3200" cap="none" dirty="0"/>
+              <a:t>                                ‘swing’</a:t>
+            </a:r>
+          </a:p>
+          <a:p>
+            <a:pPr marL="0" indent="0">
+              <a:lnSpc>
+                <a:spcPts val="3200"/>
+              </a:lnSpc>
+              <a:spcBef>
+                <a:spcPts val="0"/>
+              </a:spcBef>
+              <a:buNone/>
+            </a:pPr>
+            <a:r>
+              <a:rPr lang="en-US" sz="3200" cap="none" dirty="0"/>
+              <a:t>				/*, callback*/);</a:t>
+            </a:r>
+          </a:p>
+          <a:p>
+            <a:pPr marL="0" indent="0">
+              <a:lnSpc>
+                <a:spcPts val="3200"/>
+              </a:lnSpc>
+              <a:spcBef>
+                <a:spcPts val="0"/>
+              </a:spcBef>
+              <a:buNone/>
+            </a:pPr>
+            <a:endParaRPr lang="en-US" sz="3200" cap="none" dirty="0"/>
+          </a:p>
+          <a:p>
+            <a:pPr marL="0" indent="0">
+              <a:lnSpc>
+                <a:spcPts val="3200"/>
+              </a:lnSpc>
+              <a:spcBef>
+                <a:spcPts val="0"/>
+              </a:spcBef>
+              <a:buNone/>
+            </a:pPr>
+            <a:r>
+              <a:rPr lang="en-US" sz="3200" cap="none" dirty="0"/>
+              <a:t>$(</a:t>
+            </a:r>
+            <a:r>
+              <a:rPr lang="en-US" sz="3200" i="1" cap="none" dirty="0"/>
+              <a:t>element</a:t>
+            </a:r>
+            <a:r>
+              <a:rPr lang="en-US" sz="3200" cap="none" dirty="0"/>
+              <a:t>).</a:t>
+            </a:r>
+            <a:r>
+              <a:rPr lang="en-US" sz="3200" cap="none" dirty="0" err="1"/>
+              <a:t>fadeIn</a:t>
+            </a:r>
+            <a:r>
+              <a:rPr lang="en-US" sz="3200" cap="none" dirty="0"/>
+              <a:t>(500);</a:t>
+            </a:r>
+            <a:endParaRPr lang="pt-BR" sz="3200" cap="none" dirty="0"/>
+          </a:p>
+        </p:txBody>
+      </p:sp>
+    </p:spTree>
+    <p:extLst>
+      <p:ext uri="{BB962C8B-B14F-4D97-AF65-F5344CB8AC3E}">
+        <p14:creationId xmlns:p14="http://schemas.microsoft.com/office/powerpoint/2010/main" val="4042244492"/>
+      </p:ext>
+    </p:extLst>
+  </p:cSld>
+  <p:clrMapOvr>
+    <a:masterClrMapping/>
+  </p:clrMapOvr>
+</p:sld>
+</file>
+
+<file path=ppt/slides/slide32.xml><?xml version="1.0" encoding="utf-8"?>
+<p:sld xmlns:a="http://schemas.openxmlformats.org/drawingml/2006/main" xmlns:r="http://schemas.openxmlformats.org/officeDocument/2006/relationships" xmlns:p="http://schemas.openxmlformats.org/presentationml/2006/main">
+  <p:cSld>
+    <p:spTree>
+      <p:nvGrpSpPr>
+        <p:cNvPr id="1" name=""/>
+        <p:cNvGrpSpPr/>
+        <p:nvPr/>
+      </p:nvGrpSpPr>
+      <p:grpSpPr>
+        <a:xfrm>
+          <a:off x="0" y="0"/>
+          <a:ext cx="0" cy="0"/>
+          <a:chOff x="0" y="0"/>
+          <a:chExt cx="0" cy="0"/>
+        </a:xfrm>
+      </p:grpSpPr>
+      <p:sp>
+        <p:nvSpPr>
+          <p:cNvPr id="2" name="Título 1">
+            <a:extLst>
+              <a:ext uri="{FF2B5EF4-FFF2-40B4-BE49-F238E27FC236}">
+                <a16:creationId xmlns:a16="http://schemas.microsoft.com/office/drawing/2014/main" id="{9CEC5963-F278-AA5A-BD6D-D091F5B5F7EF}"/>
+              </a:ext>
+            </a:extLst>
+          </p:cNvPr>
+          <p:cNvSpPr>
+            <a:spLocks noGrp="1"/>
+          </p:cNvSpPr>
+          <p:nvPr>
+            <p:ph type="title"/>
+          </p:nvPr>
+        </p:nvSpPr>
+        <p:spPr>
+          <a:xfrm>
+            <a:off x="0" y="262918"/>
+            <a:ext cx="12192002" cy="1984982"/>
+          </a:xfrm>
+        </p:spPr>
+        <p:txBody>
+          <a:bodyPr>
+            <a:normAutofit/>
+          </a:bodyPr>
+          <a:lstStyle/>
+          <a:p>
+            <a:r>
+              <a:rPr lang="pt-BR" sz="4800" dirty="0"/>
+              <a:t>Ajax</a:t>
+            </a:r>
+            <a:br>
+              <a:rPr lang="pt-BR" sz="4800" dirty="0"/>
+            </a:br>
+            <a:r>
+              <a:rPr lang="pt-BR" sz="4000" dirty="0"/>
+              <a:t>(</a:t>
+            </a:r>
+            <a:r>
+              <a:rPr lang="pt-BR" sz="4000" dirty="0" err="1"/>
+              <a:t>Asynchronous</a:t>
+            </a:r>
+            <a:r>
+              <a:rPr lang="pt-BR" sz="4000" dirty="0"/>
+              <a:t> </a:t>
+            </a:r>
+            <a:r>
+              <a:rPr lang="pt-BR" sz="4000" dirty="0" err="1"/>
+              <a:t>JavaScript</a:t>
+            </a:r>
+            <a:r>
+              <a:rPr lang="pt-BR" sz="4000" dirty="0"/>
+              <a:t> </a:t>
+            </a:r>
+            <a:r>
+              <a:rPr lang="pt-BR" sz="4000" dirty="0" err="1"/>
+              <a:t>And</a:t>
+            </a:r>
+            <a:r>
+              <a:rPr lang="pt-BR" sz="4000" dirty="0"/>
+              <a:t> XML)</a:t>
+            </a:r>
+          </a:p>
+        </p:txBody>
+      </p:sp>
+      <p:sp>
+        <p:nvSpPr>
+          <p:cNvPr id="3" name="Espaço Reservado para Conteúdo 2">
+            <a:extLst>
+              <a:ext uri="{FF2B5EF4-FFF2-40B4-BE49-F238E27FC236}">
+                <a16:creationId xmlns:a16="http://schemas.microsoft.com/office/drawing/2014/main" id="{2C18BE2C-D36D-EA9D-031D-5C5C54A848FC}"/>
+              </a:ext>
+            </a:extLst>
+          </p:cNvPr>
+          <p:cNvSpPr>
+            <a:spLocks noGrp="1"/>
+          </p:cNvSpPr>
+          <p:nvPr>
+            <p:ph sz="quarter" idx="13"/>
+          </p:nvPr>
+        </p:nvSpPr>
+        <p:spPr>
+          <a:xfrm>
+            <a:off x="2122881" y="2394125"/>
+            <a:ext cx="9192820" cy="4200957"/>
+          </a:xfrm>
+        </p:spPr>
+        <p:txBody>
+          <a:bodyPr>
+            <a:normAutofit/>
+          </a:bodyPr>
+          <a:lstStyle/>
+          <a:p>
+            <a:pPr>
+              <a:lnSpc>
+                <a:spcPct val="100000"/>
+              </a:lnSpc>
+              <a:spcBef>
+                <a:spcPts val="1200"/>
+              </a:spcBef>
+            </a:pPr>
+            <a:r>
+              <a:rPr lang="pt-BR" sz="3200" dirty="0"/>
+              <a:t>Permite troca de dados com um servidor sem a necessidade de recarregar toda a página</a:t>
+            </a:r>
+          </a:p>
+          <a:p>
+            <a:pPr>
+              <a:lnSpc>
+                <a:spcPct val="100000"/>
+              </a:lnSpc>
+              <a:spcBef>
+                <a:spcPts val="1200"/>
+              </a:spcBef>
+            </a:pPr>
+            <a:r>
+              <a:rPr lang="pt-BR" sz="3200" dirty="0"/>
+              <a:t>Diminui trafego entre o servidor, aumentando o desempenho e a velocidade de resposta</a:t>
+            </a:r>
+          </a:p>
+          <a:p>
+            <a:pPr>
+              <a:lnSpc>
+                <a:spcPct val="100000"/>
+              </a:lnSpc>
+              <a:spcBef>
+                <a:spcPts val="1200"/>
+              </a:spcBef>
+            </a:pPr>
+            <a:endParaRPr lang="pt-BR" sz="3200" dirty="0"/>
+          </a:p>
+        </p:txBody>
+      </p:sp>
+    </p:spTree>
+    <p:extLst>
+      <p:ext uri="{BB962C8B-B14F-4D97-AF65-F5344CB8AC3E}">
+        <p14:creationId xmlns:p14="http://schemas.microsoft.com/office/powerpoint/2010/main" val="1560591999"/>
+      </p:ext>
+    </p:extLst>
+  </p:cSld>
+  <p:clrMapOvr>
+    <a:masterClrMapping/>
+  </p:clrMapOvr>
+</p:sld>
+</file>
+
+<file path=ppt/slides/slide33.xml><?xml version="1.0" encoding="utf-8"?>
+<p:sld xmlns:a="http://schemas.openxmlformats.org/drawingml/2006/main" xmlns:r="http://schemas.openxmlformats.org/officeDocument/2006/relationships" xmlns:p="http://schemas.openxmlformats.org/presentationml/2006/main">
+  <p:cSld>
+    <p:spTree>
+      <p:nvGrpSpPr>
+        <p:cNvPr id="1" name=""/>
+        <p:cNvGrpSpPr/>
+        <p:nvPr/>
+      </p:nvGrpSpPr>
+      <p:grpSpPr>
+        <a:xfrm>
+          <a:off x="0" y="0"/>
+          <a:ext cx="0" cy="0"/>
+          <a:chOff x="0" y="0"/>
+          <a:chExt cx="0" cy="0"/>
+        </a:xfrm>
+      </p:grpSpPr>
+      <p:sp>
+        <p:nvSpPr>
+          <p:cNvPr id="2" name="Título 1">
+            <a:extLst>
+              <a:ext uri="{FF2B5EF4-FFF2-40B4-BE49-F238E27FC236}">
+                <a16:creationId xmlns:a16="http://schemas.microsoft.com/office/drawing/2014/main" id="{9CEC5963-F278-AA5A-BD6D-D091F5B5F7EF}"/>
+              </a:ext>
+            </a:extLst>
+          </p:cNvPr>
+          <p:cNvSpPr>
+            <a:spLocks noGrp="1"/>
+          </p:cNvSpPr>
+          <p:nvPr>
+            <p:ph type="title"/>
+          </p:nvPr>
+        </p:nvSpPr>
+        <p:spPr>
+          <a:xfrm>
+            <a:off x="913775" y="618518"/>
+            <a:ext cx="10364451" cy="1067670"/>
+          </a:xfrm>
+        </p:spPr>
+        <p:txBody>
+          <a:bodyPr>
+            <a:normAutofit/>
+          </a:bodyPr>
+          <a:lstStyle/>
+          <a:p>
+            <a:r>
+              <a:rPr lang="pt-BR" sz="4800" dirty="0"/>
+              <a:t>Vantagens do </a:t>
+            </a:r>
+            <a:r>
+              <a:rPr lang="pt-BR" sz="4800" dirty="0" err="1"/>
+              <a:t>jquery</a:t>
+            </a:r>
+            <a:r>
+              <a:rPr lang="pt-BR" sz="4800" dirty="0"/>
+              <a:t> </a:t>
+            </a:r>
+            <a:r>
+              <a:rPr lang="pt-BR" sz="4800" dirty="0" err="1"/>
+              <a:t>ajax</a:t>
+            </a:r>
+            <a:endParaRPr lang="pt-BR" sz="4800" dirty="0"/>
+          </a:p>
+        </p:txBody>
+      </p:sp>
+      <p:sp>
+        <p:nvSpPr>
+          <p:cNvPr id="3" name="Espaço Reservado para Conteúdo 2">
+            <a:extLst>
+              <a:ext uri="{FF2B5EF4-FFF2-40B4-BE49-F238E27FC236}">
+                <a16:creationId xmlns:a16="http://schemas.microsoft.com/office/drawing/2014/main" id="{2C18BE2C-D36D-EA9D-031D-5C5C54A848FC}"/>
+              </a:ext>
+            </a:extLst>
+          </p:cNvPr>
+          <p:cNvSpPr>
+            <a:spLocks noGrp="1"/>
+          </p:cNvSpPr>
+          <p:nvPr>
+            <p:ph sz="quarter" idx="13"/>
+          </p:nvPr>
+        </p:nvSpPr>
+        <p:spPr>
+          <a:xfrm>
+            <a:off x="2072080" y="2038524"/>
+            <a:ext cx="9205519" cy="4429388"/>
+          </a:xfrm>
+        </p:spPr>
+        <p:txBody>
+          <a:bodyPr>
+            <a:normAutofit/>
+          </a:bodyPr>
+          <a:lstStyle/>
+          <a:p>
+            <a:pPr>
+              <a:lnSpc>
+                <a:spcPct val="100000"/>
+              </a:lnSpc>
+              <a:spcBef>
+                <a:spcPts val="1200"/>
+              </a:spcBef>
+              <a:spcAft>
+                <a:spcPts val="600"/>
+              </a:spcAft>
+            </a:pPr>
+            <a:r>
+              <a:rPr lang="pt-BR" sz="3200" dirty="0"/>
+              <a:t>Suporte entre browsers</a:t>
+            </a:r>
+          </a:p>
+          <a:p>
+            <a:pPr>
+              <a:lnSpc>
+                <a:spcPct val="100000"/>
+              </a:lnSpc>
+              <a:spcBef>
+                <a:spcPts val="1200"/>
+              </a:spcBef>
+              <a:spcAft>
+                <a:spcPts val="600"/>
+              </a:spcAft>
+            </a:pPr>
+            <a:r>
+              <a:rPr lang="pt-BR" sz="3200" dirty="0"/>
+              <a:t>Métodos simples e fáceis de usar</a:t>
+            </a:r>
+          </a:p>
+          <a:p>
+            <a:pPr>
+              <a:lnSpc>
+                <a:spcPct val="100000"/>
+              </a:lnSpc>
+              <a:spcBef>
+                <a:spcPts val="1200"/>
+              </a:spcBef>
+              <a:spcAft>
+                <a:spcPts val="600"/>
+              </a:spcAft>
+            </a:pPr>
+            <a:r>
+              <a:rPr lang="pt-BR" sz="3200" dirty="0"/>
+              <a:t>Diminui a quantidade de código</a:t>
+            </a:r>
+          </a:p>
+          <a:p>
+            <a:pPr>
+              <a:lnSpc>
+                <a:spcPct val="100000"/>
+              </a:lnSpc>
+              <a:spcBef>
+                <a:spcPts val="1200"/>
+              </a:spcBef>
+              <a:spcAft>
+                <a:spcPts val="600"/>
+              </a:spcAft>
+            </a:pPr>
+            <a:r>
+              <a:rPr lang="pt-BR" sz="3200" dirty="0"/>
+              <a:t>Facilita a compreensão do código</a:t>
+            </a:r>
+          </a:p>
+        </p:txBody>
+      </p:sp>
+    </p:spTree>
+    <p:extLst>
+      <p:ext uri="{BB962C8B-B14F-4D97-AF65-F5344CB8AC3E}">
+        <p14:creationId xmlns:p14="http://schemas.microsoft.com/office/powerpoint/2010/main" val="2721432981"/>
+      </p:ext>
+    </p:extLst>
+  </p:cSld>
+  <p:clrMapOvr>
+    <a:masterClrMapping/>
+  </p:clrMapOvr>
+</p:sld>
+</file>
+
+<file path=ppt/slides/slide34.xml><?xml version="1.0" encoding="utf-8"?>
+<p:sld xmlns:a="http://schemas.openxmlformats.org/drawingml/2006/main" xmlns:r="http://schemas.openxmlformats.org/officeDocument/2006/relationships" xmlns:p="http://schemas.openxmlformats.org/presentationml/2006/main">
+  <p:cSld>
+    <p:spTree>
+      <p:nvGrpSpPr>
+        <p:cNvPr id="1" name=""/>
+        <p:cNvGrpSpPr/>
+        <p:nvPr/>
+      </p:nvGrpSpPr>
+      <p:grpSpPr>
+        <a:xfrm>
+          <a:off x="0" y="0"/>
+          <a:ext cx="0" cy="0"/>
+          <a:chOff x="0" y="0"/>
+          <a:chExt cx="0" cy="0"/>
+        </a:xfrm>
+      </p:grpSpPr>
+      <p:sp>
+        <p:nvSpPr>
+          <p:cNvPr id="2" name="Título 1">
+            <a:extLst>
+              <a:ext uri="{FF2B5EF4-FFF2-40B4-BE49-F238E27FC236}">
+                <a16:creationId xmlns:a16="http://schemas.microsoft.com/office/drawing/2014/main" id="{9CEC5963-F278-AA5A-BD6D-D091F5B5F7EF}"/>
+              </a:ext>
+            </a:extLst>
+          </p:cNvPr>
+          <p:cNvSpPr>
+            <a:spLocks noGrp="1"/>
+          </p:cNvSpPr>
+          <p:nvPr>
+            <p:ph type="title"/>
+          </p:nvPr>
+        </p:nvSpPr>
+        <p:spPr>
+          <a:xfrm>
+            <a:off x="913775" y="618518"/>
+            <a:ext cx="10364451" cy="1067670"/>
+          </a:xfrm>
+        </p:spPr>
+        <p:txBody>
+          <a:bodyPr>
+            <a:normAutofit/>
+          </a:bodyPr>
+          <a:lstStyle/>
+          <a:p>
+            <a:r>
+              <a:rPr lang="pt-BR" sz="4800" dirty="0" err="1"/>
+              <a:t>typescript</a:t>
+            </a:r>
+            <a:endParaRPr lang="pt-BR" sz="4800" dirty="0"/>
+          </a:p>
+        </p:txBody>
+      </p:sp>
+      <p:sp>
+        <p:nvSpPr>
+          <p:cNvPr id="3" name="Espaço Reservado para Conteúdo 2">
+            <a:extLst>
+              <a:ext uri="{FF2B5EF4-FFF2-40B4-BE49-F238E27FC236}">
+                <a16:creationId xmlns:a16="http://schemas.microsoft.com/office/drawing/2014/main" id="{2C18BE2C-D36D-EA9D-031D-5C5C54A848FC}"/>
+              </a:ext>
+            </a:extLst>
+          </p:cNvPr>
+          <p:cNvSpPr>
+            <a:spLocks noGrp="1"/>
+          </p:cNvSpPr>
+          <p:nvPr>
+            <p:ph sz="quarter" idx="13"/>
+          </p:nvPr>
+        </p:nvSpPr>
+        <p:spPr>
+          <a:xfrm>
+            <a:off x="2072080" y="2038524"/>
+            <a:ext cx="9205519" cy="4200957"/>
+          </a:xfrm>
+        </p:spPr>
+        <p:txBody>
+          <a:bodyPr>
+            <a:normAutofit/>
+          </a:bodyPr>
+          <a:lstStyle/>
+          <a:p>
+            <a:pPr>
+              <a:lnSpc>
+                <a:spcPct val="100000"/>
+              </a:lnSpc>
+              <a:spcBef>
+                <a:spcPts val="0"/>
+              </a:spcBef>
+            </a:pPr>
+            <a:r>
+              <a:rPr lang="pt-BR" sz="3200" dirty="0"/>
+              <a:t>Criado em 2012, pela </a:t>
+            </a:r>
+            <a:r>
+              <a:rPr lang="pt-BR" sz="3200" dirty="0" err="1"/>
+              <a:t>microsoft</a:t>
+            </a:r>
+            <a:endParaRPr lang="pt-BR" sz="3200" dirty="0"/>
+          </a:p>
+          <a:p>
+            <a:r>
+              <a:rPr lang="pt-BR" sz="3200" dirty="0"/>
+              <a:t>Linguagem de programação orientada a objetos</a:t>
+            </a:r>
+          </a:p>
+          <a:p>
+            <a:r>
+              <a:rPr lang="pt-BR" sz="3200" dirty="0"/>
+              <a:t>VERSÃO ATUAL 4.8.4</a:t>
+            </a:r>
+          </a:p>
+          <a:p>
+            <a:r>
+              <a:rPr lang="pt-BR" sz="3200" dirty="0" err="1"/>
+              <a:t>transpilado</a:t>
+            </a:r>
+            <a:r>
+              <a:rPr lang="pt-BR" sz="3200" dirty="0"/>
+              <a:t> para </a:t>
+            </a:r>
+            <a:r>
+              <a:rPr lang="pt-BR" sz="3200" dirty="0" err="1"/>
+              <a:t>javascript</a:t>
+            </a:r>
+            <a:endParaRPr lang="pt-BR" sz="3200" dirty="0"/>
+          </a:p>
+        </p:txBody>
+      </p:sp>
+    </p:spTree>
+    <p:extLst>
+      <p:ext uri="{BB962C8B-B14F-4D97-AF65-F5344CB8AC3E}">
+        <p14:creationId xmlns:p14="http://schemas.microsoft.com/office/powerpoint/2010/main" val="45103080"/>
+      </p:ext>
+    </p:extLst>
+  </p:cSld>
+  <p:clrMapOvr>
+    <a:masterClrMapping/>
+  </p:clrMapOvr>
+</p:sld>
+</file>
+
+<file path=ppt/slides/slide35.xml><?xml version="1.0" encoding="utf-8"?>
+<p:sld xmlns:a="http://schemas.openxmlformats.org/drawingml/2006/main" xmlns:r="http://schemas.openxmlformats.org/officeDocument/2006/relationships" xmlns:p="http://schemas.openxmlformats.org/presentationml/2006/main">
+  <p:cSld>
+    <p:spTree>
+      <p:nvGrpSpPr>
+        <p:cNvPr id="1" name=""/>
+        <p:cNvGrpSpPr/>
+        <p:nvPr/>
+      </p:nvGrpSpPr>
+      <p:grpSpPr>
+        <a:xfrm>
+          <a:off x="0" y="0"/>
+          <a:ext cx="0" cy="0"/>
+          <a:chOff x="0" y="0"/>
+          <a:chExt cx="0" cy="0"/>
+        </a:xfrm>
+      </p:grpSpPr>
+      <p:sp>
+        <p:nvSpPr>
+          <p:cNvPr id="2" name="Título 1">
+            <a:extLst>
+              <a:ext uri="{FF2B5EF4-FFF2-40B4-BE49-F238E27FC236}">
+                <a16:creationId xmlns:a16="http://schemas.microsoft.com/office/drawing/2014/main" id="{9CEC5963-F278-AA5A-BD6D-D091F5B5F7EF}"/>
+              </a:ext>
+            </a:extLst>
+          </p:cNvPr>
+          <p:cNvSpPr>
+            <a:spLocks noGrp="1"/>
+          </p:cNvSpPr>
+          <p:nvPr>
+            <p:ph type="title"/>
+          </p:nvPr>
+        </p:nvSpPr>
+        <p:spPr>
+          <a:xfrm>
+            <a:off x="913775" y="618518"/>
+            <a:ext cx="10364451" cy="1067670"/>
+          </a:xfrm>
+        </p:spPr>
+        <p:txBody>
+          <a:bodyPr>
+            <a:normAutofit/>
+          </a:bodyPr>
+          <a:lstStyle/>
+          <a:p>
+            <a:r>
+              <a:rPr lang="pt-BR" sz="4800" dirty="0"/>
+              <a:t>Vantagens do </a:t>
+            </a:r>
+            <a:r>
+              <a:rPr lang="pt-BR" sz="4800" dirty="0" err="1"/>
+              <a:t>typescript</a:t>
+            </a:r>
+            <a:endParaRPr lang="pt-BR" sz="4800" dirty="0"/>
+          </a:p>
+        </p:txBody>
+      </p:sp>
+      <p:sp>
+        <p:nvSpPr>
+          <p:cNvPr id="3" name="Espaço Reservado para Conteúdo 2">
+            <a:extLst>
+              <a:ext uri="{FF2B5EF4-FFF2-40B4-BE49-F238E27FC236}">
+                <a16:creationId xmlns:a16="http://schemas.microsoft.com/office/drawing/2014/main" id="{2C18BE2C-D36D-EA9D-031D-5C5C54A848FC}"/>
+              </a:ext>
+            </a:extLst>
+          </p:cNvPr>
+          <p:cNvSpPr>
+            <a:spLocks noGrp="1"/>
+          </p:cNvSpPr>
+          <p:nvPr>
+            <p:ph sz="quarter" idx="13"/>
+          </p:nvPr>
+        </p:nvSpPr>
+        <p:spPr>
+          <a:xfrm>
+            <a:off x="1979803" y="2038524"/>
+            <a:ext cx="9390074" cy="4446166"/>
+          </a:xfrm>
+        </p:spPr>
+        <p:txBody>
+          <a:bodyPr>
+            <a:normAutofit/>
+          </a:bodyPr>
+          <a:lstStyle/>
+          <a:p>
+            <a:pPr>
+              <a:lnSpc>
+                <a:spcPct val="100000"/>
+              </a:lnSpc>
+              <a:spcBef>
+                <a:spcPts val="1200"/>
+              </a:spcBef>
+            </a:pPr>
+            <a:r>
+              <a:rPr lang="pt-BR" sz="3200" dirty="0"/>
+              <a:t>Compatibilidade entre navegadores</a:t>
+            </a:r>
+          </a:p>
+          <a:p>
+            <a:pPr>
+              <a:lnSpc>
+                <a:spcPct val="100000"/>
+              </a:lnSpc>
+              <a:spcBef>
+                <a:spcPts val="1200"/>
+              </a:spcBef>
+            </a:pPr>
+            <a:r>
+              <a:rPr lang="pt-BR" sz="3200" dirty="0"/>
+              <a:t>Beneficia-se dos recursos de ides, como detector de erro de digitação durante a escrita do código</a:t>
+            </a:r>
+          </a:p>
+          <a:p>
+            <a:pPr>
+              <a:lnSpc>
+                <a:spcPct val="100000"/>
+              </a:lnSpc>
+              <a:spcBef>
+                <a:spcPts val="1200"/>
+              </a:spcBef>
+            </a:pPr>
+            <a:r>
+              <a:rPr lang="pt-BR" sz="3200" dirty="0"/>
+              <a:t>Tipagem estática ajuda na prevenção de erros</a:t>
+            </a:r>
+          </a:p>
+          <a:p>
+            <a:pPr>
+              <a:lnSpc>
+                <a:spcPct val="100000"/>
+              </a:lnSpc>
+              <a:spcBef>
+                <a:spcPts val="1200"/>
+              </a:spcBef>
+            </a:pPr>
+            <a:r>
+              <a:rPr lang="pt-BR" sz="3200" dirty="0"/>
+              <a:t>Permite construção de projetos complexos e em larga escala</a:t>
+            </a:r>
+          </a:p>
+        </p:txBody>
+      </p:sp>
+    </p:spTree>
+    <p:extLst>
+      <p:ext uri="{BB962C8B-B14F-4D97-AF65-F5344CB8AC3E}">
+        <p14:creationId xmlns:p14="http://schemas.microsoft.com/office/powerpoint/2010/main" val="2894142344"/>
+      </p:ext>
+    </p:extLst>
+  </p:cSld>
+  <p:clrMapOvr>
+    <a:masterClrMapping/>
+  </p:clrMapOvr>
+</p:sld>
+</file>
+
+<file path=ppt/slides/slide36.xml><?xml version="1.0" encoding="utf-8"?>
+<p:sld xmlns:a="http://schemas.openxmlformats.org/drawingml/2006/main" xmlns:r="http://schemas.openxmlformats.org/officeDocument/2006/relationships" xmlns:p="http://schemas.openxmlformats.org/presentationml/2006/main">
+  <p:cSld>
+    <p:spTree>
+      <p:nvGrpSpPr>
+        <p:cNvPr id="1" name=""/>
+        <p:cNvGrpSpPr/>
+        <p:nvPr/>
+      </p:nvGrpSpPr>
+      <p:grpSpPr>
+        <a:xfrm>
+          <a:off x="0" y="0"/>
+          <a:ext cx="0" cy="0"/>
+          <a:chOff x="0" y="0"/>
+          <a:chExt cx="0" cy="0"/>
+        </a:xfrm>
+      </p:grpSpPr>
+      <p:sp>
+        <p:nvSpPr>
+          <p:cNvPr id="2" name="Título 1">
+            <a:extLst>
+              <a:ext uri="{FF2B5EF4-FFF2-40B4-BE49-F238E27FC236}">
+                <a16:creationId xmlns:a16="http://schemas.microsoft.com/office/drawing/2014/main" id="{9CEC5963-F278-AA5A-BD6D-D091F5B5F7EF}"/>
+              </a:ext>
+            </a:extLst>
+          </p:cNvPr>
+          <p:cNvSpPr>
+            <a:spLocks noGrp="1"/>
+          </p:cNvSpPr>
+          <p:nvPr>
+            <p:ph type="title"/>
+          </p:nvPr>
+        </p:nvSpPr>
+        <p:spPr>
+          <a:xfrm>
+            <a:off x="913775" y="618518"/>
+            <a:ext cx="10364451" cy="1067670"/>
+          </a:xfrm>
+        </p:spPr>
+        <p:txBody>
+          <a:bodyPr>
+            <a:normAutofit fontScale="90000"/>
+          </a:bodyPr>
+          <a:lstStyle/>
+          <a:p>
+            <a:r>
+              <a:rPr lang="pt-BR" sz="4800" dirty="0"/>
+              <a:t>Ferramentas que suportam/usam </a:t>
+            </a:r>
+            <a:r>
+              <a:rPr lang="pt-BR" sz="4800" dirty="0" err="1"/>
+              <a:t>Typescript</a:t>
+            </a:r>
+            <a:endParaRPr lang="pt-BR" sz="4800" dirty="0"/>
+          </a:p>
+        </p:txBody>
+      </p:sp>
+      <p:sp>
+        <p:nvSpPr>
+          <p:cNvPr id="3" name="Espaço Reservado para Conteúdo 2">
+            <a:extLst>
+              <a:ext uri="{FF2B5EF4-FFF2-40B4-BE49-F238E27FC236}">
+                <a16:creationId xmlns:a16="http://schemas.microsoft.com/office/drawing/2014/main" id="{2C18BE2C-D36D-EA9D-031D-5C5C54A848FC}"/>
+              </a:ext>
+            </a:extLst>
+          </p:cNvPr>
+          <p:cNvSpPr>
+            <a:spLocks noGrp="1"/>
+          </p:cNvSpPr>
+          <p:nvPr>
+            <p:ph sz="quarter" idx="13"/>
+          </p:nvPr>
+        </p:nvSpPr>
+        <p:spPr>
+          <a:xfrm>
+            <a:off x="1979803" y="2038524"/>
+            <a:ext cx="9390074" cy="4446166"/>
+          </a:xfrm>
+        </p:spPr>
+        <p:txBody>
+          <a:bodyPr>
+            <a:normAutofit/>
+          </a:bodyPr>
+          <a:lstStyle/>
+          <a:p>
+            <a:pPr>
+              <a:lnSpc>
+                <a:spcPct val="100000"/>
+              </a:lnSpc>
+              <a:spcBef>
+                <a:spcPts val="1200"/>
+              </a:spcBef>
+            </a:pPr>
+            <a:r>
+              <a:rPr lang="pt-BR" sz="3200" dirty="0"/>
+              <a:t>Angular utiliza o </a:t>
+            </a:r>
+            <a:r>
+              <a:rPr lang="pt-BR" sz="3200" dirty="0" err="1"/>
+              <a:t>TypeScript</a:t>
+            </a:r>
+            <a:r>
+              <a:rPr lang="pt-BR" sz="3200" dirty="0"/>
+              <a:t>.</a:t>
+            </a:r>
+          </a:p>
+          <a:p>
+            <a:pPr>
+              <a:lnSpc>
+                <a:spcPct val="100000"/>
+              </a:lnSpc>
+              <a:spcBef>
+                <a:spcPts val="1200"/>
+              </a:spcBef>
+            </a:pPr>
+            <a:r>
+              <a:rPr lang="pt-BR" sz="3200" dirty="0"/>
+              <a:t>Vue.js possui suporte</a:t>
+            </a:r>
+          </a:p>
+          <a:p>
+            <a:pPr>
+              <a:lnSpc>
+                <a:spcPct val="100000"/>
+              </a:lnSpc>
+              <a:spcBef>
+                <a:spcPts val="1200"/>
+              </a:spcBef>
+            </a:pPr>
+            <a:r>
+              <a:rPr lang="pt-BR" sz="3200" dirty="0" err="1"/>
+              <a:t>React</a:t>
+            </a:r>
+            <a:r>
+              <a:rPr lang="pt-BR" sz="3200" dirty="0"/>
+              <a:t>, possui </a:t>
+            </a:r>
+            <a:r>
+              <a:rPr lang="pt-BR" sz="3200" dirty="0" err="1"/>
+              <a:t>template</a:t>
+            </a:r>
+            <a:r>
+              <a:rPr lang="pt-BR" sz="3200" dirty="0"/>
+              <a:t> padrão </a:t>
+            </a:r>
+            <a:r>
+              <a:rPr lang="pt-BR" sz="3200" dirty="0" err="1"/>
+              <a:t>js</a:t>
+            </a:r>
+            <a:r>
+              <a:rPr lang="pt-BR" sz="3200" dirty="0"/>
+              <a:t>, porem pode ser facilmente adaptado para </a:t>
+            </a:r>
+            <a:r>
+              <a:rPr lang="pt-BR" sz="3200" dirty="0" err="1"/>
+              <a:t>ts</a:t>
+            </a:r>
+            <a:endParaRPr lang="pt-BR" sz="3200" dirty="0"/>
+          </a:p>
+        </p:txBody>
+      </p:sp>
+    </p:spTree>
+    <p:extLst>
+      <p:ext uri="{BB962C8B-B14F-4D97-AF65-F5344CB8AC3E}">
+        <p14:creationId xmlns:p14="http://schemas.microsoft.com/office/powerpoint/2010/main" val="525664474"/>
+      </p:ext>
+    </p:extLst>
+  </p:cSld>
+  <p:clrMapOvr>
+    <a:masterClrMapping/>
+  </p:clrMapOvr>
+</p:sld>
+</file>
+
+<file path=ppt/slides/slide37.xml><?xml version="1.0" encoding="utf-8"?>
+<p:sld xmlns:a="http://schemas.openxmlformats.org/drawingml/2006/main" xmlns:r="http://schemas.openxmlformats.org/officeDocument/2006/relationships" xmlns:p="http://schemas.openxmlformats.org/presentationml/2006/main">
+  <p:cSld>
+    <p:spTree>
+      <p:nvGrpSpPr>
+        <p:cNvPr id="1" name=""/>
+        <p:cNvGrpSpPr/>
+        <p:nvPr/>
+      </p:nvGrpSpPr>
+      <p:grpSpPr>
+        <a:xfrm>
+          <a:off x="0" y="0"/>
+          <a:ext cx="0" cy="0"/>
+          <a:chOff x="0" y="0"/>
+          <a:chExt cx="0" cy="0"/>
+        </a:xfrm>
+      </p:grpSpPr>
+      <p:sp>
+        <p:nvSpPr>
+          <p:cNvPr id="2" name="Título 1">
+            <a:extLst>
+              <a:ext uri="{FF2B5EF4-FFF2-40B4-BE49-F238E27FC236}">
+                <a16:creationId xmlns:a16="http://schemas.microsoft.com/office/drawing/2014/main" id="{9CEC5963-F278-AA5A-BD6D-D091F5B5F7EF}"/>
+              </a:ext>
+            </a:extLst>
+          </p:cNvPr>
+          <p:cNvSpPr>
+            <a:spLocks noGrp="1"/>
+          </p:cNvSpPr>
+          <p:nvPr>
+            <p:ph type="title"/>
+          </p:nvPr>
+        </p:nvSpPr>
+        <p:spPr>
+          <a:xfrm>
+            <a:off x="913775" y="618518"/>
+            <a:ext cx="10364451" cy="1067670"/>
+          </a:xfrm>
+        </p:spPr>
+        <p:txBody>
+          <a:bodyPr>
+            <a:normAutofit/>
+          </a:bodyPr>
+          <a:lstStyle/>
+          <a:p>
+            <a:r>
+              <a:rPr lang="pt-BR" sz="4800" dirty="0"/>
+              <a:t>Classe </a:t>
+            </a:r>
+            <a:r>
+              <a:rPr lang="pt-BR" sz="4800" dirty="0" err="1"/>
+              <a:t>typescript</a:t>
+            </a:r>
+            <a:endParaRPr lang="pt-BR" sz="4800" dirty="0"/>
+          </a:p>
+        </p:txBody>
+      </p:sp>
+      <p:sp>
+        <p:nvSpPr>
+          <p:cNvPr id="3" name="Espaço Reservado para Conteúdo 2">
+            <a:extLst>
+              <a:ext uri="{FF2B5EF4-FFF2-40B4-BE49-F238E27FC236}">
+                <a16:creationId xmlns:a16="http://schemas.microsoft.com/office/drawing/2014/main" id="{2C18BE2C-D36D-EA9D-031D-5C5C54A848FC}"/>
+              </a:ext>
+            </a:extLst>
+          </p:cNvPr>
+          <p:cNvSpPr>
+            <a:spLocks noGrp="1"/>
+          </p:cNvSpPr>
+          <p:nvPr>
+            <p:ph sz="quarter" idx="13"/>
+          </p:nvPr>
+        </p:nvSpPr>
+        <p:spPr>
+          <a:xfrm>
+            <a:off x="0" y="1686188"/>
+            <a:ext cx="12192000" cy="4915948"/>
+          </a:xfrm>
+        </p:spPr>
+        <p:txBody>
+          <a:bodyPr>
+            <a:normAutofit/>
+          </a:bodyPr>
+          <a:lstStyle/>
+          <a:p>
+            <a:pPr marL="457200" lvl="1" indent="0">
+              <a:lnSpc>
+                <a:spcPts val="2800"/>
+              </a:lnSpc>
+              <a:spcBef>
+                <a:spcPts val="0"/>
+              </a:spcBef>
+              <a:buNone/>
+            </a:pPr>
+            <a:r>
+              <a:rPr lang="pt-BR" sz="2800" cap="none" dirty="0" err="1"/>
+              <a:t>class</a:t>
+            </a:r>
+            <a:r>
+              <a:rPr lang="pt-BR" sz="2800" cap="none" dirty="0"/>
+              <a:t> Pessoa {</a:t>
+            </a:r>
+          </a:p>
+          <a:p>
+            <a:pPr marL="457200" lvl="1" indent="0">
+              <a:lnSpc>
+                <a:spcPts val="2800"/>
+              </a:lnSpc>
+              <a:spcBef>
+                <a:spcPts val="0"/>
+              </a:spcBef>
+              <a:buNone/>
+            </a:pPr>
+            <a:r>
+              <a:rPr lang="pt-BR" sz="2800" cap="none" dirty="0"/>
+              <a:t>	</a:t>
+            </a:r>
+            <a:r>
+              <a:rPr lang="pt-BR" sz="2800" cap="none" dirty="0" err="1"/>
+              <a:t>private</a:t>
+            </a:r>
+            <a:r>
+              <a:rPr lang="pt-BR" sz="2800" cap="none" dirty="0"/>
+              <a:t> nome: </a:t>
+            </a:r>
+            <a:r>
+              <a:rPr lang="pt-BR" sz="2800" cap="none" dirty="0" err="1"/>
+              <a:t>string</a:t>
+            </a:r>
+            <a:r>
+              <a:rPr lang="pt-BR" sz="2800" cap="none" dirty="0"/>
+              <a:t>;</a:t>
+            </a:r>
+          </a:p>
+          <a:p>
+            <a:pPr marL="457200" lvl="1" indent="0">
+              <a:lnSpc>
+                <a:spcPts val="2800"/>
+              </a:lnSpc>
+              <a:spcBef>
+                <a:spcPts val="0"/>
+              </a:spcBef>
+              <a:buNone/>
+            </a:pPr>
+            <a:r>
+              <a:rPr lang="pt-BR" sz="2800" cap="none" dirty="0"/>
+              <a:t>	</a:t>
+            </a:r>
+            <a:r>
+              <a:rPr lang="pt-BR" sz="2800" cap="none" dirty="0" err="1"/>
+              <a:t>private</a:t>
+            </a:r>
+            <a:r>
+              <a:rPr lang="pt-BR" sz="2800" cap="none" dirty="0"/>
+              <a:t> idade: </a:t>
+            </a:r>
+            <a:r>
+              <a:rPr lang="pt-BR" sz="2800" cap="none" dirty="0" err="1"/>
+              <a:t>number</a:t>
+            </a:r>
+            <a:r>
+              <a:rPr lang="pt-BR" sz="2800" cap="none" dirty="0"/>
+              <a:t>;</a:t>
+            </a:r>
+          </a:p>
+          <a:p>
+            <a:pPr marL="457200" lvl="1" indent="0">
+              <a:lnSpc>
+                <a:spcPts val="2800"/>
+              </a:lnSpc>
+              <a:spcBef>
+                <a:spcPts val="0"/>
+              </a:spcBef>
+              <a:buNone/>
+            </a:pPr>
+            <a:r>
+              <a:rPr lang="pt-BR" sz="2800" cap="none" dirty="0"/>
+              <a:t>	</a:t>
+            </a:r>
+          </a:p>
+          <a:p>
+            <a:pPr marL="457200" lvl="1" indent="0">
+              <a:lnSpc>
+                <a:spcPts val="2800"/>
+              </a:lnSpc>
+              <a:spcBef>
+                <a:spcPts val="0"/>
+              </a:spcBef>
+              <a:buNone/>
+            </a:pPr>
+            <a:r>
+              <a:rPr lang="pt-BR" sz="2800" cap="none" dirty="0"/>
+              <a:t>	</a:t>
+            </a:r>
+            <a:r>
+              <a:rPr lang="pt-BR" sz="2800" cap="none" dirty="0" err="1"/>
+              <a:t>constructor</a:t>
+            </a:r>
+            <a:r>
+              <a:rPr lang="pt-BR" sz="2800" cap="none" dirty="0"/>
+              <a:t>(</a:t>
+            </a:r>
+            <a:r>
+              <a:rPr lang="pt-BR" sz="2800" cap="none" dirty="0" err="1"/>
+              <a:t>nome:string</a:t>
+            </a:r>
+            <a:r>
+              <a:rPr lang="pt-BR" sz="2800" cap="none" dirty="0"/>
+              <a:t>, </a:t>
+            </a:r>
+            <a:r>
+              <a:rPr lang="pt-BR" sz="2800" cap="none" dirty="0" err="1"/>
+              <a:t>idade:number</a:t>
+            </a:r>
+            <a:r>
+              <a:rPr lang="pt-BR" sz="2800" cap="none" dirty="0"/>
+              <a:t>){</a:t>
+            </a:r>
+          </a:p>
+          <a:p>
+            <a:pPr marL="457200" lvl="1" indent="0">
+              <a:lnSpc>
+                <a:spcPts val="2800"/>
+              </a:lnSpc>
+              <a:spcBef>
+                <a:spcPts val="0"/>
+              </a:spcBef>
+              <a:buNone/>
+            </a:pPr>
+            <a:r>
+              <a:rPr lang="pt-BR" sz="2800" cap="none" dirty="0"/>
+              <a:t>		</a:t>
+            </a:r>
+            <a:r>
+              <a:rPr lang="pt-BR" sz="2800" cap="none" dirty="0" err="1"/>
+              <a:t>this</a:t>
+            </a:r>
+            <a:r>
+              <a:rPr lang="pt-BR" sz="2800" cap="none" dirty="0"/>
+              <a:t>. nome = nome;</a:t>
+            </a:r>
+          </a:p>
+          <a:p>
+            <a:pPr marL="457200" lvl="1" indent="0">
+              <a:lnSpc>
+                <a:spcPts val="2800"/>
+              </a:lnSpc>
+              <a:spcBef>
+                <a:spcPts val="0"/>
+              </a:spcBef>
+              <a:buNone/>
+            </a:pPr>
+            <a:r>
+              <a:rPr lang="pt-BR" sz="2800" cap="none" dirty="0"/>
+              <a:t>		</a:t>
+            </a:r>
+            <a:r>
+              <a:rPr lang="pt-BR" sz="2800" cap="none" dirty="0" err="1"/>
+              <a:t>this</a:t>
+            </a:r>
+            <a:r>
+              <a:rPr lang="pt-BR" sz="2800" cap="none" dirty="0"/>
+              <a:t>. idade = idade;</a:t>
+            </a:r>
+          </a:p>
+          <a:p>
+            <a:pPr marL="457200" lvl="1" indent="0">
+              <a:lnSpc>
+                <a:spcPts val="2800"/>
+              </a:lnSpc>
+              <a:spcBef>
+                <a:spcPts val="0"/>
+              </a:spcBef>
+              <a:buNone/>
+            </a:pPr>
+            <a:r>
+              <a:rPr lang="pt-BR" sz="2800" cap="none" dirty="0"/>
+              <a:t>	};</a:t>
+            </a:r>
+          </a:p>
+          <a:p>
+            <a:pPr marL="457200" lvl="1" indent="0">
+              <a:lnSpc>
+                <a:spcPts val="2800"/>
+              </a:lnSpc>
+              <a:spcBef>
+                <a:spcPts val="0"/>
+              </a:spcBef>
+              <a:buNone/>
+            </a:pPr>
+            <a:endParaRPr lang="pt-BR" sz="2800" cap="none" dirty="0"/>
+          </a:p>
+          <a:p>
+            <a:pPr marL="457200" lvl="1" indent="0">
+              <a:lnSpc>
+                <a:spcPts val="2800"/>
+              </a:lnSpc>
+              <a:spcBef>
+                <a:spcPts val="0"/>
+              </a:spcBef>
+              <a:buNone/>
+            </a:pPr>
+            <a:r>
+              <a:rPr lang="pt-BR" sz="2800" cap="none" dirty="0"/>
+              <a:t>	</a:t>
+            </a:r>
+            <a:r>
+              <a:rPr lang="pt-BR" sz="2800" cap="none" dirty="0" err="1"/>
+              <a:t>public</a:t>
+            </a:r>
+            <a:r>
+              <a:rPr lang="pt-BR" sz="2800" cap="none" dirty="0"/>
+              <a:t> </a:t>
+            </a:r>
+            <a:r>
+              <a:rPr lang="pt-BR" sz="2800" cap="none" dirty="0" err="1"/>
+              <a:t>getNome</a:t>
+            </a:r>
+            <a:r>
+              <a:rPr lang="pt-BR" sz="2800" cap="none" dirty="0"/>
+              <a:t>():</a:t>
+            </a:r>
+            <a:r>
+              <a:rPr lang="pt-BR" sz="2800" cap="none" dirty="0" err="1"/>
+              <a:t>string</a:t>
+            </a:r>
+            <a:r>
+              <a:rPr lang="pt-BR" sz="2800" cap="none" dirty="0"/>
+              <a:t>{</a:t>
+            </a:r>
+          </a:p>
+          <a:p>
+            <a:pPr marL="457200" lvl="1" indent="0">
+              <a:lnSpc>
+                <a:spcPts val="2800"/>
+              </a:lnSpc>
+              <a:spcBef>
+                <a:spcPts val="0"/>
+              </a:spcBef>
+              <a:buNone/>
+            </a:pPr>
+            <a:r>
+              <a:rPr lang="pt-BR" sz="2800" cap="none" dirty="0"/>
+              <a:t>		</a:t>
+            </a:r>
+            <a:r>
+              <a:rPr lang="pt-BR" sz="2800" cap="none" dirty="0" err="1"/>
+              <a:t>return</a:t>
+            </a:r>
+            <a:r>
+              <a:rPr lang="pt-BR" sz="2800" cap="none" dirty="0"/>
+              <a:t> </a:t>
+            </a:r>
+            <a:r>
+              <a:rPr lang="pt-BR" sz="2800" cap="none" dirty="0" err="1"/>
+              <a:t>this.Nome</a:t>
+            </a:r>
+            <a:r>
+              <a:rPr lang="pt-BR" sz="2800" cap="none" dirty="0"/>
+              <a:t>;</a:t>
+            </a:r>
+          </a:p>
+          <a:p>
+            <a:pPr marL="457200" lvl="1" indent="0">
+              <a:lnSpc>
+                <a:spcPts val="2800"/>
+              </a:lnSpc>
+              <a:spcBef>
+                <a:spcPts val="0"/>
+              </a:spcBef>
+              <a:buNone/>
+            </a:pPr>
+            <a:r>
+              <a:rPr lang="pt-BR" sz="2800" cap="none" dirty="0"/>
+              <a:t>	};</a:t>
+            </a:r>
+          </a:p>
+          <a:p>
+            <a:pPr marL="457200" lvl="1" indent="0">
+              <a:lnSpc>
+                <a:spcPts val="2800"/>
+              </a:lnSpc>
+              <a:spcBef>
+                <a:spcPts val="0"/>
+              </a:spcBef>
+              <a:buNone/>
+            </a:pPr>
+            <a:r>
+              <a:rPr lang="pt-BR" sz="2800" cap="none" dirty="0"/>
+              <a:t>};</a:t>
+            </a:r>
+            <a:endParaRPr lang="pt-BR" sz="2800" cap="none" dirty="0">
+              <a:highlight>
+                <a:srgbClr val="C0C0C0"/>
+              </a:highlight>
+            </a:endParaRPr>
+          </a:p>
+        </p:txBody>
+      </p:sp>
+    </p:spTree>
+    <p:extLst>
+      <p:ext uri="{BB962C8B-B14F-4D97-AF65-F5344CB8AC3E}">
+        <p14:creationId xmlns:p14="http://schemas.microsoft.com/office/powerpoint/2010/main" val="1920479824"/>
+      </p:ext>
+    </p:extLst>
+  </p:cSld>
+  <p:clrMapOvr>
+    <a:masterClrMapping/>
+  </p:clrMapOvr>
+</p:sld>
+</file>
+
+<file path=ppt/slides/slide38.xml><?xml version="1.0" encoding="utf-8"?>
+<p:sld xmlns:a="http://schemas.openxmlformats.org/drawingml/2006/main" xmlns:r="http://schemas.openxmlformats.org/officeDocument/2006/relationships" xmlns:p="http://schemas.openxmlformats.org/presentationml/2006/main">
+  <p:cSld>
+    <p:spTree>
+      <p:nvGrpSpPr>
+        <p:cNvPr id="1" name=""/>
+        <p:cNvGrpSpPr/>
+        <p:nvPr/>
+      </p:nvGrpSpPr>
+      <p:grpSpPr>
+        <a:xfrm>
+          <a:off x="0" y="0"/>
+          <a:ext cx="0" cy="0"/>
+          <a:chOff x="0" y="0"/>
+          <a:chExt cx="0" cy="0"/>
+        </a:xfrm>
+      </p:grpSpPr>
+      <p:sp>
+        <p:nvSpPr>
+          <p:cNvPr id="2" name="Título 1">
+            <a:extLst>
+              <a:ext uri="{FF2B5EF4-FFF2-40B4-BE49-F238E27FC236}">
+                <a16:creationId xmlns:a16="http://schemas.microsoft.com/office/drawing/2014/main" id="{51F9B6BD-2637-5A82-7B34-8C1E7D78FDE9}"/>
+              </a:ext>
+            </a:extLst>
+          </p:cNvPr>
+          <p:cNvSpPr>
+            <a:spLocks noGrp="1"/>
+          </p:cNvSpPr>
+          <p:nvPr>
+            <p:ph type="ctrTitle"/>
+          </p:nvPr>
+        </p:nvSpPr>
+        <p:spPr/>
+        <p:txBody>
+          <a:bodyPr/>
+          <a:lstStyle/>
+          <a:p>
+            <a:r>
+              <a:rPr lang="pt-BR" dirty="0"/>
+              <a:t>AGRADEÇO A TODOS PELA ATENÇÃO</a:t>
+            </a:r>
+          </a:p>
+        </p:txBody>
+      </p:sp>
+      <p:sp>
+        <p:nvSpPr>
+          <p:cNvPr id="3" name="Subtítulo 2">
+            <a:extLst>
+              <a:ext uri="{FF2B5EF4-FFF2-40B4-BE49-F238E27FC236}">
+                <a16:creationId xmlns:a16="http://schemas.microsoft.com/office/drawing/2014/main" id="{7B75AC7F-FFF1-7784-A06C-3809121991ED}"/>
+              </a:ext>
+            </a:extLst>
+          </p:cNvPr>
+          <p:cNvSpPr>
+            <a:spLocks noGrp="1"/>
+          </p:cNvSpPr>
+          <p:nvPr>
+            <p:ph type="subTitle" idx="1"/>
+          </p:nvPr>
+        </p:nvSpPr>
+        <p:spPr/>
+        <p:txBody>
+          <a:bodyPr/>
+          <a:lstStyle/>
+          <a:p>
+            <a:endParaRPr lang="pt-BR"/>
+          </a:p>
+        </p:txBody>
+      </p:sp>
+    </p:spTree>
+    <p:extLst>
+      <p:ext uri="{BB962C8B-B14F-4D97-AF65-F5344CB8AC3E}">
+        <p14:creationId xmlns:p14="http://schemas.microsoft.com/office/powerpoint/2010/main" val="2097734875"/>
       </p:ext>
     </p:extLst>
   </p:cSld>

</xml_diff>

<commit_message>
Termino parte html do texto
</commit_message>
<xml_diff>
--- a/Arquivos/INTRODUÇÃO A FRONT-END.pptx
+++ b/Arquivos/INTRODUÇÃO A FRONT-END.pptx
@@ -328,7 +328,7 @@
           <a:p>
             <a:fld id="{EF64EDD3-CC31-4653-85DF-1A82825891C3}" type="datetimeFigureOut">
               <a:rPr lang="pt-BR" smtClean="0"/>
-              <a:t>27/10/2022</a:t>
+              <a:t>31/10/2022</a:t>
             </a:fld>
             <a:endParaRPr lang="pt-BR"/>
           </a:p>
@@ -640,7 +640,7 @@
           <a:p>
             <a:fld id="{EF64EDD3-CC31-4653-85DF-1A82825891C3}" type="datetimeFigureOut">
               <a:rPr lang="pt-BR" smtClean="0"/>
-              <a:t>27/10/2022</a:t>
+              <a:t>31/10/2022</a:t>
             </a:fld>
             <a:endParaRPr lang="pt-BR"/>
           </a:p>
@@ -862,7 +862,7 @@
           <a:p>
             <a:fld id="{EF64EDD3-CC31-4653-85DF-1A82825891C3}" type="datetimeFigureOut">
               <a:rPr lang="pt-BR" smtClean="0"/>
-              <a:t>27/10/2022</a:t>
+              <a:t>31/10/2022</a:t>
             </a:fld>
             <a:endParaRPr lang="pt-BR"/>
           </a:p>
@@ -1153,7 +1153,7 @@
           <a:p>
             <a:fld id="{EF64EDD3-CC31-4653-85DF-1A82825891C3}" type="datetimeFigureOut">
               <a:rPr lang="pt-BR" smtClean="0"/>
-              <a:t>27/10/2022</a:t>
+              <a:t>31/10/2022</a:t>
             </a:fld>
             <a:endParaRPr lang="pt-BR"/>
           </a:p>
@@ -1607,7 +1607,7 @@
           <a:p>
             <a:fld id="{EF64EDD3-CC31-4653-85DF-1A82825891C3}" type="datetimeFigureOut">
               <a:rPr lang="pt-BR" smtClean="0"/>
-              <a:t>27/10/2022</a:t>
+              <a:t>31/10/2022</a:t>
             </a:fld>
             <a:endParaRPr lang="pt-BR"/>
           </a:p>
@@ -2183,7 +2183,7 @@
           <a:p>
             <a:fld id="{EF64EDD3-CC31-4653-85DF-1A82825891C3}" type="datetimeFigureOut">
               <a:rPr lang="pt-BR" smtClean="0"/>
-              <a:t>27/10/2022</a:t>
+              <a:t>31/10/2022</a:t>
             </a:fld>
             <a:endParaRPr lang="pt-BR"/>
           </a:p>
@@ -3035,7 +3035,7 @@
           <a:p>
             <a:fld id="{EF64EDD3-CC31-4653-85DF-1A82825891C3}" type="datetimeFigureOut">
               <a:rPr lang="pt-BR" smtClean="0"/>
-              <a:t>27/10/2022</a:t>
+              <a:t>31/10/2022</a:t>
             </a:fld>
             <a:endParaRPr lang="pt-BR"/>
           </a:p>
@@ -3240,7 +3240,7 @@
           <a:p>
             <a:fld id="{EF64EDD3-CC31-4653-85DF-1A82825891C3}" type="datetimeFigureOut">
               <a:rPr lang="pt-BR" smtClean="0"/>
-              <a:t>27/10/2022</a:t>
+              <a:t>31/10/2022</a:t>
             </a:fld>
             <a:endParaRPr lang="pt-BR"/>
           </a:p>
@@ -3454,7 +3454,7 @@
           <a:p>
             <a:fld id="{EF64EDD3-CC31-4653-85DF-1A82825891C3}" type="datetimeFigureOut">
               <a:rPr lang="pt-BR" smtClean="0"/>
-              <a:t>27/10/2022</a:t>
+              <a:t>31/10/2022</a:t>
             </a:fld>
             <a:endParaRPr lang="pt-BR"/>
           </a:p>
@@ -3659,7 +3659,7 @@
           <a:p>
             <a:fld id="{EF64EDD3-CC31-4653-85DF-1A82825891C3}" type="datetimeFigureOut">
               <a:rPr lang="pt-BR" smtClean="0"/>
-              <a:t>27/10/2022</a:t>
+              <a:t>31/10/2022</a:t>
             </a:fld>
             <a:endParaRPr lang="pt-BR"/>
           </a:p>
@@ -3939,7 +3939,7 @@
           <a:p>
             <a:fld id="{EF64EDD3-CC31-4653-85DF-1A82825891C3}" type="datetimeFigureOut">
               <a:rPr lang="pt-BR" smtClean="0"/>
-              <a:t>27/10/2022</a:t>
+              <a:t>31/10/2022</a:t>
             </a:fld>
             <a:endParaRPr lang="pt-BR"/>
           </a:p>
@@ -4206,7 +4206,7 @@
           <a:p>
             <a:fld id="{EF64EDD3-CC31-4653-85DF-1A82825891C3}" type="datetimeFigureOut">
               <a:rPr lang="pt-BR" smtClean="0"/>
-              <a:t>27/10/2022</a:t>
+              <a:t>31/10/2022</a:t>
             </a:fld>
             <a:endParaRPr lang="pt-BR"/>
           </a:p>
@@ -4621,7 +4621,7 @@
           <a:p>
             <a:fld id="{EF64EDD3-CC31-4653-85DF-1A82825891C3}" type="datetimeFigureOut">
               <a:rPr lang="pt-BR" smtClean="0"/>
-              <a:t>27/10/2022</a:t>
+              <a:t>31/10/2022</a:t>
             </a:fld>
             <a:endParaRPr lang="pt-BR"/>
           </a:p>
@@ -4769,7 +4769,7 @@
           <a:p>
             <a:fld id="{EF64EDD3-CC31-4653-85DF-1A82825891C3}" type="datetimeFigureOut">
               <a:rPr lang="pt-BR" smtClean="0"/>
-              <a:t>27/10/2022</a:t>
+              <a:t>31/10/2022</a:t>
             </a:fld>
             <a:endParaRPr lang="pt-BR"/>
           </a:p>
@@ -4894,7 +4894,7 @@
           <a:p>
             <a:fld id="{EF64EDD3-CC31-4653-85DF-1A82825891C3}" type="datetimeFigureOut">
               <a:rPr lang="pt-BR" smtClean="0"/>
-              <a:t>27/10/2022</a:t>
+              <a:t>31/10/2022</a:t>
             </a:fld>
             <a:endParaRPr lang="pt-BR"/>
           </a:p>
@@ -5173,7 +5173,7 @@
           <a:p>
             <a:fld id="{EF64EDD3-CC31-4653-85DF-1A82825891C3}" type="datetimeFigureOut">
               <a:rPr lang="pt-BR" smtClean="0"/>
-              <a:t>27/10/2022</a:t>
+              <a:t>31/10/2022</a:t>
             </a:fld>
             <a:endParaRPr lang="pt-BR"/>
           </a:p>
@@ -5485,7 +5485,7 @@
           <a:p>
             <a:fld id="{EF64EDD3-CC31-4653-85DF-1A82825891C3}" type="datetimeFigureOut">
               <a:rPr lang="pt-BR" smtClean="0"/>
-              <a:t>27/10/2022</a:t>
+              <a:t>31/10/2022</a:t>
             </a:fld>
             <a:endParaRPr lang="pt-BR"/>
           </a:p>
@@ -5738,7 +5738,7 @@
           <a:p>
             <a:fld id="{EF64EDD3-CC31-4653-85DF-1A82825891C3}" type="datetimeFigureOut">
               <a:rPr lang="pt-BR" smtClean="0"/>
-              <a:t>27/10/2022</a:t>
+              <a:t>31/10/2022</a:t>
             </a:fld>
             <a:endParaRPr lang="pt-BR"/>
           </a:p>
@@ -14676,6 +14676,13 @@
           </a:p>
           <a:p>
             <a:r>
+              <a:rPr lang="pt-BR" sz="3200" cap="none" dirty="0" err="1"/>
+              <a:t>style</a:t>
+            </a:r>
+            <a:endParaRPr lang="pt-BR" sz="3200" cap="none" dirty="0"/>
+          </a:p>
+          <a:p>
+            <a:r>
               <a:rPr lang="pt-BR" sz="3200" cap="none" dirty="0"/>
               <a:t>link</a:t>
             </a:r>
@@ -14690,13 +14697,6 @@
             <a:r>
               <a:rPr lang="pt-BR" sz="3200" cap="none" dirty="0" err="1"/>
               <a:t>Img</a:t>
-            </a:r>
-            <a:endParaRPr lang="pt-BR" sz="3200" cap="none" dirty="0"/>
-          </a:p>
-          <a:p>
-            <a:r>
-              <a:rPr lang="pt-BR" sz="3200" cap="none" dirty="0" err="1"/>
-              <a:t>Audio</a:t>
             </a:r>
             <a:endParaRPr lang="pt-BR" sz="3200" cap="none" dirty="0"/>
           </a:p>
@@ -14935,6 +14935,13 @@
               </a:defRPr>
             </a:lvl9pPr>
           </a:lstStyle>
+          <a:p>
+            <a:r>
+              <a:rPr lang="pt-BR" sz="3200" cap="none" dirty="0" err="1"/>
+              <a:t>Audio</a:t>
+            </a:r>
+            <a:endParaRPr lang="pt-BR" sz="3200" cap="none" dirty="0"/>
+          </a:p>
           <a:p>
             <a:r>
               <a:rPr lang="pt-BR" sz="3200" cap="none" dirty="0" err="1"/>

</xml_diff>

<commit_message>
Update INTRODUÇÃO A FRONT-END.pptx
</commit_message>
<xml_diff>
--- a/Arquivos/INTRODUÇÃO A FRONT-END.pptx
+++ b/Arquivos/INTRODUÇÃO A FRONT-END.pptx
@@ -328,7 +328,7 @@
           <a:p>
             <a:fld id="{EF64EDD3-CC31-4653-85DF-1A82825891C3}" type="datetimeFigureOut">
               <a:rPr lang="pt-BR" smtClean="0"/>
-              <a:t>03/11/2022</a:t>
+              <a:t>07/11/2022</a:t>
             </a:fld>
             <a:endParaRPr lang="pt-BR"/>
           </a:p>
@@ -640,7 +640,7 @@
           <a:p>
             <a:fld id="{EF64EDD3-CC31-4653-85DF-1A82825891C3}" type="datetimeFigureOut">
               <a:rPr lang="pt-BR" smtClean="0"/>
-              <a:t>03/11/2022</a:t>
+              <a:t>07/11/2022</a:t>
             </a:fld>
             <a:endParaRPr lang="pt-BR"/>
           </a:p>
@@ -862,7 +862,7 @@
           <a:p>
             <a:fld id="{EF64EDD3-CC31-4653-85DF-1A82825891C3}" type="datetimeFigureOut">
               <a:rPr lang="pt-BR" smtClean="0"/>
-              <a:t>03/11/2022</a:t>
+              <a:t>07/11/2022</a:t>
             </a:fld>
             <a:endParaRPr lang="pt-BR"/>
           </a:p>
@@ -1153,7 +1153,7 @@
           <a:p>
             <a:fld id="{EF64EDD3-CC31-4653-85DF-1A82825891C3}" type="datetimeFigureOut">
               <a:rPr lang="pt-BR" smtClean="0"/>
-              <a:t>03/11/2022</a:t>
+              <a:t>07/11/2022</a:t>
             </a:fld>
             <a:endParaRPr lang="pt-BR"/>
           </a:p>
@@ -1607,7 +1607,7 @@
           <a:p>
             <a:fld id="{EF64EDD3-CC31-4653-85DF-1A82825891C3}" type="datetimeFigureOut">
               <a:rPr lang="pt-BR" smtClean="0"/>
-              <a:t>03/11/2022</a:t>
+              <a:t>07/11/2022</a:t>
             </a:fld>
             <a:endParaRPr lang="pt-BR"/>
           </a:p>
@@ -2183,7 +2183,7 @@
           <a:p>
             <a:fld id="{EF64EDD3-CC31-4653-85DF-1A82825891C3}" type="datetimeFigureOut">
               <a:rPr lang="pt-BR" smtClean="0"/>
-              <a:t>03/11/2022</a:t>
+              <a:t>07/11/2022</a:t>
             </a:fld>
             <a:endParaRPr lang="pt-BR"/>
           </a:p>
@@ -3035,7 +3035,7 @@
           <a:p>
             <a:fld id="{EF64EDD3-CC31-4653-85DF-1A82825891C3}" type="datetimeFigureOut">
               <a:rPr lang="pt-BR" smtClean="0"/>
-              <a:t>03/11/2022</a:t>
+              <a:t>07/11/2022</a:t>
             </a:fld>
             <a:endParaRPr lang="pt-BR"/>
           </a:p>
@@ -3240,7 +3240,7 @@
           <a:p>
             <a:fld id="{EF64EDD3-CC31-4653-85DF-1A82825891C3}" type="datetimeFigureOut">
               <a:rPr lang="pt-BR" smtClean="0"/>
-              <a:t>03/11/2022</a:t>
+              <a:t>07/11/2022</a:t>
             </a:fld>
             <a:endParaRPr lang="pt-BR"/>
           </a:p>
@@ -3454,7 +3454,7 @@
           <a:p>
             <a:fld id="{EF64EDD3-CC31-4653-85DF-1A82825891C3}" type="datetimeFigureOut">
               <a:rPr lang="pt-BR" smtClean="0"/>
-              <a:t>03/11/2022</a:t>
+              <a:t>07/11/2022</a:t>
             </a:fld>
             <a:endParaRPr lang="pt-BR"/>
           </a:p>
@@ -3659,7 +3659,7 @@
           <a:p>
             <a:fld id="{EF64EDD3-CC31-4653-85DF-1A82825891C3}" type="datetimeFigureOut">
               <a:rPr lang="pt-BR" smtClean="0"/>
-              <a:t>03/11/2022</a:t>
+              <a:t>07/11/2022</a:t>
             </a:fld>
             <a:endParaRPr lang="pt-BR"/>
           </a:p>
@@ -3939,7 +3939,7 @@
           <a:p>
             <a:fld id="{EF64EDD3-CC31-4653-85DF-1A82825891C3}" type="datetimeFigureOut">
               <a:rPr lang="pt-BR" smtClean="0"/>
-              <a:t>03/11/2022</a:t>
+              <a:t>07/11/2022</a:t>
             </a:fld>
             <a:endParaRPr lang="pt-BR"/>
           </a:p>
@@ -4206,7 +4206,7 @@
           <a:p>
             <a:fld id="{EF64EDD3-CC31-4653-85DF-1A82825891C3}" type="datetimeFigureOut">
               <a:rPr lang="pt-BR" smtClean="0"/>
-              <a:t>03/11/2022</a:t>
+              <a:t>07/11/2022</a:t>
             </a:fld>
             <a:endParaRPr lang="pt-BR"/>
           </a:p>
@@ -4621,7 +4621,7 @@
           <a:p>
             <a:fld id="{EF64EDD3-CC31-4653-85DF-1A82825891C3}" type="datetimeFigureOut">
               <a:rPr lang="pt-BR" smtClean="0"/>
-              <a:t>03/11/2022</a:t>
+              <a:t>07/11/2022</a:t>
             </a:fld>
             <a:endParaRPr lang="pt-BR"/>
           </a:p>
@@ -4769,7 +4769,7 @@
           <a:p>
             <a:fld id="{EF64EDD3-CC31-4653-85DF-1A82825891C3}" type="datetimeFigureOut">
               <a:rPr lang="pt-BR" smtClean="0"/>
-              <a:t>03/11/2022</a:t>
+              <a:t>07/11/2022</a:t>
             </a:fld>
             <a:endParaRPr lang="pt-BR"/>
           </a:p>
@@ -4894,7 +4894,7 @@
           <a:p>
             <a:fld id="{EF64EDD3-CC31-4653-85DF-1A82825891C3}" type="datetimeFigureOut">
               <a:rPr lang="pt-BR" smtClean="0"/>
-              <a:t>03/11/2022</a:t>
+              <a:t>07/11/2022</a:t>
             </a:fld>
             <a:endParaRPr lang="pt-BR"/>
           </a:p>
@@ -5173,7 +5173,7 @@
           <a:p>
             <a:fld id="{EF64EDD3-CC31-4653-85DF-1A82825891C3}" type="datetimeFigureOut">
               <a:rPr lang="pt-BR" smtClean="0"/>
-              <a:t>03/11/2022</a:t>
+              <a:t>07/11/2022</a:t>
             </a:fld>
             <a:endParaRPr lang="pt-BR"/>
           </a:p>
@@ -5485,7 +5485,7 @@
           <a:p>
             <a:fld id="{EF64EDD3-CC31-4653-85DF-1A82825891C3}" type="datetimeFigureOut">
               <a:rPr lang="pt-BR" smtClean="0"/>
-              <a:t>03/11/2022</a:t>
+              <a:t>07/11/2022</a:t>
             </a:fld>
             <a:endParaRPr lang="pt-BR"/>
           </a:p>
@@ -5738,7 +5738,7 @@
           <a:p>
             <a:fld id="{EF64EDD3-CC31-4653-85DF-1A82825891C3}" type="datetimeFigureOut">
               <a:rPr lang="pt-BR" smtClean="0"/>
-              <a:t>03/11/2022</a:t>
+              <a:t>07/11/2022</a:t>
             </a:fld>
             <a:endParaRPr lang="pt-BR"/>
           </a:p>
@@ -6419,8 +6419,8 @@
               <a:t>-Family: “</a:t>
             </a:r>
             <a:r>
-              <a:rPr lang="pt-BR" sz="3200" cap="none" dirty="0" err="1"/>
-              <a:t>verdanna</a:t>
+              <a:rPr lang="pt-BR" sz="3200" cap="none"/>
+              <a:t>verdana</a:t>
             </a:r>
             <a:r>
               <a:rPr lang="pt-BR" sz="3200" cap="none" dirty="0"/>

</xml_diff>